<commit_message>
thesis proposal intro slides
</commit_message>
<xml_diff>
--- a/Eager/elk-experiment/appserver/system_design.pptx
+++ b/Eager/elk-experiment/appserver/system_design.pptx
@@ -11,6 +11,16 @@
     <p:sldId id="260" r:id="rId5"/>
     <p:sldId id="261" r:id="rId6"/>
     <p:sldId id="262" r:id="rId7"/>
+    <p:sldId id="264" r:id="rId8"/>
+    <p:sldId id="265" r:id="rId9"/>
+    <p:sldId id="267" r:id="rId10"/>
+    <p:sldId id="268" r:id="rId11"/>
+    <p:sldId id="269" r:id="rId12"/>
+    <p:sldId id="266" r:id="rId13"/>
+    <p:sldId id="270" r:id="rId14"/>
+    <p:sldId id="271" r:id="rId15"/>
+    <p:sldId id="272" r:id="rId16"/>
+    <p:sldId id="273" r:id="rId17"/>
   </p:sldIdLst>
   <p:sldSz cx="9144000" cy="6858000" type="screen4x3"/>
   <p:notesSz cx="6858000" cy="9144000"/>
@@ -3639,6 +3649,903 @@
 </p:sld>
 </file>
 
+<file path=ppt/slides/slide10.xml><?xml version="1.0" encoding="utf-8"?>
+<p:sld xmlns:a="http://schemas.openxmlformats.org/drawingml/2006/main" xmlns:r="http://schemas.openxmlformats.org/officeDocument/2006/relationships" xmlns:p="http://schemas.openxmlformats.org/presentationml/2006/main">
+  <p:cSld>
+    <p:spTree>
+      <p:nvGrpSpPr>
+        <p:cNvPr id="1" name=""/>
+        <p:cNvGrpSpPr/>
+        <p:nvPr/>
+      </p:nvGrpSpPr>
+      <p:grpSpPr>
+        <a:xfrm>
+          <a:off x="0" y="0"/>
+          <a:ext cx="0" cy="0"/>
+          <a:chOff x="0" y="0"/>
+          <a:chExt cx="0" cy="0"/>
+        </a:xfrm>
+      </p:grpSpPr>
+      <p:sp>
+        <p:nvSpPr>
+          <p:cNvPr id="2" name="Title 1"/>
+          <p:cNvSpPr>
+            <a:spLocks noGrp="1"/>
+          </p:cNvSpPr>
+          <p:nvPr>
+            <p:ph type="title"/>
+          </p:nvPr>
+        </p:nvSpPr>
+        <p:spPr/>
+        <p:txBody>
+          <a:bodyPr/>
+          <a:lstStyle/>
+          <a:p>
+            <a:r>
+              <a:rPr lang="en-US" dirty="0" smtClean="0"/>
+              <a:t>Cannot Reason about Performance</a:t>
+            </a:r>
+            <a:endParaRPr lang="en-US" dirty="0"/>
+          </a:p>
+        </p:txBody>
+      </p:sp>
+      <p:sp>
+        <p:nvSpPr>
+          <p:cNvPr id="3" name="Content Placeholder 2"/>
+          <p:cNvSpPr>
+            <a:spLocks noGrp="1"/>
+          </p:cNvSpPr>
+          <p:nvPr>
+            <p:ph idx="1"/>
+          </p:nvPr>
+        </p:nvSpPr>
+        <p:spPr/>
+        <p:txBody>
+          <a:bodyPr/>
+          <a:lstStyle/>
+          <a:p>
+            <a:r>
+              <a:rPr lang="en-US" dirty="0" smtClean="0"/>
+              <a:t>No reliable and systematic means for understanding performance limits</a:t>
+            </a:r>
+          </a:p>
+          <a:p>
+            <a:r>
+              <a:rPr lang="en-US" dirty="0" smtClean="0"/>
+              <a:t>Requires extensive testing</a:t>
+            </a:r>
+          </a:p>
+          <a:p>
+            <a:r>
+              <a:rPr lang="en-US" dirty="0" smtClean="0"/>
+              <a:t>Cannot form performance SLAs</a:t>
+            </a:r>
+            <a:endParaRPr lang="en-US" dirty="0"/>
+          </a:p>
+        </p:txBody>
+      </p:sp>
+      <p:pic>
+        <p:nvPicPr>
+          <p:cNvPr id="4" name="Picture 3" descr="gae_sla.png"/>
+          <p:cNvPicPr>
+            <a:picLocks noChangeAspect="1"/>
+          </p:cNvPicPr>
+          <p:nvPr/>
+        </p:nvPicPr>
+        <p:blipFill>
+          <a:blip r:embed="rId2">
+            <a:extLst>
+              <a:ext uri="{28A0092B-C50C-407E-A947-70E740481C1C}">
+                <a14:useLocalDpi xmlns:a14="http://schemas.microsoft.com/office/drawing/2010/main" val="0"/>
+              </a:ext>
+            </a:extLst>
+          </a:blip>
+          <a:stretch>
+            <a:fillRect/>
+          </a:stretch>
+        </p:blipFill>
+        <p:spPr>
+          <a:xfrm>
+            <a:off x="1108175" y="3931595"/>
+            <a:ext cx="7184460" cy="1487373"/>
+          </a:xfrm>
+          <a:prstGeom prst="rect">
+            <a:avLst/>
+          </a:prstGeom>
+        </p:spPr>
+      </p:pic>
+    </p:spTree>
+    <p:extLst>
+      <p:ext uri="{BB962C8B-B14F-4D97-AF65-F5344CB8AC3E}">
+        <p14:creationId xmlns:p14="http://schemas.microsoft.com/office/powerpoint/2010/main" val="813716038"/>
+      </p:ext>
+    </p:extLst>
+  </p:cSld>
+  <p:clrMapOvr>
+    <a:masterClrMapping/>
+  </p:clrMapOvr>
+</p:sld>
+</file>
+
+<file path=ppt/slides/slide11.xml><?xml version="1.0" encoding="utf-8"?>
+<p:sld xmlns:a="http://schemas.openxmlformats.org/drawingml/2006/main" xmlns:r="http://schemas.openxmlformats.org/officeDocument/2006/relationships" xmlns:p="http://schemas.openxmlformats.org/presentationml/2006/main">
+  <p:cSld>
+    <p:spTree>
+      <p:nvGrpSpPr>
+        <p:cNvPr id="1" name=""/>
+        <p:cNvGrpSpPr/>
+        <p:nvPr/>
+      </p:nvGrpSpPr>
+      <p:grpSpPr>
+        <a:xfrm>
+          <a:off x="0" y="0"/>
+          <a:ext cx="0" cy="0"/>
+          <a:chOff x="0" y="0"/>
+          <a:chExt cx="0" cy="0"/>
+        </a:xfrm>
+      </p:grpSpPr>
+      <p:sp>
+        <p:nvSpPr>
+          <p:cNvPr id="2" name="Title 1"/>
+          <p:cNvSpPr>
+            <a:spLocks noGrp="1"/>
+          </p:cNvSpPr>
+          <p:nvPr>
+            <p:ph type="title"/>
+          </p:nvPr>
+        </p:nvSpPr>
+        <p:spPr/>
+        <p:txBody>
+          <a:bodyPr>
+            <a:normAutofit fontScale="90000"/>
+          </a:bodyPr>
+          <a:lstStyle/>
+          <a:p>
+            <a:r>
+              <a:rPr lang="en-US" dirty="0" smtClean="0"/>
+              <a:t>Poor Support for Performance Anomaly Detection</a:t>
+            </a:r>
+            <a:endParaRPr lang="en-US" dirty="0"/>
+          </a:p>
+        </p:txBody>
+      </p:sp>
+      <p:sp>
+        <p:nvSpPr>
+          <p:cNvPr id="3" name="Content Placeholder 2"/>
+          <p:cNvSpPr>
+            <a:spLocks noGrp="1"/>
+          </p:cNvSpPr>
+          <p:nvPr>
+            <p:ph idx="1"/>
+          </p:nvPr>
+        </p:nvSpPr>
+        <p:spPr/>
+        <p:txBody>
+          <a:bodyPr/>
+          <a:lstStyle/>
+          <a:p>
+            <a:r>
+              <a:rPr lang="en-US" dirty="0" smtClean="0"/>
+              <a:t>Rudimentary monitoring features only</a:t>
+            </a:r>
+          </a:p>
+          <a:p>
+            <a:r>
+              <a:rPr lang="en-US" dirty="0" smtClean="0"/>
+              <a:t>Spawned a new business for cloud application monitoring</a:t>
+            </a:r>
+          </a:p>
+          <a:p>
+            <a:endParaRPr lang="en-US" dirty="0" smtClean="0"/>
+          </a:p>
+          <a:p>
+            <a:endParaRPr lang="en-US" dirty="0"/>
+          </a:p>
+          <a:p>
+            <a:endParaRPr lang="en-US" dirty="0" smtClean="0"/>
+          </a:p>
+          <a:p>
+            <a:r>
+              <a:rPr lang="en-US" dirty="0" smtClean="0"/>
+              <a:t>Limited support for anomaly detection and root cause analysis</a:t>
+            </a:r>
+            <a:endParaRPr lang="en-US" dirty="0"/>
+          </a:p>
+        </p:txBody>
+      </p:sp>
+      <p:pic>
+        <p:nvPicPr>
+          <p:cNvPr id="4" name="Picture 3" descr="NewRelic-logo-square.png"/>
+          <p:cNvPicPr>
+            <a:picLocks noChangeAspect="1"/>
+          </p:cNvPicPr>
+          <p:nvPr/>
+        </p:nvPicPr>
+        <p:blipFill>
+          <a:blip r:embed="rId2">
+            <a:extLst>
+              <a:ext uri="{28A0092B-C50C-407E-A947-70E740481C1C}">
+                <a14:useLocalDpi xmlns:a14="http://schemas.microsoft.com/office/drawing/2010/main" val="0"/>
+              </a:ext>
+            </a:extLst>
+          </a:blip>
+          <a:stretch>
+            <a:fillRect/>
+          </a:stretch>
+        </p:blipFill>
+        <p:spPr>
+          <a:xfrm>
+            <a:off x="1264313" y="3447740"/>
+            <a:ext cx="1686678" cy="1368111"/>
+          </a:xfrm>
+          <a:prstGeom prst="rect">
+            <a:avLst/>
+          </a:prstGeom>
+        </p:spPr>
+      </p:pic>
+    </p:spTree>
+    <p:extLst>
+      <p:ext uri="{BB962C8B-B14F-4D97-AF65-F5344CB8AC3E}">
+        <p14:creationId xmlns:p14="http://schemas.microsoft.com/office/powerpoint/2010/main" val="2244944627"/>
+      </p:ext>
+    </p:extLst>
+  </p:cSld>
+  <p:clrMapOvr>
+    <a:masterClrMapping/>
+  </p:clrMapOvr>
+</p:sld>
+</file>
+
+<file path=ppt/slides/slide12.xml><?xml version="1.0" encoding="utf-8"?>
+<p:sld xmlns:a="http://schemas.openxmlformats.org/drawingml/2006/main" xmlns:r="http://schemas.openxmlformats.org/officeDocument/2006/relationships" xmlns:p="http://schemas.openxmlformats.org/presentationml/2006/main">
+  <p:cSld>
+    <p:spTree>
+      <p:nvGrpSpPr>
+        <p:cNvPr id="1" name=""/>
+        <p:cNvGrpSpPr/>
+        <p:nvPr/>
+      </p:nvGrpSpPr>
+      <p:grpSpPr>
+        <a:xfrm>
+          <a:off x="0" y="0"/>
+          <a:ext cx="0" cy="0"/>
+          <a:chOff x="0" y="0"/>
+          <a:chExt cx="0" cy="0"/>
+        </a:xfrm>
+      </p:grpSpPr>
+      <p:sp>
+        <p:nvSpPr>
+          <p:cNvPr id="2" name="Title 1"/>
+          <p:cNvSpPr>
+            <a:spLocks noGrp="1"/>
+          </p:cNvSpPr>
+          <p:nvPr>
+            <p:ph type="title"/>
+          </p:nvPr>
+        </p:nvSpPr>
+        <p:spPr/>
+        <p:txBody>
+          <a:bodyPr/>
+          <a:lstStyle/>
+          <a:p>
+            <a:r>
+              <a:rPr lang="en-US" dirty="0" smtClean="0"/>
+              <a:t>Unresolved Issues in the Cloud</a:t>
+            </a:r>
+            <a:endParaRPr lang="en-US" dirty="0"/>
+          </a:p>
+        </p:txBody>
+      </p:sp>
+      <p:sp>
+        <p:nvSpPr>
+          <p:cNvPr id="3" name="Content Placeholder 2"/>
+          <p:cNvSpPr>
+            <a:spLocks noGrp="1"/>
+          </p:cNvSpPr>
+          <p:nvPr>
+            <p:ph idx="1"/>
+          </p:nvPr>
+        </p:nvSpPr>
+        <p:spPr/>
+        <p:txBody>
+          <a:bodyPr>
+            <a:normAutofit/>
+          </a:bodyPr>
+          <a:lstStyle/>
+          <a:p>
+            <a:r>
+              <a:rPr lang="en-US" dirty="0" smtClean="0"/>
+              <a:t>Does not enforce good coding practices</a:t>
+            </a:r>
+          </a:p>
+          <a:p>
+            <a:r>
+              <a:rPr lang="en-US" dirty="0" smtClean="0"/>
+              <a:t>Cannot reason about application performance</a:t>
+            </a:r>
+            <a:endParaRPr lang="en-US" dirty="0"/>
+          </a:p>
+          <a:p>
+            <a:r>
+              <a:rPr lang="en-US" dirty="0" smtClean="0"/>
+              <a:t>Difficult to detect performance anomalies and conduct root cause analysis</a:t>
+            </a:r>
+          </a:p>
+        </p:txBody>
+      </p:sp>
+      <p:sp>
+        <p:nvSpPr>
+          <p:cNvPr id="5" name="Left Brace 4"/>
+          <p:cNvSpPr/>
+          <p:nvPr/>
+        </p:nvSpPr>
+        <p:spPr>
+          <a:xfrm rot="16200000">
+            <a:off x="4169045" y="-53718"/>
+            <a:ext cx="778212" cy="8257297"/>
+          </a:xfrm>
+          <a:prstGeom prst="leftBrace">
+            <a:avLst>
+              <a:gd name="adj1" fmla="val 8333"/>
+              <a:gd name="adj2" fmla="val 50151"/>
+            </a:avLst>
+          </a:prstGeom>
+        </p:spPr>
+        <p:style>
+          <a:lnRef idx="2">
+            <a:schemeClr val="accent1"/>
+          </a:lnRef>
+          <a:fillRef idx="0">
+            <a:schemeClr val="accent1"/>
+          </a:fillRef>
+          <a:effectRef idx="1">
+            <a:schemeClr val="accent1"/>
+          </a:effectRef>
+          <a:fontRef idx="minor">
+            <a:schemeClr val="tx1"/>
+          </a:fontRef>
+        </p:style>
+        <p:txBody>
+          <a:bodyPr rtlCol="0" anchor="ctr"/>
+          <a:lstStyle/>
+          <a:p>
+            <a:pPr algn="ctr"/>
+            <a:endParaRPr lang="en-US"/>
+          </a:p>
+        </p:txBody>
+      </p:sp>
+      <p:sp>
+        <p:nvSpPr>
+          <p:cNvPr id="6" name="Cloud 5"/>
+          <p:cNvSpPr/>
+          <p:nvPr/>
+        </p:nvSpPr>
+        <p:spPr>
+          <a:xfrm rot="10800000">
+            <a:off x="2181130" y="4607007"/>
+            <a:ext cx="4978425" cy="2067323"/>
+          </a:xfrm>
+          <a:prstGeom prst="cloud">
+            <a:avLst/>
+          </a:prstGeom>
+          <a:noFill/>
+          <a:ln w="28575" cmpd="sng"/>
+        </p:spPr>
+        <p:style>
+          <a:lnRef idx="1">
+            <a:schemeClr val="accent1"/>
+          </a:lnRef>
+          <a:fillRef idx="3">
+            <a:schemeClr val="accent1"/>
+          </a:fillRef>
+          <a:effectRef idx="2">
+            <a:schemeClr val="accent1"/>
+          </a:effectRef>
+          <a:fontRef idx="minor">
+            <a:schemeClr val="lt1"/>
+          </a:fontRef>
+        </p:style>
+        <p:txBody>
+          <a:bodyPr rtlCol="0" anchor="ctr"/>
+          <a:lstStyle/>
+          <a:p>
+            <a:pPr algn="ctr"/>
+            <a:endParaRPr lang="en-US"/>
+          </a:p>
+        </p:txBody>
+      </p:sp>
+      <p:sp>
+        <p:nvSpPr>
+          <p:cNvPr id="8" name="TextBox 7"/>
+          <p:cNvSpPr txBox="1"/>
+          <p:nvPr/>
+        </p:nvSpPr>
+        <p:spPr>
+          <a:xfrm>
+            <a:off x="3495313" y="5202833"/>
+            <a:ext cx="2444975" cy="923330"/>
+          </a:xfrm>
+          <a:prstGeom prst="rect">
+            <a:avLst/>
+          </a:prstGeom>
+          <a:noFill/>
+        </p:spPr>
+        <p:txBody>
+          <a:bodyPr wrap="none" rtlCol="0">
+            <a:spAutoFit/>
+          </a:bodyPr>
+          <a:lstStyle/>
+          <a:p>
+            <a:pPr algn="ctr"/>
+            <a:r>
+              <a:rPr lang="en-US" dirty="0" smtClean="0"/>
+              <a:t>Simplified maintenance</a:t>
+            </a:r>
+          </a:p>
+          <a:p>
+            <a:pPr algn="ctr"/>
+            <a:r>
+              <a:rPr lang="en-US" dirty="0" smtClean="0"/>
+              <a:t>Reliable</a:t>
+            </a:r>
+          </a:p>
+          <a:p>
+            <a:pPr algn="ctr"/>
+            <a:r>
+              <a:rPr lang="en-US" dirty="0" smtClean="0"/>
+              <a:t>Dependable</a:t>
+            </a:r>
+            <a:endParaRPr lang="en-US" dirty="0"/>
+          </a:p>
+        </p:txBody>
+      </p:sp>
+    </p:spTree>
+    <p:extLst>
+      <p:ext uri="{BB962C8B-B14F-4D97-AF65-F5344CB8AC3E}">
+        <p14:creationId xmlns:p14="http://schemas.microsoft.com/office/powerpoint/2010/main" val="3706993838"/>
+      </p:ext>
+    </p:extLst>
+  </p:cSld>
+  <p:clrMapOvr>
+    <a:masterClrMapping/>
+  </p:clrMapOvr>
+</p:sld>
+</file>
+
+<file path=ppt/slides/slide13.xml><?xml version="1.0" encoding="utf-8"?>
+<p:sld xmlns:a="http://schemas.openxmlformats.org/drawingml/2006/main" xmlns:r="http://schemas.openxmlformats.org/officeDocument/2006/relationships" xmlns:p="http://schemas.openxmlformats.org/presentationml/2006/main">
+  <p:cSld>
+    <p:spTree>
+      <p:nvGrpSpPr>
+        <p:cNvPr id="1" name=""/>
+        <p:cNvGrpSpPr/>
+        <p:nvPr/>
+      </p:nvGrpSpPr>
+      <p:grpSpPr>
+        <a:xfrm>
+          <a:off x="0" y="0"/>
+          <a:ext cx="0" cy="0"/>
+          <a:chOff x="0" y="0"/>
+          <a:chExt cx="0" cy="0"/>
+        </a:xfrm>
+      </p:grpSpPr>
+      <p:sp>
+        <p:nvSpPr>
+          <p:cNvPr id="2" name="Title 1"/>
+          <p:cNvSpPr>
+            <a:spLocks noGrp="1"/>
+          </p:cNvSpPr>
+          <p:nvPr>
+            <p:ph type="title"/>
+          </p:nvPr>
+        </p:nvSpPr>
+        <p:spPr/>
+        <p:txBody>
+          <a:bodyPr/>
+          <a:lstStyle/>
+          <a:p>
+            <a:r>
+              <a:rPr lang="en-US" dirty="0" smtClean="0"/>
+              <a:t>Platform-as-a-Service</a:t>
+            </a:r>
+            <a:endParaRPr lang="en-US" dirty="0"/>
+          </a:p>
+        </p:txBody>
+      </p:sp>
+      <p:sp>
+        <p:nvSpPr>
+          <p:cNvPr id="3" name="Content Placeholder 2"/>
+          <p:cNvSpPr>
+            <a:spLocks noGrp="1"/>
+          </p:cNvSpPr>
+          <p:nvPr>
+            <p:ph idx="1"/>
+          </p:nvPr>
+        </p:nvSpPr>
+        <p:spPr/>
+        <p:txBody>
+          <a:bodyPr/>
+          <a:lstStyle/>
+          <a:p>
+            <a:r>
+              <a:rPr lang="en-US" dirty="0" smtClean="0"/>
+              <a:t>Managed programming platform that hides</a:t>
+            </a:r>
+            <a:r>
+              <a:rPr lang="is-IS" dirty="0" smtClean="0"/>
+              <a:t>…</a:t>
+            </a:r>
+            <a:endParaRPr lang="en-US" dirty="0" smtClean="0"/>
+          </a:p>
+          <a:p>
+            <a:pPr lvl="1"/>
+            <a:r>
+              <a:rPr lang="en-US" dirty="0" smtClean="0"/>
+              <a:t>Infrastructure details</a:t>
+            </a:r>
+          </a:p>
+          <a:p>
+            <a:pPr lvl="1"/>
+            <a:r>
+              <a:rPr lang="en-US" dirty="0" smtClean="0"/>
+              <a:t>VM and OS details</a:t>
+            </a:r>
+          </a:p>
+          <a:p>
+            <a:r>
+              <a:rPr lang="en-US" dirty="0" smtClean="0"/>
+              <a:t>Provides abstractions for common application utilities</a:t>
+            </a:r>
+          </a:p>
+          <a:p>
+            <a:pPr lvl="1"/>
+            <a:r>
+              <a:rPr lang="en-US" dirty="0" smtClean="0"/>
+              <a:t>Data storage, caching, queuing, security etc.</a:t>
+            </a:r>
+          </a:p>
+          <a:p>
+            <a:r>
+              <a:rPr lang="en-US" dirty="0" smtClean="0"/>
+              <a:t>Google App Engine</a:t>
+            </a:r>
+            <a:endParaRPr lang="en-US" dirty="0"/>
+          </a:p>
+        </p:txBody>
+      </p:sp>
+    </p:spTree>
+    <p:extLst>
+      <p:ext uri="{BB962C8B-B14F-4D97-AF65-F5344CB8AC3E}">
+        <p14:creationId xmlns:p14="http://schemas.microsoft.com/office/powerpoint/2010/main" val="495904172"/>
+      </p:ext>
+    </p:extLst>
+  </p:cSld>
+  <p:clrMapOvr>
+    <a:masterClrMapping/>
+  </p:clrMapOvr>
+</p:sld>
+</file>
+
+<file path=ppt/slides/slide14.xml><?xml version="1.0" encoding="utf-8"?>
+<p:sld xmlns:a="http://schemas.openxmlformats.org/drawingml/2006/main" xmlns:r="http://schemas.openxmlformats.org/officeDocument/2006/relationships" xmlns:p="http://schemas.openxmlformats.org/presentationml/2006/main">
+  <p:cSld>
+    <p:spTree>
+      <p:nvGrpSpPr>
+        <p:cNvPr id="1" name=""/>
+        <p:cNvGrpSpPr/>
+        <p:nvPr/>
+      </p:nvGrpSpPr>
+      <p:grpSpPr>
+        <a:xfrm>
+          <a:off x="0" y="0"/>
+          <a:ext cx="0" cy="0"/>
+          <a:chOff x="0" y="0"/>
+          <a:chExt cx="0" cy="0"/>
+        </a:xfrm>
+      </p:grpSpPr>
+      <p:sp>
+        <p:nvSpPr>
+          <p:cNvPr id="2" name="Title 1"/>
+          <p:cNvSpPr>
+            <a:spLocks noGrp="1"/>
+          </p:cNvSpPr>
+          <p:nvPr>
+            <p:ph type="title"/>
+          </p:nvPr>
+        </p:nvSpPr>
+        <p:spPr/>
+        <p:txBody>
+          <a:bodyPr/>
+          <a:lstStyle/>
+          <a:p>
+            <a:r>
+              <a:rPr lang="en-US" dirty="0" err="1" smtClean="0"/>
+              <a:t>PaaS</a:t>
+            </a:r>
+            <a:r>
+              <a:rPr lang="en-US" dirty="0" smtClean="0"/>
+              <a:t> Application Model</a:t>
+            </a:r>
+            <a:endParaRPr lang="en-US" dirty="0"/>
+          </a:p>
+        </p:txBody>
+      </p:sp>
+      <p:pic>
+        <p:nvPicPr>
+          <p:cNvPr id="4" name="Content Placeholder 3" descr="cloud_app_model.png"/>
+          <p:cNvPicPr>
+            <a:picLocks noGrp="1" noChangeAspect="1"/>
+          </p:cNvPicPr>
+          <p:nvPr>
+            <p:ph idx="1"/>
+          </p:nvPr>
+        </p:nvPicPr>
+        <p:blipFill>
+          <a:blip r:embed="rId2">
+            <a:extLst>
+              <a:ext uri="{28A0092B-C50C-407E-A947-70E740481C1C}">
+                <a14:useLocalDpi xmlns:a14="http://schemas.microsoft.com/office/drawing/2010/main" val="0"/>
+              </a:ext>
+            </a:extLst>
+          </a:blip>
+          <a:srcRect l="-27444" r="-27444"/>
+          <a:stretch>
+            <a:fillRect/>
+          </a:stretch>
+        </p:blipFill>
+        <p:spPr/>
+      </p:pic>
+    </p:spTree>
+    <p:extLst>
+      <p:ext uri="{BB962C8B-B14F-4D97-AF65-F5344CB8AC3E}">
+        <p14:creationId xmlns:p14="http://schemas.microsoft.com/office/powerpoint/2010/main" val="2422575195"/>
+      </p:ext>
+    </p:extLst>
+  </p:cSld>
+  <p:clrMapOvr>
+    <a:masterClrMapping/>
+  </p:clrMapOvr>
+</p:sld>
+</file>
+
+<file path=ppt/slides/slide15.xml><?xml version="1.0" encoding="utf-8"?>
+<p:sld xmlns:a="http://schemas.openxmlformats.org/drawingml/2006/main" xmlns:r="http://schemas.openxmlformats.org/officeDocument/2006/relationships" xmlns:p="http://schemas.openxmlformats.org/presentationml/2006/main">
+  <p:cSld>
+    <p:spTree>
+      <p:nvGrpSpPr>
+        <p:cNvPr id="1" name=""/>
+        <p:cNvGrpSpPr/>
+        <p:nvPr/>
+      </p:nvGrpSpPr>
+      <p:grpSpPr>
+        <a:xfrm>
+          <a:off x="0" y="0"/>
+          <a:ext cx="0" cy="0"/>
+          <a:chOff x="0" y="0"/>
+          <a:chExt cx="0" cy="0"/>
+        </a:xfrm>
+      </p:grpSpPr>
+      <p:sp>
+        <p:nvSpPr>
+          <p:cNvPr id="2" name="Title 1"/>
+          <p:cNvSpPr>
+            <a:spLocks noGrp="1"/>
+          </p:cNvSpPr>
+          <p:nvPr>
+            <p:ph type="title"/>
+          </p:nvPr>
+        </p:nvSpPr>
+        <p:spPr/>
+        <p:txBody>
+          <a:bodyPr/>
+          <a:lstStyle/>
+          <a:p>
+            <a:r>
+              <a:rPr lang="en-US" dirty="0" smtClean="0"/>
+              <a:t>Why </a:t>
+            </a:r>
+            <a:r>
+              <a:rPr lang="en-US" dirty="0" err="1" smtClean="0"/>
+              <a:t>PaaS</a:t>
+            </a:r>
+            <a:r>
+              <a:rPr lang="en-US" dirty="0" smtClean="0"/>
+              <a:t> Clouds?</a:t>
+            </a:r>
+            <a:endParaRPr lang="en-US" dirty="0"/>
+          </a:p>
+        </p:txBody>
+      </p:sp>
+      <p:sp>
+        <p:nvSpPr>
+          <p:cNvPr id="3" name="Content Placeholder 2"/>
+          <p:cNvSpPr>
+            <a:spLocks noGrp="1"/>
+          </p:cNvSpPr>
+          <p:nvPr>
+            <p:ph idx="1"/>
+          </p:nvPr>
+        </p:nvSpPr>
+        <p:spPr/>
+        <p:txBody>
+          <a:bodyPr/>
+          <a:lstStyle/>
+          <a:p>
+            <a:r>
+              <a:rPr lang="en-US" dirty="0" smtClean="0"/>
+              <a:t>Our research questions directly impact </a:t>
+            </a:r>
+            <a:r>
+              <a:rPr lang="en-US" dirty="0" err="1" smtClean="0"/>
+              <a:t>PaaS</a:t>
+            </a:r>
+            <a:r>
+              <a:rPr lang="en-US" dirty="0" smtClean="0"/>
+              <a:t> clouds</a:t>
+            </a:r>
+          </a:p>
+          <a:p>
+            <a:r>
+              <a:rPr lang="en-US" dirty="0" smtClean="0"/>
+              <a:t>A large number of applications are already deployed in </a:t>
+            </a:r>
+            <a:r>
+              <a:rPr lang="en-US" dirty="0" err="1" smtClean="0"/>
+              <a:t>PaaS</a:t>
+            </a:r>
+            <a:r>
+              <a:rPr lang="en-US" dirty="0" smtClean="0"/>
+              <a:t> clouds</a:t>
+            </a:r>
+          </a:p>
+          <a:p>
+            <a:pPr lvl="1"/>
+            <a:r>
+              <a:rPr lang="en-US" dirty="0" smtClean="0"/>
+              <a:t>GAE: 1M</a:t>
+            </a:r>
+          </a:p>
+          <a:p>
+            <a:pPr lvl="1"/>
+            <a:r>
+              <a:rPr lang="en-US" dirty="0" err="1" smtClean="0"/>
+              <a:t>Heroku</a:t>
+            </a:r>
+            <a:r>
+              <a:rPr lang="en-US" dirty="0" smtClean="0"/>
+              <a:t>: 1.5M</a:t>
+            </a:r>
+          </a:p>
+          <a:p>
+            <a:endParaRPr lang="en-US" dirty="0"/>
+          </a:p>
+        </p:txBody>
+      </p:sp>
+    </p:spTree>
+    <p:extLst>
+      <p:ext uri="{BB962C8B-B14F-4D97-AF65-F5344CB8AC3E}">
+        <p14:creationId xmlns:p14="http://schemas.microsoft.com/office/powerpoint/2010/main" val="3390838659"/>
+      </p:ext>
+    </p:extLst>
+  </p:cSld>
+  <p:clrMapOvr>
+    <a:masterClrMapping/>
+  </p:clrMapOvr>
+</p:sld>
+</file>
+
+<file path=ppt/slides/slide16.xml><?xml version="1.0" encoding="utf-8"?>
+<p:sld xmlns:a="http://schemas.openxmlformats.org/drawingml/2006/main" xmlns:r="http://schemas.openxmlformats.org/officeDocument/2006/relationships" xmlns:p="http://schemas.openxmlformats.org/presentationml/2006/main">
+  <p:cSld>
+    <p:spTree>
+      <p:nvGrpSpPr>
+        <p:cNvPr id="1" name=""/>
+        <p:cNvGrpSpPr/>
+        <p:nvPr/>
+      </p:nvGrpSpPr>
+      <p:grpSpPr>
+        <a:xfrm>
+          <a:off x="0" y="0"/>
+          <a:ext cx="0" cy="0"/>
+          <a:chOff x="0" y="0"/>
+          <a:chExt cx="0" cy="0"/>
+        </a:xfrm>
+      </p:grpSpPr>
+      <p:sp>
+        <p:nvSpPr>
+          <p:cNvPr id="2" name="Title 1"/>
+          <p:cNvSpPr>
+            <a:spLocks noGrp="1"/>
+          </p:cNvSpPr>
+          <p:nvPr>
+            <p:ph type="title"/>
+          </p:nvPr>
+        </p:nvSpPr>
+        <p:spPr/>
+        <p:txBody>
+          <a:bodyPr/>
+          <a:lstStyle/>
+          <a:p>
+            <a:r>
+              <a:rPr lang="en-US" dirty="0" smtClean="0"/>
+              <a:t>Prelude to Proposal</a:t>
+            </a:r>
+            <a:endParaRPr lang="en-US" dirty="0"/>
+          </a:p>
+        </p:txBody>
+      </p:sp>
+      <p:sp>
+        <p:nvSpPr>
+          <p:cNvPr id="3" name="Content Placeholder 2"/>
+          <p:cNvSpPr>
+            <a:spLocks noGrp="1"/>
+          </p:cNvSpPr>
+          <p:nvPr>
+            <p:ph idx="1"/>
+          </p:nvPr>
+        </p:nvSpPr>
+        <p:spPr/>
+        <p:txBody>
+          <a:bodyPr/>
+          <a:lstStyle/>
+          <a:p>
+            <a:r>
+              <a:rPr lang="en-US" dirty="0" smtClean="0"/>
+              <a:t>Automated governance for </a:t>
+            </a:r>
+            <a:r>
+              <a:rPr lang="en-US" dirty="0" err="1" smtClean="0"/>
+              <a:t>PaaS</a:t>
+            </a:r>
+            <a:r>
+              <a:rPr lang="en-US" dirty="0" smtClean="0"/>
+              <a:t> clouds</a:t>
+            </a:r>
+          </a:p>
+          <a:p>
+            <a:pPr lvl="1"/>
+            <a:r>
+              <a:rPr lang="en-US" dirty="0" smtClean="0"/>
+              <a:t>Specifying/Learning acceptable operational parameters</a:t>
+            </a:r>
+          </a:p>
+          <a:p>
+            <a:pPr lvl="1"/>
+            <a:r>
+              <a:rPr lang="en-US" dirty="0" smtClean="0"/>
+              <a:t>Enforcing acceptable operational parameters</a:t>
+            </a:r>
+          </a:p>
+          <a:p>
+            <a:pPr lvl="1"/>
+            <a:r>
+              <a:rPr lang="en-US" dirty="0" smtClean="0"/>
+              <a:t>Monitoring and detecting deviations from acceptable behavior</a:t>
+            </a:r>
+          </a:p>
+          <a:p>
+            <a:pPr lvl="1"/>
+            <a:r>
+              <a:rPr lang="en-US" dirty="0" smtClean="0"/>
+              <a:t>Taking corrective/preventive action if necessary</a:t>
+            </a:r>
+            <a:endParaRPr lang="en-US" dirty="0"/>
+          </a:p>
+        </p:txBody>
+      </p:sp>
+    </p:spTree>
+    <p:extLst>
+      <p:ext uri="{BB962C8B-B14F-4D97-AF65-F5344CB8AC3E}">
+        <p14:creationId xmlns:p14="http://schemas.microsoft.com/office/powerpoint/2010/main" val="3485380567"/>
+      </p:ext>
+    </p:extLst>
+  </p:cSld>
+  <p:clrMapOvr>
+    <a:masterClrMapping/>
+  </p:clrMapOvr>
+</p:sld>
+</file>
+
 <file path=ppt/slides/slide2.xml><?xml version="1.0" encoding="utf-8"?>
 <p:sld xmlns:a="http://schemas.openxmlformats.org/drawingml/2006/main" xmlns:r="http://schemas.openxmlformats.org/officeDocument/2006/relationships" xmlns:p="http://schemas.openxmlformats.org/presentationml/2006/main">
   <p:cSld>
@@ -4140,15 +5047,7 @@
           <a:p>
             <a:r>
               <a:rPr lang="en-US" dirty="0" smtClean="0"/>
-              <a:t>Can we enforce design-time governance on web applications developed for a given Platform-as-a-Service cloud so as to ensure proper versioning, dependency management and conformance to other developer best practices, and also enforce run-time governance on them so as to automatically determine the expected runtime performance of the applications, detect SLA violations and detect performance anomalies and perform root cause analysis, with minimal developer </a:t>
-            </a:r>
-            <a:r>
-              <a:rPr lang="en-US" smtClean="0"/>
-              <a:t>intervention and no </a:t>
-            </a:r>
-            <a:r>
-              <a:rPr lang="en-US" dirty="0" smtClean="0"/>
-              <a:t>invasive instrumentation on the applications?</a:t>
+              <a:t>Can we enforce design-time governance on web applications developed for a given Platform-as-a-Service cloud so as to ensure proper versioning, dependency management and conformance to other developer best practices, and also enforce run-time governance on them so as to automatically determine the expected runtime performance of the applications, detect SLA violations and detect performance anomalies and perform root cause analysis, with minimal developer intervention and no invasive instrumentation on the applications?</a:t>
             </a:r>
           </a:p>
         </p:txBody>
@@ -4157,6 +5056,2024 @@
     <p:extLst>
       <p:ext uri="{BB962C8B-B14F-4D97-AF65-F5344CB8AC3E}">
         <p14:creationId xmlns:p14="http://schemas.microsoft.com/office/powerpoint/2010/main" val="1996961093"/>
+      </p:ext>
+    </p:extLst>
+  </p:cSld>
+  <p:clrMapOvr>
+    <a:masterClrMapping/>
+  </p:clrMapOvr>
+</p:sld>
+</file>
+
+<file path=ppt/slides/slide7.xml><?xml version="1.0" encoding="utf-8"?>
+<p:sld xmlns:a="http://schemas.openxmlformats.org/drawingml/2006/main" xmlns:r="http://schemas.openxmlformats.org/officeDocument/2006/relationships" xmlns:p="http://schemas.openxmlformats.org/presentationml/2006/main">
+  <p:cSld>
+    <p:spTree>
+      <p:nvGrpSpPr>
+        <p:cNvPr id="1" name=""/>
+        <p:cNvGrpSpPr/>
+        <p:nvPr/>
+      </p:nvGrpSpPr>
+      <p:grpSpPr>
+        <a:xfrm>
+          <a:off x="0" y="0"/>
+          <a:ext cx="0" cy="0"/>
+          <a:chOff x="0" y="0"/>
+          <a:chExt cx="0" cy="0"/>
+        </a:xfrm>
+      </p:grpSpPr>
+      <p:sp>
+        <p:nvSpPr>
+          <p:cNvPr id="2" name="Title 1"/>
+          <p:cNvSpPr>
+            <a:spLocks noGrp="1"/>
+          </p:cNvSpPr>
+          <p:nvPr>
+            <p:ph type="title"/>
+          </p:nvPr>
+        </p:nvSpPr>
+        <p:spPr/>
+        <p:txBody>
+          <a:bodyPr/>
+          <a:lstStyle/>
+          <a:p>
+            <a:r>
+              <a:rPr lang="en-US" dirty="0" smtClean="0"/>
+              <a:t>Cloud Computing</a:t>
+            </a:r>
+            <a:endParaRPr lang="en-US" dirty="0"/>
+          </a:p>
+        </p:txBody>
+      </p:sp>
+      <p:sp>
+        <p:nvSpPr>
+          <p:cNvPr id="4" name="Cloud 3"/>
+          <p:cNvSpPr/>
+          <p:nvPr/>
+        </p:nvSpPr>
+        <p:spPr>
+          <a:xfrm rot="10800000">
+            <a:off x="313427" y="3511493"/>
+            <a:ext cx="6348073" cy="3088123"/>
+          </a:xfrm>
+          <a:prstGeom prst="cloud">
+            <a:avLst/>
+          </a:prstGeom>
+          <a:noFill/>
+          <a:ln w="28575" cmpd="sng"/>
+        </p:spPr>
+        <p:style>
+          <a:lnRef idx="1">
+            <a:schemeClr val="accent1"/>
+          </a:lnRef>
+          <a:fillRef idx="3">
+            <a:schemeClr val="accent1"/>
+          </a:fillRef>
+          <a:effectRef idx="2">
+            <a:schemeClr val="accent1"/>
+          </a:effectRef>
+          <a:fontRef idx="minor">
+            <a:schemeClr val="lt1"/>
+          </a:fontRef>
+        </p:style>
+        <p:txBody>
+          <a:bodyPr rtlCol="0" anchor="ctr"/>
+          <a:lstStyle/>
+          <a:p>
+            <a:pPr algn="ctr"/>
+            <a:endParaRPr lang="en-US"/>
+          </a:p>
+        </p:txBody>
+      </p:sp>
+      <p:sp>
+        <p:nvSpPr>
+          <p:cNvPr id="5" name="Rectangle 4"/>
+          <p:cNvSpPr/>
+          <p:nvPr/>
+        </p:nvSpPr>
+        <p:spPr>
+          <a:xfrm>
+            <a:off x="1533678" y="5441569"/>
+            <a:ext cx="3996901" cy="610154"/>
+          </a:xfrm>
+          <a:prstGeom prst="rect">
+            <a:avLst/>
+          </a:prstGeom>
+        </p:spPr>
+        <p:style>
+          <a:lnRef idx="1">
+            <a:schemeClr val="accent1"/>
+          </a:lnRef>
+          <a:fillRef idx="3">
+            <a:schemeClr val="accent1"/>
+          </a:fillRef>
+          <a:effectRef idx="2">
+            <a:schemeClr val="accent1"/>
+          </a:effectRef>
+          <a:fontRef idx="minor">
+            <a:schemeClr val="lt1"/>
+          </a:fontRef>
+        </p:style>
+        <p:txBody>
+          <a:bodyPr rtlCol="0" anchor="ctr"/>
+          <a:lstStyle/>
+          <a:p>
+            <a:pPr algn="ctr"/>
+            <a:r>
+              <a:rPr lang="en-US" dirty="0" smtClean="0"/>
+              <a:t>Managed Infrastructure</a:t>
+            </a:r>
+            <a:endParaRPr lang="en-US" dirty="0"/>
+          </a:p>
+        </p:txBody>
+      </p:sp>
+      <p:sp>
+        <p:nvSpPr>
+          <p:cNvPr id="6" name="Rectangle 5"/>
+          <p:cNvSpPr/>
+          <p:nvPr/>
+        </p:nvSpPr>
+        <p:spPr>
+          <a:xfrm>
+            <a:off x="1876091" y="4831412"/>
+            <a:ext cx="3312074" cy="610154"/>
+          </a:xfrm>
+          <a:prstGeom prst="rect">
+            <a:avLst/>
+          </a:prstGeom>
+        </p:spPr>
+        <p:style>
+          <a:lnRef idx="1">
+            <a:schemeClr val="accent1"/>
+          </a:lnRef>
+          <a:fillRef idx="3">
+            <a:schemeClr val="accent1"/>
+          </a:fillRef>
+          <a:effectRef idx="2">
+            <a:schemeClr val="accent1"/>
+          </a:effectRef>
+          <a:fontRef idx="minor">
+            <a:schemeClr val="lt1"/>
+          </a:fontRef>
+        </p:style>
+        <p:txBody>
+          <a:bodyPr rtlCol="0" anchor="ctr"/>
+          <a:lstStyle/>
+          <a:p>
+            <a:pPr algn="ctr"/>
+            <a:r>
+              <a:rPr lang="en-US" dirty="0" smtClean="0"/>
+              <a:t>Managed Programming Platform</a:t>
+            </a:r>
+            <a:endParaRPr lang="en-US" dirty="0"/>
+          </a:p>
+        </p:txBody>
+      </p:sp>
+      <p:sp>
+        <p:nvSpPr>
+          <p:cNvPr id="7" name="Rectangle 6"/>
+          <p:cNvSpPr/>
+          <p:nvPr/>
+        </p:nvSpPr>
+        <p:spPr>
+          <a:xfrm>
+            <a:off x="2249633" y="4221258"/>
+            <a:ext cx="2564990" cy="610154"/>
+          </a:xfrm>
+          <a:prstGeom prst="rect">
+            <a:avLst/>
+          </a:prstGeom>
+        </p:spPr>
+        <p:style>
+          <a:lnRef idx="1">
+            <a:schemeClr val="accent1"/>
+          </a:lnRef>
+          <a:fillRef idx="3">
+            <a:schemeClr val="accent1"/>
+          </a:fillRef>
+          <a:effectRef idx="2">
+            <a:schemeClr val="accent1"/>
+          </a:effectRef>
+          <a:fontRef idx="minor">
+            <a:schemeClr val="lt1"/>
+          </a:fontRef>
+        </p:style>
+        <p:txBody>
+          <a:bodyPr rtlCol="0" anchor="ctr"/>
+          <a:lstStyle/>
+          <a:p>
+            <a:pPr algn="ctr"/>
+            <a:r>
+              <a:rPr lang="en-US" dirty="0" smtClean="0"/>
+              <a:t>Managed Application </a:t>
+            </a:r>
+            <a:endParaRPr lang="en-US" dirty="0"/>
+          </a:p>
+        </p:txBody>
+      </p:sp>
+      <p:sp>
+        <p:nvSpPr>
+          <p:cNvPr id="9" name="Right Brace 8"/>
+          <p:cNvSpPr/>
+          <p:nvPr/>
+        </p:nvSpPr>
+        <p:spPr>
+          <a:xfrm>
+            <a:off x="6819095" y="3513368"/>
+            <a:ext cx="276068" cy="3088124"/>
+          </a:xfrm>
+          <a:prstGeom prst="rightBrace">
+            <a:avLst/>
+          </a:prstGeom>
+        </p:spPr>
+        <p:style>
+          <a:lnRef idx="2">
+            <a:schemeClr val="accent1"/>
+          </a:lnRef>
+          <a:fillRef idx="0">
+            <a:schemeClr val="accent1"/>
+          </a:fillRef>
+          <a:effectRef idx="1">
+            <a:schemeClr val="accent1"/>
+          </a:effectRef>
+          <a:fontRef idx="minor">
+            <a:schemeClr val="tx1"/>
+          </a:fontRef>
+        </p:style>
+        <p:txBody>
+          <a:bodyPr rtlCol="0" anchor="ctr"/>
+          <a:lstStyle/>
+          <a:p>
+            <a:pPr algn="ctr"/>
+            <a:endParaRPr lang="en-US"/>
+          </a:p>
+        </p:txBody>
+      </p:sp>
+      <p:sp>
+        <p:nvSpPr>
+          <p:cNvPr id="10" name="TextBox 9"/>
+          <p:cNvSpPr txBox="1"/>
+          <p:nvPr/>
+        </p:nvSpPr>
+        <p:spPr>
+          <a:xfrm>
+            <a:off x="7294379" y="4395588"/>
+            <a:ext cx="1695528" cy="1477328"/>
+          </a:xfrm>
+          <a:prstGeom prst="rect">
+            <a:avLst/>
+          </a:prstGeom>
+          <a:noFill/>
+        </p:spPr>
+        <p:txBody>
+          <a:bodyPr wrap="square" rtlCol="0">
+            <a:spAutoFit/>
+          </a:bodyPr>
+          <a:lstStyle/>
+          <a:p>
+            <a:r>
+              <a:rPr lang="en-US" dirty="0" smtClean="0"/>
+              <a:t>Scalability</a:t>
+            </a:r>
+          </a:p>
+          <a:p>
+            <a:r>
+              <a:rPr lang="en-US" dirty="0" smtClean="0"/>
+              <a:t>High availability</a:t>
+            </a:r>
+          </a:p>
+          <a:p>
+            <a:r>
+              <a:rPr lang="en-US" dirty="0" smtClean="0"/>
+              <a:t>Ease of use</a:t>
+            </a:r>
+          </a:p>
+          <a:p>
+            <a:r>
+              <a:rPr lang="en-US" dirty="0" smtClean="0"/>
+              <a:t>Cost effective</a:t>
+            </a:r>
+          </a:p>
+          <a:p>
+            <a:endParaRPr lang="en-US" dirty="0"/>
+          </a:p>
+        </p:txBody>
+      </p:sp>
+      <p:pic>
+        <p:nvPicPr>
+          <p:cNvPr id="11" name="Picture 10" descr="company.png"/>
+          <p:cNvPicPr>
+            <a:picLocks noChangeAspect="1"/>
+          </p:cNvPicPr>
+          <p:nvPr/>
+        </p:nvPicPr>
+        <p:blipFill>
+          <a:blip r:embed="rId2">
+            <a:extLst>
+              <a:ext uri="{28A0092B-C50C-407E-A947-70E740481C1C}">
+                <a14:useLocalDpi xmlns:a14="http://schemas.microsoft.com/office/drawing/2010/main" val="0"/>
+              </a:ext>
+            </a:extLst>
+          </a:blip>
+          <a:stretch>
+            <a:fillRect/>
+          </a:stretch>
+        </p:blipFill>
+        <p:spPr>
+          <a:xfrm>
+            <a:off x="457200" y="1591962"/>
+            <a:ext cx="1371600" cy="1371600"/>
+          </a:xfrm>
+          <a:prstGeom prst="rect">
+            <a:avLst/>
+          </a:prstGeom>
+        </p:spPr>
+      </p:pic>
+      <p:pic>
+        <p:nvPicPr>
+          <p:cNvPr id="12" name="Picture 11" descr="scientist-icon-53575.png"/>
+          <p:cNvPicPr>
+            <a:picLocks noChangeAspect="1"/>
+          </p:cNvPicPr>
+          <p:nvPr/>
+        </p:nvPicPr>
+        <p:blipFill>
+          <a:blip r:embed="rId3">
+            <a:extLst>
+              <a:ext uri="{28A0092B-C50C-407E-A947-70E740481C1C}">
+                <a14:useLocalDpi xmlns:a14="http://schemas.microsoft.com/office/drawing/2010/main" val="0"/>
+              </a:ext>
+            </a:extLst>
+          </a:blip>
+          <a:stretch>
+            <a:fillRect/>
+          </a:stretch>
+        </p:blipFill>
+        <p:spPr>
+          <a:xfrm>
+            <a:off x="2884143" y="1591962"/>
+            <a:ext cx="1371600" cy="1371600"/>
+          </a:xfrm>
+          <a:prstGeom prst="rect">
+            <a:avLst/>
+          </a:prstGeom>
+        </p:spPr>
+      </p:pic>
+      <p:pic>
+        <p:nvPicPr>
+          <p:cNvPr id="13" name="Picture 12" descr="mobile_user_400_clr_9132-262x300.png"/>
+          <p:cNvPicPr>
+            <a:picLocks noChangeAspect="1"/>
+          </p:cNvPicPr>
+          <p:nvPr/>
+        </p:nvPicPr>
+        <p:blipFill>
+          <a:blip r:embed="rId4">
+            <a:extLst>
+              <a:ext uri="{28A0092B-C50C-407E-A947-70E740481C1C}">
+                <a14:useLocalDpi xmlns:a14="http://schemas.microsoft.com/office/drawing/2010/main" val="0"/>
+              </a:ext>
+            </a:extLst>
+          </a:blip>
+          <a:stretch>
+            <a:fillRect/>
+          </a:stretch>
+        </p:blipFill>
+        <p:spPr>
+          <a:xfrm>
+            <a:off x="5188165" y="1591962"/>
+            <a:ext cx="1197864" cy="1371600"/>
+          </a:xfrm>
+          <a:prstGeom prst="rect">
+            <a:avLst/>
+          </a:prstGeom>
+        </p:spPr>
+      </p:pic>
+      <p:sp>
+        <p:nvSpPr>
+          <p:cNvPr id="14" name="Down Arrow 13"/>
+          <p:cNvSpPr/>
+          <p:nvPr/>
+        </p:nvSpPr>
+        <p:spPr>
+          <a:xfrm>
+            <a:off x="3473942" y="2963562"/>
+            <a:ext cx="298833" cy="423412"/>
+          </a:xfrm>
+          <a:prstGeom prst="downArrow">
+            <a:avLst/>
+          </a:prstGeom>
+        </p:spPr>
+        <p:style>
+          <a:lnRef idx="1">
+            <a:schemeClr val="accent1"/>
+          </a:lnRef>
+          <a:fillRef idx="3">
+            <a:schemeClr val="accent1"/>
+          </a:fillRef>
+          <a:effectRef idx="2">
+            <a:schemeClr val="accent1"/>
+          </a:effectRef>
+          <a:fontRef idx="minor">
+            <a:schemeClr val="lt1"/>
+          </a:fontRef>
+        </p:style>
+        <p:txBody>
+          <a:bodyPr rtlCol="0" anchor="ctr"/>
+          <a:lstStyle/>
+          <a:p>
+            <a:pPr algn="ctr"/>
+            <a:endParaRPr lang="en-US"/>
+          </a:p>
+        </p:txBody>
+      </p:sp>
+      <p:sp>
+        <p:nvSpPr>
+          <p:cNvPr id="16" name="Down Arrow 15"/>
+          <p:cNvSpPr/>
+          <p:nvPr/>
+        </p:nvSpPr>
+        <p:spPr>
+          <a:xfrm rot="18898302">
+            <a:off x="1612941" y="2979107"/>
+            <a:ext cx="301752" cy="698938"/>
+          </a:xfrm>
+          <a:prstGeom prst="downArrow">
+            <a:avLst/>
+          </a:prstGeom>
+        </p:spPr>
+        <p:style>
+          <a:lnRef idx="1">
+            <a:schemeClr val="accent1"/>
+          </a:lnRef>
+          <a:fillRef idx="3">
+            <a:schemeClr val="accent1"/>
+          </a:fillRef>
+          <a:effectRef idx="2">
+            <a:schemeClr val="accent1"/>
+          </a:effectRef>
+          <a:fontRef idx="minor">
+            <a:schemeClr val="lt1"/>
+          </a:fontRef>
+        </p:style>
+        <p:txBody>
+          <a:bodyPr rtlCol="0" anchor="ctr"/>
+          <a:lstStyle/>
+          <a:p>
+            <a:pPr algn="ctr"/>
+            <a:endParaRPr lang="en-US"/>
+          </a:p>
+        </p:txBody>
+      </p:sp>
+      <p:sp>
+        <p:nvSpPr>
+          <p:cNvPr id="17" name="Down Arrow 16"/>
+          <p:cNvSpPr/>
+          <p:nvPr/>
+        </p:nvSpPr>
+        <p:spPr>
+          <a:xfrm rot="3352521" flipH="1">
+            <a:off x="5131914" y="2934330"/>
+            <a:ext cx="301752" cy="702177"/>
+          </a:xfrm>
+          <a:prstGeom prst="downArrow">
+            <a:avLst/>
+          </a:prstGeom>
+        </p:spPr>
+        <p:style>
+          <a:lnRef idx="1">
+            <a:schemeClr val="accent1"/>
+          </a:lnRef>
+          <a:fillRef idx="3">
+            <a:schemeClr val="accent1"/>
+          </a:fillRef>
+          <a:effectRef idx="2">
+            <a:schemeClr val="accent1"/>
+          </a:effectRef>
+          <a:fontRef idx="minor">
+            <a:schemeClr val="lt1"/>
+          </a:fontRef>
+        </p:style>
+        <p:txBody>
+          <a:bodyPr rtlCol="0" anchor="ctr"/>
+          <a:lstStyle/>
+          <a:p>
+            <a:pPr algn="ctr"/>
+            <a:endParaRPr lang="en-US"/>
+          </a:p>
+        </p:txBody>
+      </p:sp>
+    </p:spTree>
+    <p:extLst>
+      <p:ext uri="{BB962C8B-B14F-4D97-AF65-F5344CB8AC3E}">
+        <p14:creationId xmlns:p14="http://schemas.microsoft.com/office/powerpoint/2010/main" val="673055693"/>
+      </p:ext>
+    </p:extLst>
+  </p:cSld>
+  <p:clrMapOvr>
+    <a:masterClrMapping/>
+  </p:clrMapOvr>
+</p:sld>
+</file>
+
+<file path=ppt/slides/slide8.xml><?xml version="1.0" encoding="utf-8"?>
+<p:sld xmlns:a="http://schemas.openxmlformats.org/drawingml/2006/main" xmlns:r="http://schemas.openxmlformats.org/officeDocument/2006/relationships" xmlns:p="http://schemas.openxmlformats.org/presentationml/2006/main">
+  <p:cSld>
+    <p:spTree>
+      <p:nvGrpSpPr>
+        <p:cNvPr id="1" name=""/>
+        <p:cNvGrpSpPr/>
+        <p:nvPr/>
+      </p:nvGrpSpPr>
+      <p:grpSpPr>
+        <a:xfrm>
+          <a:off x="0" y="0"/>
+          <a:ext cx="0" cy="0"/>
+          <a:chOff x="0" y="0"/>
+          <a:chExt cx="0" cy="0"/>
+        </a:xfrm>
+      </p:grpSpPr>
+      <p:sp>
+        <p:nvSpPr>
+          <p:cNvPr id="2" name="Title 1"/>
+          <p:cNvSpPr>
+            <a:spLocks noGrp="1"/>
+          </p:cNvSpPr>
+          <p:nvPr>
+            <p:ph type="title"/>
+          </p:nvPr>
+        </p:nvSpPr>
+        <p:spPr/>
+        <p:txBody>
+          <a:bodyPr/>
+          <a:lstStyle/>
+          <a:p>
+            <a:r>
+              <a:rPr lang="en-US" dirty="0" smtClean="0"/>
+              <a:t>Aftermath</a:t>
+            </a:r>
+            <a:endParaRPr lang="en-US" dirty="0"/>
+          </a:p>
+        </p:txBody>
+      </p:sp>
+      <p:cxnSp>
+        <p:nvCxnSpPr>
+          <p:cNvPr id="5" name="Straight Connector 4"/>
+          <p:cNvCxnSpPr/>
+          <p:nvPr/>
+        </p:nvCxnSpPr>
+        <p:spPr>
+          <a:xfrm flipH="1">
+            <a:off x="3031399" y="1730843"/>
+            <a:ext cx="24902" cy="5030600"/>
+          </a:xfrm>
+          <a:prstGeom prst="line">
+            <a:avLst/>
+          </a:prstGeom>
+        </p:spPr>
+        <p:style>
+          <a:lnRef idx="2">
+            <a:schemeClr val="accent1"/>
+          </a:lnRef>
+          <a:fillRef idx="0">
+            <a:schemeClr val="accent1"/>
+          </a:fillRef>
+          <a:effectRef idx="1">
+            <a:schemeClr val="accent1"/>
+          </a:effectRef>
+          <a:fontRef idx="minor">
+            <a:schemeClr val="tx1"/>
+          </a:fontRef>
+        </p:style>
+      </p:cxnSp>
+      <p:pic>
+        <p:nvPicPr>
+          <p:cNvPr id="8" name="Picture 7" descr="aws.png"/>
+          <p:cNvPicPr>
+            <a:picLocks noChangeAspect="1"/>
+          </p:cNvPicPr>
+          <p:nvPr/>
+        </p:nvPicPr>
+        <p:blipFill>
+          <a:blip r:embed="rId2">
+            <a:extLst>
+              <a:ext uri="{28A0092B-C50C-407E-A947-70E740481C1C}">
+                <a14:useLocalDpi xmlns:a14="http://schemas.microsoft.com/office/drawing/2010/main" val="0"/>
+              </a:ext>
+            </a:extLst>
+          </a:blip>
+          <a:stretch>
+            <a:fillRect/>
+          </a:stretch>
+        </p:blipFill>
+        <p:spPr>
+          <a:xfrm>
+            <a:off x="-149412" y="1181048"/>
+            <a:ext cx="1957400" cy="1957400"/>
+          </a:xfrm>
+          <a:prstGeom prst="rect">
+            <a:avLst/>
+          </a:prstGeom>
+        </p:spPr>
+      </p:pic>
+      <p:pic>
+        <p:nvPicPr>
+          <p:cNvPr id="9" name="Picture 8" descr="Google-CloudPlatform_VerticalLockup.png"/>
+          <p:cNvPicPr>
+            <a:picLocks noChangeAspect="1"/>
+          </p:cNvPicPr>
+          <p:nvPr/>
+        </p:nvPicPr>
+        <p:blipFill>
+          <a:blip r:embed="rId3">
+            <a:extLst>
+              <a:ext uri="{28A0092B-C50C-407E-A947-70E740481C1C}">
+                <a14:useLocalDpi xmlns:a14="http://schemas.microsoft.com/office/drawing/2010/main" val="0"/>
+              </a:ext>
+            </a:extLst>
+          </a:blip>
+          <a:stretch>
+            <a:fillRect/>
+          </a:stretch>
+        </p:blipFill>
+        <p:spPr>
+          <a:xfrm>
+            <a:off x="-151935" y="2739465"/>
+            <a:ext cx="1998701" cy="1399248"/>
+          </a:xfrm>
+          <a:prstGeom prst="rect">
+            <a:avLst/>
+          </a:prstGeom>
+        </p:spPr>
+      </p:pic>
+      <p:pic>
+        <p:nvPicPr>
+          <p:cNvPr id="10" name="Picture 9" descr="salesforce.png"/>
+          <p:cNvPicPr>
+            <a:picLocks noChangeAspect="1"/>
+          </p:cNvPicPr>
+          <p:nvPr/>
+        </p:nvPicPr>
+        <p:blipFill>
+          <a:blip r:embed="rId4">
+            <a:extLst>
+              <a:ext uri="{28A0092B-C50C-407E-A947-70E740481C1C}">
+                <a14:useLocalDpi xmlns:a14="http://schemas.microsoft.com/office/drawing/2010/main" val="0"/>
+              </a:ext>
+            </a:extLst>
+          </a:blip>
+          <a:stretch>
+            <a:fillRect/>
+          </a:stretch>
+        </p:blipFill>
+        <p:spPr>
+          <a:xfrm>
+            <a:off x="1566260" y="1938495"/>
+            <a:ext cx="1108855" cy="776585"/>
+          </a:xfrm>
+          <a:prstGeom prst="rect">
+            <a:avLst/>
+          </a:prstGeom>
+        </p:spPr>
+      </p:pic>
+      <p:pic>
+        <p:nvPicPr>
+          <p:cNvPr id="11" name="Picture 10" descr="Heroku.png"/>
+          <p:cNvPicPr>
+            <a:picLocks noChangeAspect="1"/>
+          </p:cNvPicPr>
+          <p:nvPr/>
+        </p:nvPicPr>
+        <p:blipFill>
+          <a:blip r:embed="rId5">
+            <a:extLst>
+              <a:ext uri="{28A0092B-C50C-407E-A947-70E740481C1C}">
+                <a14:useLocalDpi xmlns:a14="http://schemas.microsoft.com/office/drawing/2010/main" val="0"/>
+              </a:ext>
+            </a:extLst>
+          </a:blip>
+          <a:stretch>
+            <a:fillRect/>
+          </a:stretch>
+        </p:blipFill>
+        <p:spPr>
+          <a:xfrm>
+            <a:off x="343581" y="3885250"/>
+            <a:ext cx="2233860" cy="943185"/>
+          </a:xfrm>
+          <a:prstGeom prst="rect">
+            <a:avLst/>
+          </a:prstGeom>
+        </p:spPr>
+      </p:pic>
+      <p:pic>
+        <p:nvPicPr>
+          <p:cNvPr id="12" name="Picture 11" descr="azure.png"/>
+          <p:cNvPicPr>
+            <a:picLocks noChangeAspect="1"/>
+          </p:cNvPicPr>
+          <p:nvPr/>
+        </p:nvPicPr>
+        <p:blipFill>
+          <a:blip r:embed="rId6">
+            <a:extLst>
+              <a:ext uri="{28A0092B-C50C-407E-A947-70E740481C1C}">
+                <a14:useLocalDpi xmlns:a14="http://schemas.microsoft.com/office/drawing/2010/main" val="0"/>
+              </a:ext>
+            </a:extLst>
+          </a:blip>
+          <a:stretch>
+            <a:fillRect/>
+          </a:stretch>
+        </p:blipFill>
+        <p:spPr>
+          <a:xfrm>
+            <a:off x="124830" y="4629203"/>
+            <a:ext cx="1565208" cy="1173906"/>
+          </a:xfrm>
+          <a:prstGeom prst="rect">
+            <a:avLst/>
+          </a:prstGeom>
+        </p:spPr>
+      </p:pic>
+      <p:pic>
+        <p:nvPicPr>
+          <p:cNvPr id="13" name="Picture 12" descr="euca.png"/>
+          <p:cNvPicPr>
+            <a:picLocks noChangeAspect="1"/>
+          </p:cNvPicPr>
+          <p:nvPr/>
+        </p:nvPicPr>
+        <p:blipFill>
+          <a:blip r:embed="rId7">
+            <a:extLst>
+              <a:ext uri="{28A0092B-C50C-407E-A947-70E740481C1C}">
+                <a14:useLocalDpi xmlns:a14="http://schemas.microsoft.com/office/drawing/2010/main" val="0"/>
+              </a:ext>
+            </a:extLst>
+          </a:blip>
+          <a:stretch>
+            <a:fillRect/>
+          </a:stretch>
+        </p:blipFill>
+        <p:spPr>
+          <a:xfrm>
+            <a:off x="436108" y="5628614"/>
+            <a:ext cx="2089145" cy="423702"/>
+          </a:xfrm>
+          <a:prstGeom prst="rect">
+            <a:avLst/>
+          </a:prstGeom>
+        </p:spPr>
+      </p:pic>
+      <p:pic>
+        <p:nvPicPr>
+          <p:cNvPr id="14" name="Picture 13" descr="appscale.png"/>
+          <p:cNvPicPr>
+            <a:picLocks noChangeAspect="1"/>
+          </p:cNvPicPr>
+          <p:nvPr/>
+        </p:nvPicPr>
+        <p:blipFill>
+          <a:blip r:embed="rId8">
+            <a:extLst>
+              <a:ext uri="{28A0092B-C50C-407E-A947-70E740481C1C}">
+                <a14:useLocalDpi xmlns:a14="http://schemas.microsoft.com/office/drawing/2010/main" val="0"/>
+              </a:ext>
+            </a:extLst>
+          </a:blip>
+          <a:stretch>
+            <a:fillRect/>
+          </a:stretch>
+        </p:blipFill>
+        <p:spPr>
+          <a:xfrm>
+            <a:off x="1844357" y="4636740"/>
+            <a:ext cx="888654" cy="888654"/>
+          </a:xfrm>
+          <a:prstGeom prst="rect">
+            <a:avLst/>
+          </a:prstGeom>
+        </p:spPr>
+      </p:pic>
+      <p:pic>
+        <p:nvPicPr>
+          <p:cNvPr id="15" name="Picture 14" descr="vmware-logo.png"/>
+          <p:cNvPicPr>
+            <a:picLocks noChangeAspect="1"/>
+          </p:cNvPicPr>
+          <p:nvPr/>
+        </p:nvPicPr>
+        <p:blipFill>
+          <a:blip r:embed="rId9">
+            <a:extLst>
+              <a:ext uri="{28A0092B-C50C-407E-A947-70E740481C1C}">
+                <a14:useLocalDpi xmlns:a14="http://schemas.microsoft.com/office/drawing/2010/main" val="0"/>
+              </a:ext>
+            </a:extLst>
+          </a:blip>
+          <a:stretch>
+            <a:fillRect/>
+          </a:stretch>
+        </p:blipFill>
+        <p:spPr>
+          <a:xfrm>
+            <a:off x="1736985" y="2802244"/>
+            <a:ext cx="1103398" cy="797665"/>
+          </a:xfrm>
+          <a:prstGeom prst="rect">
+            <a:avLst/>
+          </a:prstGeom>
+        </p:spPr>
+      </p:pic>
+      <p:pic>
+        <p:nvPicPr>
+          <p:cNvPr id="16" name="Picture 15" descr="The_OpenStack_logo.svg.png"/>
+          <p:cNvPicPr>
+            <a:picLocks noChangeAspect="1"/>
+          </p:cNvPicPr>
+          <p:nvPr/>
+        </p:nvPicPr>
+        <p:blipFill>
+          <a:blip r:embed="rId10">
+            <a:extLst>
+              <a:ext uri="{28A0092B-C50C-407E-A947-70E740481C1C}">
+                <a14:useLocalDpi xmlns:a14="http://schemas.microsoft.com/office/drawing/2010/main" val="0"/>
+              </a:ext>
+            </a:extLst>
+          </a:blip>
+          <a:stretch>
+            <a:fillRect/>
+          </a:stretch>
+        </p:blipFill>
+        <p:spPr>
+          <a:xfrm>
+            <a:off x="447358" y="6052316"/>
+            <a:ext cx="805684" cy="805684"/>
+          </a:xfrm>
+          <a:prstGeom prst="rect">
+            <a:avLst/>
+          </a:prstGeom>
+        </p:spPr>
+      </p:pic>
+      <p:pic>
+        <p:nvPicPr>
+          <p:cNvPr id="17" name="Picture 16" descr="HP_Helion_cloud_icon.jpg"/>
+          <p:cNvPicPr>
+            <a:picLocks noChangeAspect="1"/>
+          </p:cNvPicPr>
+          <p:nvPr/>
+        </p:nvPicPr>
+        <p:blipFill>
+          <a:blip r:embed="rId11">
+            <a:extLst>
+              <a:ext uri="{28A0092B-C50C-407E-A947-70E740481C1C}">
+                <a14:useLocalDpi xmlns:a14="http://schemas.microsoft.com/office/drawing/2010/main" val="0"/>
+              </a:ext>
+            </a:extLst>
+          </a:blip>
+          <a:stretch>
+            <a:fillRect/>
+          </a:stretch>
+        </p:blipFill>
+        <p:spPr>
+          <a:xfrm>
+            <a:off x="1483424" y="6163846"/>
+            <a:ext cx="1041829" cy="597597"/>
+          </a:xfrm>
+          <a:prstGeom prst="rect">
+            <a:avLst/>
+          </a:prstGeom>
+        </p:spPr>
+      </p:pic>
+      <p:cxnSp>
+        <p:nvCxnSpPr>
+          <p:cNvPr id="19" name="Straight Connector 18"/>
+          <p:cNvCxnSpPr/>
+          <p:nvPr/>
+        </p:nvCxnSpPr>
+        <p:spPr>
+          <a:xfrm flipH="1">
+            <a:off x="6087700" y="1731359"/>
+            <a:ext cx="24902" cy="5030600"/>
+          </a:xfrm>
+          <a:prstGeom prst="line">
+            <a:avLst/>
+          </a:prstGeom>
+        </p:spPr>
+        <p:style>
+          <a:lnRef idx="2">
+            <a:schemeClr val="accent1"/>
+          </a:lnRef>
+          <a:fillRef idx="0">
+            <a:schemeClr val="accent1"/>
+          </a:fillRef>
+          <a:effectRef idx="1">
+            <a:schemeClr val="accent1"/>
+          </a:effectRef>
+          <a:fontRef idx="minor">
+            <a:schemeClr val="tx1"/>
+          </a:fontRef>
+        </p:style>
+      </p:cxnSp>
+      <p:pic>
+        <p:nvPicPr>
+          <p:cNvPr id="20" name="Picture 19" descr="airbnb.png"/>
+          <p:cNvPicPr>
+            <a:picLocks noChangeAspect="1"/>
+          </p:cNvPicPr>
+          <p:nvPr/>
+        </p:nvPicPr>
+        <p:blipFill>
+          <a:blip r:embed="rId12">
+            <a:extLst>
+              <a:ext uri="{28A0092B-C50C-407E-A947-70E740481C1C}">
+                <a14:useLocalDpi xmlns:a14="http://schemas.microsoft.com/office/drawing/2010/main" val="0"/>
+              </a:ext>
+            </a:extLst>
+          </a:blip>
+          <a:stretch>
+            <a:fillRect/>
+          </a:stretch>
+        </p:blipFill>
+        <p:spPr>
+          <a:xfrm>
+            <a:off x="3162658" y="1993079"/>
+            <a:ext cx="1780550" cy="556422"/>
+          </a:xfrm>
+          <a:prstGeom prst="rect">
+            <a:avLst/>
+          </a:prstGeom>
+        </p:spPr>
+      </p:pic>
+      <p:pic>
+        <p:nvPicPr>
+          <p:cNvPr id="22" name="Picture 21" descr="bmw-logo.jpg"/>
+          <p:cNvPicPr>
+            <a:picLocks noChangeAspect="1"/>
+          </p:cNvPicPr>
+          <p:nvPr/>
+        </p:nvPicPr>
+        <p:blipFill>
+          <a:blip r:embed="rId13">
+            <a:extLst>
+              <a:ext uri="{28A0092B-C50C-407E-A947-70E740481C1C}">
+                <a14:useLocalDpi xmlns:a14="http://schemas.microsoft.com/office/drawing/2010/main" val="0"/>
+              </a:ext>
+            </a:extLst>
+          </a:blip>
+          <a:stretch>
+            <a:fillRect/>
+          </a:stretch>
+        </p:blipFill>
+        <p:spPr>
+          <a:xfrm>
+            <a:off x="5092519" y="1803115"/>
+            <a:ext cx="995181" cy="746386"/>
+          </a:xfrm>
+          <a:prstGeom prst="rect">
+            <a:avLst/>
+          </a:prstGeom>
+        </p:spPr>
+      </p:pic>
+      <p:pic>
+        <p:nvPicPr>
+          <p:cNvPr id="23" name="Picture 22" descr="citrix-logo-black.jpg"/>
+          <p:cNvPicPr>
+            <a:picLocks noChangeAspect="1"/>
+          </p:cNvPicPr>
+          <p:nvPr/>
+        </p:nvPicPr>
+        <p:blipFill>
+          <a:blip r:embed="rId14">
+            <a:extLst>
+              <a:ext uri="{28A0092B-C50C-407E-A947-70E740481C1C}">
+                <a14:useLocalDpi xmlns:a14="http://schemas.microsoft.com/office/drawing/2010/main" val="0"/>
+              </a:ext>
+            </a:extLst>
+          </a:blip>
+          <a:stretch>
+            <a:fillRect/>
+          </a:stretch>
+        </p:blipFill>
+        <p:spPr>
+          <a:xfrm>
+            <a:off x="4407797" y="4073805"/>
+            <a:ext cx="1613096" cy="608137"/>
+          </a:xfrm>
+          <a:prstGeom prst="rect">
+            <a:avLst/>
+          </a:prstGeom>
+        </p:spPr>
+      </p:pic>
+      <p:pic>
+        <p:nvPicPr>
+          <p:cNvPr id="24" name="Picture 23" descr="cocacola.jpg"/>
+          <p:cNvPicPr>
+            <a:picLocks noChangeAspect="1"/>
+          </p:cNvPicPr>
+          <p:nvPr/>
+        </p:nvPicPr>
+        <p:blipFill>
+          <a:blip r:embed="rId15">
+            <a:extLst>
+              <a:ext uri="{28A0092B-C50C-407E-A947-70E740481C1C}">
+                <a14:useLocalDpi xmlns:a14="http://schemas.microsoft.com/office/drawing/2010/main" val="0"/>
+              </a:ext>
+            </a:extLst>
+          </a:blip>
+          <a:stretch>
+            <a:fillRect/>
+          </a:stretch>
+        </p:blipFill>
+        <p:spPr>
+          <a:xfrm>
+            <a:off x="3162658" y="3285172"/>
+            <a:ext cx="1553464" cy="870565"/>
+          </a:xfrm>
+          <a:prstGeom prst="rect">
+            <a:avLst/>
+          </a:prstGeom>
+        </p:spPr>
+      </p:pic>
+      <p:pic>
+        <p:nvPicPr>
+          <p:cNvPr id="21" name="Picture 20" descr="best_buy.png"/>
+          <p:cNvPicPr>
+            <a:picLocks noChangeAspect="1"/>
+          </p:cNvPicPr>
+          <p:nvPr/>
+        </p:nvPicPr>
+        <p:blipFill>
+          <a:blip r:embed="rId16">
+            <a:extLst>
+              <a:ext uri="{28A0092B-C50C-407E-A947-70E740481C1C}">
+                <a14:useLocalDpi xmlns:a14="http://schemas.microsoft.com/office/drawing/2010/main" val="0"/>
+              </a:ext>
+            </a:extLst>
+          </a:blip>
+          <a:stretch>
+            <a:fillRect/>
+          </a:stretch>
+        </p:blipFill>
+        <p:spPr>
+          <a:xfrm>
+            <a:off x="4594568" y="2794257"/>
+            <a:ext cx="1344752" cy="926198"/>
+          </a:xfrm>
+          <a:prstGeom prst="rect">
+            <a:avLst/>
+          </a:prstGeom>
+        </p:spPr>
+      </p:pic>
+      <p:pic>
+        <p:nvPicPr>
+          <p:cNvPr id="25" name="Picture 24" descr="coursera.png"/>
+          <p:cNvPicPr>
+            <a:picLocks noChangeAspect="1"/>
+          </p:cNvPicPr>
+          <p:nvPr/>
+        </p:nvPicPr>
+        <p:blipFill>
+          <a:blip r:embed="rId17">
+            <a:extLst>
+              <a:ext uri="{28A0092B-C50C-407E-A947-70E740481C1C}">
+                <a14:useLocalDpi xmlns:a14="http://schemas.microsoft.com/office/drawing/2010/main" val="0"/>
+              </a:ext>
+            </a:extLst>
+          </a:blip>
+          <a:stretch>
+            <a:fillRect/>
+          </a:stretch>
+        </p:blipFill>
+        <p:spPr>
+          <a:xfrm>
+            <a:off x="4884323" y="4675068"/>
+            <a:ext cx="1054997" cy="1054997"/>
+          </a:xfrm>
+          <a:prstGeom prst="rect">
+            <a:avLst/>
+          </a:prstGeom>
+        </p:spPr>
+      </p:pic>
+      <p:pic>
+        <p:nvPicPr>
+          <p:cNvPr id="26" name="Picture 25" descr="Netflix_Web_Logo.png"/>
+          <p:cNvPicPr>
+            <a:picLocks noChangeAspect="1"/>
+          </p:cNvPicPr>
+          <p:nvPr/>
+        </p:nvPicPr>
+        <p:blipFill>
+          <a:blip r:embed="rId18">
+            <a:extLst>
+              <a:ext uri="{28A0092B-C50C-407E-A947-70E740481C1C}">
+                <a14:useLocalDpi xmlns:a14="http://schemas.microsoft.com/office/drawing/2010/main" val="0"/>
+              </a:ext>
+            </a:extLst>
+          </a:blip>
+          <a:stretch>
+            <a:fillRect/>
+          </a:stretch>
+        </p:blipFill>
+        <p:spPr>
+          <a:xfrm>
+            <a:off x="3162658" y="5072450"/>
+            <a:ext cx="1567414" cy="726888"/>
+          </a:xfrm>
+          <a:prstGeom prst="rect">
+            <a:avLst/>
+          </a:prstGeom>
+        </p:spPr>
+      </p:pic>
+      <p:pic>
+        <p:nvPicPr>
+          <p:cNvPr id="27" name="Picture 26" descr="Snapchat.png"/>
+          <p:cNvPicPr>
+            <a:picLocks noChangeAspect="1"/>
+          </p:cNvPicPr>
+          <p:nvPr/>
+        </p:nvPicPr>
+        <p:blipFill>
+          <a:blip r:embed="rId19">
+            <a:extLst>
+              <a:ext uri="{28A0092B-C50C-407E-A947-70E740481C1C}">
+                <a14:useLocalDpi xmlns:a14="http://schemas.microsoft.com/office/drawing/2010/main" val="0"/>
+              </a:ext>
+            </a:extLst>
+          </a:blip>
+          <a:stretch>
+            <a:fillRect/>
+          </a:stretch>
+        </p:blipFill>
+        <p:spPr>
+          <a:xfrm>
+            <a:off x="3162658" y="5910166"/>
+            <a:ext cx="1626434" cy="832188"/>
+          </a:xfrm>
+          <a:prstGeom prst="rect">
+            <a:avLst/>
+          </a:prstGeom>
+        </p:spPr>
+      </p:pic>
+      <p:pic>
+        <p:nvPicPr>
+          <p:cNvPr id="28" name="Picture 27" descr="Rovio_logo.svg.png"/>
+          <p:cNvPicPr>
+            <a:picLocks noChangeAspect="1"/>
+          </p:cNvPicPr>
+          <p:nvPr/>
+        </p:nvPicPr>
+        <p:blipFill>
+          <a:blip r:embed="rId20">
+            <a:extLst>
+              <a:ext uri="{28A0092B-C50C-407E-A947-70E740481C1C}">
+                <a14:useLocalDpi xmlns:a14="http://schemas.microsoft.com/office/drawing/2010/main" val="0"/>
+              </a:ext>
+            </a:extLst>
+          </a:blip>
+          <a:stretch>
+            <a:fillRect/>
+          </a:stretch>
+        </p:blipFill>
+        <p:spPr>
+          <a:xfrm>
+            <a:off x="5092519" y="5803109"/>
+            <a:ext cx="571301" cy="900525"/>
+          </a:xfrm>
+          <a:prstGeom prst="rect">
+            <a:avLst/>
+          </a:prstGeom>
+        </p:spPr>
+      </p:pic>
+      <p:pic>
+        <p:nvPicPr>
+          <p:cNvPr id="29" name="Picture 28" descr="Lamborghini_Logo.svg.png"/>
+          <p:cNvPicPr>
+            <a:picLocks noChangeAspect="1"/>
+          </p:cNvPicPr>
+          <p:nvPr/>
+        </p:nvPicPr>
+        <p:blipFill>
+          <a:blip r:embed="rId21">
+            <a:extLst>
+              <a:ext uri="{28A0092B-C50C-407E-A947-70E740481C1C}">
+                <a14:useLocalDpi xmlns:a14="http://schemas.microsoft.com/office/drawing/2010/main" val="0"/>
+              </a:ext>
+            </a:extLst>
+          </a:blip>
+          <a:stretch>
+            <a:fillRect/>
+          </a:stretch>
+        </p:blipFill>
+        <p:spPr>
+          <a:xfrm>
+            <a:off x="3516971" y="2690176"/>
+            <a:ext cx="679153" cy="776175"/>
+          </a:xfrm>
+          <a:prstGeom prst="rect">
+            <a:avLst/>
+          </a:prstGeom>
+        </p:spPr>
+      </p:pic>
+      <p:pic>
+        <p:nvPicPr>
+          <p:cNvPr id="30" name="Picture 29" descr="khan-logo-vertical-transparent.png"/>
+          <p:cNvPicPr>
+            <a:picLocks noChangeAspect="1"/>
+          </p:cNvPicPr>
+          <p:nvPr/>
+        </p:nvPicPr>
+        <p:blipFill>
+          <a:blip r:embed="rId22">
+            <a:extLst>
+              <a:ext uri="{28A0092B-C50C-407E-A947-70E740481C1C}">
+                <a14:useLocalDpi xmlns:a14="http://schemas.microsoft.com/office/drawing/2010/main" val="0"/>
+              </a:ext>
+            </a:extLst>
+          </a:blip>
+          <a:stretch>
+            <a:fillRect/>
+          </a:stretch>
+        </p:blipFill>
+        <p:spPr>
+          <a:xfrm>
+            <a:off x="3441700" y="4065531"/>
+            <a:ext cx="654812" cy="919681"/>
+          </a:xfrm>
+          <a:prstGeom prst="rect">
+            <a:avLst/>
+          </a:prstGeom>
+        </p:spPr>
+      </p:pic>
+      <p:pic>
+        <p:nvPicPr>
+          <p:cNvPr id="31" name="Picture 30" descr="socc.png"/>
+          <p:cNvPicPr>
+            <a:picLocks noChangeAspect="1"/>
+          </p:cNvPicPr>
+          <p:nvPr/>
+        </p:nvPicPr>
+        <p:blipFill>
+          <a:blip r:embed="rId23">
+            <a:extLst>
+              <a:ext uri="{28A0092B-C50C-407E-A947-70E740481C1C}">
+                <a14:useLocalDpi xmlns:a14="http://schemas.microsoft.com/office/drawing/2010/main" val="0"/>
+              </a:ext>
+            </a:extLst>
+          </a:blip>
+          <a:stretch>
+            <a:fillRect/>
+          </a:stretch>
+        </p:blipFill>
+        <p:spPr>
+          <a:xfrm>
+            <a:off x="6315283" y="1590460"/>
+            <a:ext cx="2684122" cy="805237"/>
+          </a:xfrm>
+          <a:prstGeom prst="rect">
+            <a:avLst/>
+          </a:prstGeom>
+        </p:spPr>
+      </p:pic>
+      <p:sp>
+        <p:nvSpPr>
+          <p:cNvPr id="32" name="TextBox 31"/>
+          <p:cNvSpPr txBox="1"/>
+          <p:nvPr/>
+        </p:nvSpPr>
+        <p:spPr>
+          <a:xfrm>
+            <a:off x="6474729" y="2690176"/>
+            <a:ext cx="1270043" cy="369332"/>
+          </a:xfrm>
+          <a:prstGeom prst="rect">
+            <a:avLst/>
+          </a:prstGeom>
+          <a:noFill/>
+        </p:spPr>
+        <p:txBody>
+          <a:bodyPr wrap="square" rtlCol="0">
+            <a:spAutoFit/>
+          </a:bodyPr>
+          <a:lstStyle/>
+          <a:p>
+            <a:r>
+              <a:rPr lang="en-US" b="1" dirty="0" err="1" smtClean="0"/>
+              <a:t>CloudCom</a:t>
+            </a:r>
+            <a:endParaRPr lang="en-US" b="1" dirty="0"/>
+          </a:p>
+        </p:txBody>
+      </p:sp>
+      <p:sp>
+        <p:nvSpPr>
+          <p:cNvPr id="34" name="TextBox 33"/>
+          <p:cNvSpPr txBox="1"/>
+          <p:nvPr/>
+        </p:nvSpPr>
+        <p:spPr>
+          <a:xfrm>
+            <a:off x="7491464" y="3339190"/>
+            <a:ext cx="1270043" cy="369332"/>
+          </a:xfrm>
+          <a:prstGeom prst="rect">
+            <a:avLst/>
+          </a:prstGeom>
+          <a:noFill/>
+        </p:spPr>
+        <p:txBody>
+          <a:bodyPr wrap="square" rtlCol="0">
+            <a:spAutoFit/>
+          </a:bodyPr>
+          <a:lstStyle/>
+          <a:p>
+            <a:r>
+              <a:rPr lang="en-US" b="1" dirty="0" err="1" smtClean="0"/>
+              <a:t>HotCloud</a:t>
+            </a:r>
+            <a:endParaRPr lang="en-US" b="1" dirty="0"/>
+          </a:p>
+        </p:txBody>
+      </p:sp>
+      <p:sp>
+        <p:nvSpPr>
+          <p:cNvPr id="35" name="TextBox 34"/>
+          <p:cNvSpPr txBox="1"/>
+          <p:nvPr/>
+        </p:nvSpPr>
+        <p:spPr>
+          <a:xfrm>
+            <a:off x="6657778" y="3880865"/>
+            <a:ext cx="769568" cy="369332"/>
+          </a:xfrm>
+          <a:prstGeom prst="rect">
+            <a:avLst/>
+          </a:prstGeom>
+          <a:noFill/>
+        </p:spPr>
+        <p:txBody>
+          <a:bodyPr wrap="square" rtlCol="0">
+            <a:spAutoFit/>
+          </a:bodyPr>
+          <a:lstStyle/>
+          <a:p>
+            <a:r>
+              <a:rPr lang="en-US" b="1" dirty="0" smtClean="0"/>
+              <a:t>IC2E</a:t>
+            </a:r>
+            <a:endParaRPr lang="en-US" b="1" dirty="0"/>
+          </a:p>
+        </p:txBody>
+      </p:sp>
+      <p:pic>
+        <p:nvPicPr>
+          <p:cNvPr id="36" name="Picture 35" descr="ieeecloud.png"/>
+          <p:cNvPicPr>
+            <a:picLocks noChangeAspect="1"/>
+          </p:cNvPicPr>
+          <p:nvPr/>
+        </p:nvPicPr>
+        <p:blipFill>
+          <a:blip r:embed="rId24">
+            <a:extLst>
+              <a:ext uri="{28A0092B-C50C-407E-A947-70E740481C1C}">
+                <a14:useLocalDpi xmlns:a14="http://schemas.microsoft.com/office/drawing/2010/main" val="0"/>
+              </a:ext>
+            </a:extLst>
+          </a:blip>
+          <a:stretch>
+            <a:fillRect/>
+          </a:stretch>
+        </p:blipFill>
+        <p:spPr>
+          <a:xfrm>
+            <a:off x="7672881" y="3880865"/>
+            <a:ext cx="1326524" cy="1326524"/>
+          </a:xfrm>
+          <a:prstGeom prst="rect">
+            <a:avLst/>
+          </a:prstGeom>
+        </p:spPr>
+      </p:pic>
+      <p:sp>
+        <p:nvSpPr>
+          <p:cNvPr id="37" name="TextBox 36"/>
+          <p:cNvSpPr txBox="1"/>
+          <p:nvPr/>
+        </p:nvSpPr>
+        <p:spPr>
+          <a:xfrm>
+            <a:off x="7729362" y="5340728"/>
+            <a:ext cx="1270043" cy="369332"/>
+          </a:xfrm>
+          <a:prstGeom prst="rect">
+            <a:avLst/>
+          </a:prstGeom>
+          <a:noFill/>
+        </p:spPr>
+        <p:txBody>
+          <a:bodyPr wrap="square" rtlCol="0">
+            <a:spAutoFit/>
+          </a:bodyPr>
+          <a:lstStyle/>
+          <a:p>
+            <a:r>
+              <a:rPr lang="en-US" b="1" dirty="0" smtClean="0"/>
+              <a:t>CCGRID</a:t>
+            </a:r>
+            <a:endParaRPr lang="en-US" b="1" dirty="0"/>
+          </a:p>
+        </p:txBody>
+      </p:sp>
+      <p:sp>
+        <p:nvSpPr>
+          <p:cNvPr id="38" name="TextBox 37"/>
+          <p:cNvSpPr txBox="1"/>
+          <p:nvPr/>
+        </p:nvSpPr>
+        <p:spPr>
+          <a:xfrm>
+            <a:off x="6221421" y="4497276"/>
+            <a:ext cx="1451460" cy="369332"/>
+          </a:xfrm>
+          <a:prstGeom prst="rect">
+            <a:avLst/>
+          </a:prstGeom>
+          <a:noFill/>
+        </p:spPr>
+        <p:txBody>
+          <a:bodyPr wrap="square" rtlCol="0">
+            <a:spAutoFit/>
+          </a:bodyPr>
+          <a:lstStyle/>
+          <a:p>
+            <a:r>
+              <a:rPr lang="en-US" b="1" dirty="0" err="1" smtClean="0"/>
+              <a:t>MobileCloud</a:t>
+            </a:r>
+            <a:endParaRPr lang="en-US" b="1" dirty="0"/>
+          </a:p>
+        </p:txBody>
+      </p:sp>
+      <p:sp>
+        <p:nvSpPr>
+          <p:cNvPr id="39" name="TextBox 38"/>
+          <p:cNvSpPr txBox="1"/>
+          <p:nvPr/>
+        </p:nvSpPr>
+        <p:spPr>
+          <a:xfrm>
+            <a:off x="6315283" y="3306834"/>
+            <a:ext cx="794469" cy="369332"/>
+          </a:xfrm>
+          <a:prstGeom prst="rect">
+            <a:avLst/>
+          </a:prstGeom>
+          <a:noFill/>
+        </p:spPr>
+        <p:txBody>
+          <a:bodyPr wrap="square" rtlCol="0">
+            <a:spAutoFit/>
+          </a:bodyPr>
+          <a:lstStyle/>
+          <a:p>
+            <a:r>
+              <a:rPr lang="en-US" b="1" dirty="0" smtClean="0"/>
+              <a:t>SSC</a:t>
+            </a:r>
+            <a:endParaRPr lang="en-US" b="1" dirty="0"/>
+          </a:p>
+        </p:txBody>
+      </p:sp>
+      <p:sp>
+        <p:nvSpPr>
+          <p:cNvPr id="40" name="TextBox 39"/>
+          <p:cNvSpPr txBox="1"/>
+          <p:nvPr/>
+        </p:nvSpPr>
+        <p:spPr>
+          <a:xfrm>
+            <a:off x="7610227" y="5820545"/>
+            <a:ext cx="1270043" cy="369332"/>
+          </a:xfrm>
+          <a:prstGeom prst="rect">
+            <a:avLst/>
+          </a:prstGeom>
+          <a:noFill/>
+        </p:spPr>
+        <p:txBody>
+          <a:bodyPr wrap="square" rtlCol="0">
+            <a:spAutoFit/>
+          </a:bodyPr>
+          <a:lstStyle/>
+          <a:p>
+            <a:r>
+              <a:rPr lang="en-US" b="1" dirty="0" err="1" smtClean="0"/>
+              <a:t>FiCloud</a:t>
+            </a:r>
+            <a:endParaRPr lang="en-US" b="1" dirty="0"/>
+          </a:p>
+        </p:txBody>
+      </p:sp>
+      <p:sp>
+        <p:nvSpPr>
+          <p:cNvPr id="41" name="TextBox 40"/>
+          <p:cNvSpPr txBox="1"/>
+          <p:nvPr/>
+        </p:nvSpPr>
+        <p:spPr>
+          <a:xfrm>
+            <a:off x="7866351" y="2435689"/>
+            <a:ext cx="1013919" cy="369332"/>
+          </a:xfrm>
+          <a:prstGeom prst="rect">
+            <a:avLst/>
+          </a:prstGeom>
+          <a:noFill/>
+        </p:spPr>
+        <p:txBody>
+          <a:bodyPr wrap="square" rtlCol="0">
+            <a:spAutoFit/>
+          </a:bodyPr>
+          <a:lstStyle/>
+          <a:p>
+            <a:r>
+              <a:rPr lang="en-US" b="1" dirty="0" smtClean="0"/>
+              <a:t>ISBCC</a:t>
+            </a:r>
+            <a:endParaRPr lang="en-US" b="1" dirty="0"/>
+          </a:p>
+        </p:txBody>
+      </p:sp>
+      <p:sp>
+        <p:nvSpPr>
+          <p:cNvPr id="42" name="TextBox 41"/>
+          <p:cNvSpPr txBox="1"/>
+          <p:nvPr/>
+        </p:nvSpPr>
+        <p:spPr>
+          <a:xfrm>
+            <a:off x="6230912" y="5156062"/>
+            <a:ext cx="1270043" cy="369332"/>
+          </a:xfrm>
+          <a:prstGeom prst="rect">
+            <a:avLst/>
+          </a:prstGeom>
+          <a:noFill/>
+        </p:spPr>
+        <p:txBody>
+          <a:bodyPr wrap="square" rtlCol="0">
+            <a:spAutoFit/>
+          </a:bodyPr>
+          <a:lstStyle/>
+          <a:p>
+            <a:r>
+              <a:rPr lang="en-US" b="1" dirty="0" smtClean="0"/>
+              <a:t>SC2</a:t>
+            </a:r>
+            <a:endParaRPr lang="en-US" b="1" dirty="0"/>
+          </a:p>
+        </p:txBody>
+      </p:sp>
+      <p:sp>
+        <p:nvSpPr>
+          <p:cNvPr id="43" name="TextBox 42"/>
+          <p:cNvSpPr txBox="1"/>
+          <p:nvPr/>
+        </p:nvSpPr>
+        <p:spPr>
+          <a:xfrm>
+            <a:off x="6871314" y="5187959"/>
+            <a:ext cx="689108" cy="369332"/>
+          </a:xfrm>
+          <a:prstGeom prst="rect">
+            <a:avLst/>
+          </a:prstGeom>
+          <a:noFill/>
+        </p:spPr>
+        <p:txBody>
+          <a:bodyPr wrap="square" rtlCol="0">
+            <a:spAutoFit/>
+          </a:bodyPr>
+          <a:lstStyle/>
+          <a:p>
+            <a:r>
+              <a:rPr lang="en-US" b="1" dirty="0" smtClean="0"/>
+              <a:t>UCC</a:t>
+            </a:r>
+            <a:endParaRPr lang="en-US" b="1" dirty="0"/>
+          </a:p>
+        </p:txBody>
+      </p:sp>
+      <p:sp>
+        <p:nvSpPr>
+          <p:cNvPr id="44" name="TextBox 43"/>
+          <p:cNvSpPr txBox="1"/>
+          <p:nvPr/>
+        </p:nvSpPr>
+        <p:spPr>
+          <a:xfrm>
+            <a:off x="6627129" y="6312893"/>
+            <a:ext cx="1270043" cy="369332"/>
+          </a:xfrm>
+          <a:prstGeom prst="rect">
+            <a:avLst/>
+          </a:prstGeom>
+          <a:noFill/>
+        </p:spPr>
+        <p:txBody>
+          <a:bodyPr wrap="square" rtlCol="0">
+            <a:spAutoFit/>
+          </a:bodyPr>
+          <a:lstStyle/>
+          <a:p>
+            <a:r>
+              <a:rPr lang="en-US" b="1" dirty="0" smtClean="0"/>
+              <a:t>HPDC</a:t>
+            </a:r>
+            <a:endParaRPr lang="en-US" b="1" dirty="0"/>
+          </a:p>
+        </p:txBody>
+      </p:sp>
+      <p:sp>
+        <p:nvSpPr>
+          <p:cNvPr id="45" name="TextBox 44"/>
+          <p:cNvSpPr txBox="1"/>
+          <p:nvPr/>
+        </p:nvSpPr>
+        <p:spPr>
+          <a:xfrm>
+            <a:off x="7747588" y="2953782"/>
+            <a:ext cx="1270043" cy="369332"/>
+          </a:xfrm>
+          <a:prstGeom prst="rect">
+            <a:avLst/>
+          </a:prstGeom>
+          <a:noFill/>
+        </p:spPr>
+        <p:txBody>
+          <a:bodyPr wrap="square" rtlCol="0">
+            <a:spAutoFit/>
+          </a:bodyPr>
+          <a:lstStyle/>
+          <a:p>
+            <a:r>
+              <a:rPr lang="en-US" b="1" dirty="0" smtClean="0"/>
+              <a:t>IJCCSA</a:t>
+            </a:r>
+            <a:endParaRPr lang="en-US" b="1" dirty="0"/>
+          </a:p>
+        </p:txBody>
+      </p:sp>
+      <p:sp>
+        <p:nvSpPr>
+          <p:cNvPr id="46" name="TextBox 45"/>
+          <p:cNvSpPr txBox="1"/>
+          <p:nvPr/>
+        </p:nvSpPr>
+        <p:spPr>
+          <a:xfrm>
+            <a:off x="7610227" y="6328840"/>
+            <a:ext cx="1270043" cy="369332"/>
+          </a:xfrm>
+          <a:prstGeom prst="rect">
+            <a:avLst/>
+          </a:prstGeom>
+          <a:noFill/>
+        </p:spPr>
+        <p:txBody>
+          <a:bodyPr wrap="square" rtlCol="0">
+            <a:spAutoFit/>
+          </a:bodyPr>
+          <a:lstStyle/>
+          <a:p>
+            <a:r>
+              <a:rPr lang="en-US" b="1" dirty="0" err="1" smtClean="0"/>
+              <a:t>CSCloud</a:t>
+            </a:r>
+            <a:endParaRPr lang="en-US" b="1" dirty="0"/>
+          </a:p>
+        </p:txBody>
+      </p:sp>
+      <p:sp>
+        <p:nvSpPr>
+          <p:cNvPr id="47" name="TextBox 46"/>
+          <p:cNvSpPr txBox="1"/>
+          <p:nvPr/>
+        </p:nvSpPr>
+        <p:spPr>
+          <a:xfrm>
+            <a:off x="6221421" y="5725478"/>
+            <a:ext cx="1270043" cy="369332"/>
+          </a:xfrm>
+          <a:prstGeom prst="rect">
+            <a:avLst/>
+          </a:prstGeom>
+          <a:noFill/>
+        </p:spPr>
+        <p:txBody>
+          <a:bodyPr wrap="square" rtlCol="0">
+            <a:spAutoFit/>
+          </a:bodyPr>
+          <a:lstStyle/>
+          <a:p>
+            <a:r>
+              <a:rPr lang="en-US" b="1" dirty="0" err="1" smtClean="0"/>
+              <a:t>SOSeMC</a:t>
+            </a:r>
+            <a:endParaRPr lang="en-US" b="1" dirty="0"/>
+          </a:p>
+        </p:txBody>
+      </p:sp>
+    </p:spTree>
+    <p:extLst>
+      <p:ext uri="{BB962C8B-B14F-4D97-AF65-F5344CB8AC3E}">
+        <p14:creationId xmlns:p14="http://schemas.microsoft.com/office/powerpoint/2010/main" val="2321943894"/>
+      </p:ext>
+    </p:extLst>
+  </p:cSld>
+  <p:clrMapOvr>
+    <a:masterClrMapping/>
+  </p:clrMapOvr>
+</p:sld>
+</file>
+
+<file path=ppt/slides/slide9.xml><?xml version="1.0" encoding="utf-8"?>
+<p:sld xmlns:a="http://schemas.openxmlformats.org/drawingml/2006/main" xmlns:r="http://schemas.openxmlformats.org/officeDocument/2006/relationships" xmlns:p="http://schemas.openxmlformats.org/presentationml/2006/main">
+  <p:cSld>
+    <p:spTree>
+      <p:nvGrpSpPr>
+        <p:cNvPr id="1" name=""/>
+        <p:cNvGrpSpPr/>
+        <p:nvPr/>
+      </p:nvGrpSpPr>
+      <p:grpSpPr>
+        <a:xfrm>
+          <a:off x="0" y="0"/>
+          <a:ext cx="0" cy="0"/>
+          <a:chOff x="0" y="0"/>
+          <a:chExt cx="0" cy="0"/>
+        </a:xfrm>
+      </p:grpSpPr>
+      <p:sp>
+        <p:nvSpPr>
+          <p:cNvPr id="2" name="Title 1"/>
+          <p:cNvSpPr>
+            <a:spLocks noGrp="1"/>
+          </p:cNvSpPr>
+          <p:nvPr>
+            <p:ph type="title"/>
+          </p:nvPr>
+        </p:nvSpPr>
+        <p:spPr/>
+        <p:txBody>
+          <a:bodyPr/>
+          <a:lstStyle/>
+          <a:p>
+            <a:r>
+              <a:rPr lang="en-US" dirty="0" smtClean="0"/>
+              <a:t>Does Not Enforce Good Coding</a:t>
+            </a:r>
+            <a:endParaRPr lang="en-US" dirty="0"/>
+          </a:p>
+        </p:txBody>
+      </p:sp>
+      <p:sp>
+        <p:nvSpPr>
+          <p:cNvPr id="3" name="Content Placeholder 2"/>
+          <p:cNvSpPr>
+            <a:spLocks noGrp="1"/>
+          </p:cNvSpPr>
+          <p:nvPr>
+            <p:ph idx="1"/>
+          </p:nvPr>
+        </p:nvSpPr>
+        <p:spPr/>
+        <p:txBody>
+          <a:bodyPr/>
+          <a:lstStyle/>
+          <a:p>
+            <a:r>
+              <a:rPr lang="en-US" dirty="0" smtClean="0"/>
+              <a:t>Code reuse</a:t>
+            </a:r>
+          </a:p>
+          <a:p>
+            <a:r>
+              <a:rPr lang="en-US" dirty="0" smtClean="0"/>
+              <a:t>Naming and versioning conventions</a:t>
+            </a:r>
+          </a:p>
+          <a:p>
+            <a:r>
+              <a:rPr lang="en-US" dirty="0" smtClean="0"/>
+              <a:t>Other organizational standards and best practices</a:t>
+            </a:r>
+            <a:endParaRPr lang="en-US" dirty="0"/>
+          </a:p>
+        </p:txBody>
+      </p:sp>
+      <p:sp>
+        <p:nvSpPr>
+          <p:cNvPr id="4" name="Cloud 3"/>
+          <p:cNvSpPr/>
+          <p:nvPr/>
+        </p:nvSpPr>
+        <p:spPr>
+          <a:xfrm rot="10800000">
+            <a:off x="5306435" y="4507391"/>
+            <a:ext cx="3110709" cy="1618772"/>
+          </a:xfrm>
+          <a:prstGeom prst="cloud">
+            <a:avLst/>
+          </a:prstGeom>
+          <a:noFill/>
+          <a:ln w="28575" cmpd="sng"/>
+        </p:spPr>
+        <p:style>
+          <a:lnRef idx="1">
+            <a:schemeClr val="accent1"/>
+          </a:lnRef>
+          <a:fillRef idx="3">
+            <a:schemeClr val="accent1"/>
+          </a:fillRef>
+          <a:effectRef idx="2">
+            <a:schemeClr val="accent1"/>
+          </a:effectRef>
+          <a:fontRef idx="minor">
+            <a:schemeClr val="lt1"/>
+          </a:fontRef>
+        </p:style>
+        <p:txBody>
+          <a:bodyPr rtlCol="0" anchor="ctr"/>
+          <a:lstStyle/>
+          <a:p>
+            <a:pPr algn="ctr"/>
+            <a:endParaRPr lang="en-US"/>
+          </a:p>
+        </p:txBody>
+      </p:sp>
+      <p:pic>
+        <p:nvPicPr>
+          <p:cNvPr id="5" name="Picture 4" descr="developer-icon-17862.png"/>
+          <p:cNvPicPr>
+            <a:picLocks noChangeAspect="1"/>
+          </p:cNvPicPr>
+          <p:nvPr/>
+        </p:nvPicPr>
+        <p:blipFill>
+          <a:blip r:embed="rId2">
+            <a:extLst>
+              <a:ext uri="{28A0092B-C50C-407E-A947-70E740481C1C}">
+                <a14:useLocalDpi xmlns:a14="http://schemas.microsoft.com/office/drawing/2010/main" val="0"/>
+              </a:ext>
+            </a:extLst>
+          </a:blip>
+          <a:stretch>
+            <a:fillRect/>
+          </a:stretch>
+        </p:blipFill>
+        <p:spPr>
+          <a:xfrm>
+            <a:off x="457200" y="4507391"/>
+            <a:ext cx="1861233" cy="1861233"/>
+          </a:xfrm>
+          <a:prstGeom prst="rect">
+            <a:avLst/>
+          </a:prstGeom>
+        </p:spPr>
+      </p:pic>
+      <p:cxnSp>
+        <p:nvCxnSpPr>
+          <p:cNvPr id="7" name="Straight Arrow Connector 6"/>
+          <p:cNvCxnSpPr/>
+          <p:nvPr/>
+        </p:nvCxnSpPr>
+        <p:spPr>
+          <a:xfrm>
+            <a:off x="2430492" y="5317051"/>
+            <a:ext cx="2624778" cy="0"/>
+          </a:xfrm>
+          <a:prstGeom prst="straightConnector1">
+            <a:avLst/>
+          </a:prstGeom>
+          <a:ln>
+            <a:tailEnd type="arrow"/>
+          </a:ln>
+        </p:spPr>
+        <p:style>
+          <a:lnRef idx="2">
+            <a:schemeClr val="accent1"/>
+          </a:lnRef>
+          <a:fillRef idx="0">
+            <a:schemeClr val="accent1"/>
+          </a:fillRef>
+          <a:effectRef idx="1">
+            <a:schemeClr val="accent1"/>
+          </a:effectRef>
+          <a:fontRef idx="minor">
+            <a:schemeClr val="tx1"/>
+          </a:fontRef>
+        </p:style>
+      </p:cxnSp>
+      <p:sp>
+        <p:nvSpPr>
+          <p:cNvPr id="9" name="TextBox 8"/>
+          <p:cNvSpPr txBox="1"/>
+          <p:nvPr/>
+        </p:nvSpPr>
+        <p:spPr>
+          <a:xfrm>
+            <a:off x="282881" y="6045458"/>
+            <a:ext cx="2340864" cy="646331"/>
+          </a:xfrm>
+          <a:prstGeom prst="rect">
+            <a:avLst/>
+          </a:prstGeom>
+          <a:noFill/>
+        </p:spPr>
+        <p:txBody>
+          <a:bodyPr wrap="square" rtlCol="0">
+            <a:spAutoFit/>
+          </a:bodyPr>
+          <a:lstStyle/>
+          <a:p>
+            <a:pPr algn="ctr"/>
+            <a:r>
+              <a:rPr lang="en-US" dirty="0" smtClean="0"/>
+              <a:t>Poorly written and packaged code</a:t>
+            </a:r>
+            <a:endParaRPr lang="en-US" dirty="0"/>
+          </a:p>
+        </p:txBody>
+      </p:sp>
+      <p:sp>
+        <p:nvSpPr>
+          <p:cNvPr id="10" name="TextBox 9"/>
+          <p:cNvSpPr txBox="1"/>
+          <p:nvPr/>
+        </p:nvSpPr>
+        <p:spPr>
+          <a:xfrm>
+            <a:off x="2430492" y="4619186"/>
+            <a:ext cx="2428024" cy="646331"/>
+          </a:xfrm>
+          <a:prstGeom prst="rect">
+            <a:avLst/>
+          </a:prstGeom>
+          <a:noFill/>
+        </p:spPr>
+        <p:txBody>
+          <a:bodyPr wrap="square" rtlCol="0">
+            <a:spAutoFit/>
+          </a:bodyPr>
+          <a:lstStyle/>
+          <a:p>
+            <a:pPr algn="ctr"/>
+            <a:r>
+              <a:rPr lang="en-US" dirty="0" smtClean="0"/>
+              <a:t>Unverified/unchecked deployment</a:t>
+            </a:r>
+            <a:endParaRPr lang="en-US" dirty="0"/>
+          </a:p>
+        </p:txBody>
+      </p:sp>
+      <p:sp>
+        <p:nvSpPr>
+          <p:cNvPr id="11" name="TextBox 10"/>
+          <p:cNvSpPr txBox="1"/>
+          <p:nvPr/>
+        </p:nvSpPr>
+        <p:spPr>
+          <a:xfrm>
+            <a:off x="6076285" y="5043105"/>
+            <a:ext cx="1718294" cy="646331"/>
+          </a:xfrm>
+          <a:prstGeom prst="rect">
+            <a:avLst/>
+          </a:prstGeom>
+          <a:noFill/>
+        </p:spPr>
+        <p:txBody>
+          <a:bodyPr wrap="square" rtlCol="0">
+            <a:spAutoFit/>
+          </a:bodyPr>
+          <a:lstStyle/>
+          <a:p>
+            <a:pPr algn="ctr"/>
+            <a:r>
+              <a:rPr lang="en-US" dirty="0" smtClean="0"/>
+              <a:t>Maintenance nightmare</a:t>
+            </a:r>
+            <a:endParaRPr lang="en-US" dirty="0"/>
+          </a:p>
+        </p:txBody>
+      </p:sp>
+    </p:spTree>
+    <p:extLst>
+      <p:ext uri="{BB962C8B-B14F-4D97-AF65-F5344CB8AC3E}">
+        <p14:creationId xmlns:p14="http://schemas.microsoft.com/office/powerpoint/2010/main" val="2927366450"/>
       </p:ext>
     </p:extLst>
   </p:cSld>

</xml_diff>

<commit_message>
Updated thesis proposal slides
</commit_message>
<xml_diff>
--- a/Eager/elk-experiment/appserver/system_design.pptx
+++ b/Eager/elk-experiment/appserver/system_design.pptx
@@ -17,10 +17,11 @@
     <p:sldId id="268" r:id="rId11"/>
     <p:sldId id="269" r:id="rId12"/>
     <p:sldId id="266" r:id="rId13"/>
-    <p:sldId id="270" r:id="rId14"/>
-    <p:sldId id="271" r:id="rId15"/>
-    <p:sldId id="272" r:id="rId16"/>
-    <p:sldId id="273" r:id="rId17"/>
+    <p:sldId id="275" r:id="rId14"/>
+    <p:sldId id="274" r:id="rId15"/>
+    <p:sldId id="270" r:id="rId16"/>
+    <p:sldId id="271" r:id="rId17"/>
+    <p:sldId id="272" r:id="rId18"/>
   </p:sldIdLst>
   <p:sldSz cx="9144000" cy="6858000" type="screen4x3"/>
   <p:notesSz cx="6858000" cy="9144000"/>
@@ -3847,7 +3848,11 @@
           <a:p>
             <a:r>
               <a:rPr lang="en-US" dirty="0" smtClean="0"/>
-              <a:t>Limited support for anomaly detection and root cause analysis</a:t>
+              <a:t>Limited support for anomaly detection and </a:t>
+            </a:r>
+            <a:r>
+              <a:rPr lang="en-US" smtClean="0"/>
+              <a:t>bottleneck identification</a:t>
             </a:r>
             <a:endParaRPr lang="en-US" dirty="0"/>
           </a:p>
@@ -3968,7 +3973,7 @@
           <a:p>
             <a:r>
               <a:rPr lang="en-US" dirty="0" smtClean="0"/>
-              <a:t>Difficult to detect performance anomalies and conduct root cause analysis</a:t>
+              <a:t>Difficult to detect performance anomalies and identify bottlenecks</a:t>
             </a:r>
           </a:p>
         </p:txBody>
@@ -4146,6 +4151,187 @@
           <a:p>
             <a:r>
               <a:rPr lang="en-US" dirty="0" smtClean="0"/>
+              <a:t>Prelude to Proposal</a:t>
+            </a:r>
+            <a:endParaRPr lang="en-US" dirty="0"/>
+          </a:p>
+        </p:txBody>
+      </p:sp>
+      <p:sp>
+        <p:nvSpPr>
+          <p:cNvPr id="3" name="Content Placeholder 2"/>
+          <p:cNvSpPr>
+            <a:spLocks noGrp="1"/>
+          </p:cNvSpPr>
+          <p:nvPr>
+            <p:ph idx="1"/>
+          </p:nvPr>
+        </p:nvSpPr>
+        <p:spPr/>
+        <p:txBody>
+          <a:bodyPr/>
+          <a:lstStyle/>
+          <a:p>
+            <a:r>
+              <a:rPr lang="en-US" dirty="0" smtClean="0"/>
+              <a:t>Automated governance for cloud platforms</a:t>
+            </a:r>
+          </a:p>
+          <a:p>
+            <a:pPr lvl="1"/>
+            <a:r>
+              <a:rPr lang="en-US" dirty="0" smtClean="0"/>
+              <a:t>Specifying/Learning acceptable operational parameters</a:t>
+            </a:r>
+          </a:p>
+          <a:p>
+            <a:pPr lvl="1"/>
+            <a:r>
+              <a:rPr lang="en-US" dirty="0" smtClean="0"/>
+              <a:t>Enforcing acceptable operational parameters</a:t>
+            </a:r>
+          </a:p>
+          <a:p>
+            <a:pPr lvl="1"/>
+            <a:r>
+              <a:rPr lang="en-US" dirty="0" smtClean="0"/>
+              <a:t>Monitoring and detecting deviations from acceptable behavior</a:t>
+            </a:r>
+          </a:p>
+          <a:p>
+            <a:pPr lvl="1"/>
+            <a:r>
+              <a:rPr lang="en-US" dirty="0" smtClean="0"/>
+              <a:t>Taking corrective/preventive action if necessary</a:t>
+            </a:r>
+            <a:endParaRPr lang="en-US" dirty="0"/>
+          </a:p>
+        </p:txBody>
+      </p:sp>
+    </p:spTree>
+    <p:extLst>
+      <p:ext uri="{BB962C8B-B14F-4D97-AF65-F5344CB8AC3E}">
+        <p14:creationId xmlns:p14="http://schemas.microsoft.com/office/powerpoint/2010/main" val="3172343271"/>
+      </p:ext>
+    </p:extLst>
+  </p:cSld>
+  <p:clrMapOvr>
+    <a:masterClrMapping/>
+  </p:clrMapOvr>
+</p:sld>
+</file>
+
+<file path=ppt/slides/slide14.xml><?xml version="1.0" encoding="utf-8"?>
+<p:sld xmlns:a="http://schemas.openxmlformats.org/drawingml/2006/main" xmlns:r="http://schemas.openxmlformats.org/officeDocument/2006/relationships" xmlns:p="http://schemas.openxmlformats.org/presentationml/2006/main">
+  <p:cSld>
+    <p:spTree>
+      <p:nvGrpSpPr>
+        <p:cNvPr id="1" name=""/>
+        <p:cNvGrpSpPr/>
+        <p:nvPr/>
+      </p:nvGrpSpPr>
+      <p:grpSpPr>
+        <a:xfrm>
+          <a:off x="0" y="0"/>
+          <a:ext cx="0" cy="0"/>
+          <a:chOff x="0" y="0"/>
+          <a:chExt cx="0" cy="0"/>
+        </a:xfrm>
+      </p:grpSpPr>
+      <p:sp>
+        <p:nvSpPr>
+          <p:cNvPr id="2" name="Title 1"/>
+          <p:cNvSpPr>
+            <a:spLocks noGrp="1"/>
+          </p:cNvSpPr>
+          <p:nvPr>
+            <p:ph type="title"/>
+          </p:nvPr>
+        </p:nvSpPr>
+        <p:spPr/>
+        <p:txBody>
+          <a:bodyPr/>
+          <a:lstStyle/>
+          <a:p>
+            <a:r>
+              <a:rPr lang="en-US" dirty="0" smtClean="0"/>
+              <a:t>Thesis Question</a:t>
+            </a:r>
+            <a:endParaRPr lang="en-US" dirty="0"/>
+          </a:p>
+        </p:txBody>
+      </p:sp>
+      <p:sp>
+        <p:nvSpPr>
+          <p:cNvPr id="3" name="Content Placeholder 2"/>
+          <p:cNvSpPr>
+            <a:spLocks noGrp="1"/>
+          </p:cNvSpPr>
+          <p:nvPr>
+            <p:ph idx="1"/>
+          </p:nvPr>
+        </p:nvSpPr>
+        <p:spPr/>
+        <p:txBody>
+          <a:bodyPr>
+            <a:normAutofit fontScale="92500" lnSpcReduction="20000"/>
+          </a:bodyPr>
+          <a:lstStyle/>
+          <a:p>
+            <a:r>
+              <a:rPr lang="en-US" dirty="0" smtClean="0"/>
+              <a:t>Can we enforce design-time governance on web applications developed for a given cloud platform so as to ensure proper versioning, dependency management and conformance to other developer best practices, and also enforce run-time governance on them so as to automatically determine the expected runtime performance of the applications, detect SLA violations and detect performance anomalies and perform root cause analysis, with minimal developer intervention and no invasive instrumentation on the applications?</a:t>
+            </a:r>
+          </a:p>
+        </p:txBody>
+      </p:sp>
+    </p:spTree>
+    <p:extLst>
+      <p:ext uri="{BB962C8B-B14F-4D97-AF65-F5344CB8AC3E}">
+        <p14:creationId xmlns:p14="http://schemas.microsoft.com/office/powerpoint/2010/main" val="4269969608"/>
+      </p:ext>
+    </p:extLst>
+  </p:cSld>
+  <p:clrMapOvr>
+    <a:masterClrMapping/>
+  </p:clrMapOvr>
+</p:sld>
+</file>
+
+<file path=ppt/slides/slide15.xml><?xml version="1.0" encoding="utf-8"?>
+<p:sld xmlns:a="http://schemas.openxmlformats.org/drawingml/2006/main" xmlns:r="http://schemas.openxmlformats.org/officeDocument/2006/relationships" xmlns:p="http://schemas.openxmlformats.org/presentationml/2006/main">
+  <p:cSld>
+    <p:spTree>
+      <p:nvGrpSpPr>
+        <p:cNvPr id="1" name=""/>
+        <p:cNvGrpSpPr/>
+        <p:nvPr/>
+      </p:nvGrpSpPr>
+      <p:grpSpPr>
+        <a:xfrm>
+          <a:off x="0" y="0"/>
+          <a:ext cx="0" cy="0"/>
+          <a:chOff x="0" y="0"/>
+          <a:chExt cx="0" cy="0"/>
+        </a:xfrm>
+      </p:grpSpPr>
+      <p:sp>
+        <p:nvSpPr>
+          <p:cNvPr id="2" name="Title 1"/>
+          <p:cNvSpPr>
+            <a:spLocks noGrp="1"/>
+          </p:cNvSpPr>
+          <p:nvPr>
+            <p:ph type="title"/>
+          </p:nvPr>
+        </p:nvSpPr>
+        <p:spPr/>
+        <p:txBody>
+          <a:bodyPr/>
+          <a:lstStyle/>
+          <a:p>
+            <a:r>
+              <a:rPr lang="en-US" dirty="0" smtClean="0"/>
               <a:t>Platform-as-a-Service</a:t>
             </a:r>
             <a:endParaRPr lang="en-US" dirty="0"/>
@@ -4226,7 +4412,7 @@
 </p:sld>
 </file>
 
-<file path=ppt/slides/slide14.xml><?xml version="1.0" encoding="utf-8"?>
+<file path=ppt/slides/slide16.xml><?xml version="1.0" encoding="utf-8"?>
 <p:sld xmlns:a="http://schemas.openxmlformats.org/drawingml/2006/main" xmlns:r="http://schemas.openxmlformats.org/officeDocument/2006/relationships" xmlns:p="http://schemas.openxmlformats.org/presentationml/2006/main">
   <p:cSld>
     <p:spTree>
@@ -4308,7 +4494,7 @@
 </p:sld>
 </file>
 
-<file path=ppt/slides/slide15.xml><?xml version="1.0" encoding="utf-8"?>
+<file path=ppt/slides/slide17.xml><?xml version="1.0" encoding="utf-8"?>
 <p:sld xmlns:a="http://schemas.openxmlformats.org/drawingml/2006/main" xmlns:r="http://schemas.openxmlformats.org/officeDocument/2006/relationships" xmlns:p="http://schemas.openxmlformats.org/presentationml/2006/main">
   <p:cSld>
     <p:spTree>
@@ -4425,118 +4611,6 @@
     <p:extLst>
       <p:ext uri="{BB962C8B-B14F-4D97-AF65-F5344CB8AC3E}">
         <p14:creationId xmlns:p14="http://schemas.microsoft.com/office/powerpoint/2010/main" val="3390838659"/>
-      </p:ext>
-    </p:extLst>
-  </p:cSld>
-  <p:clrMapOvr>
-    <a:masterClrMapping/>
-  </p:clrMapOvr>
-</p:sld>
-</file>
-
-<file path=ppt/slides/slide16.xml><?xml version="1.0" encoding="utf-8"?>
-<p:sld xmlns:a="http://schemas.openxmlformats.org/drawingml/2006/main" xmlns:r="http://schemas.openxmlformats.org/officeDocument/2006/relationships" xmlns:p="http://schemas.openxmlformats.org/presentationml/2006/main">
-  <p:cSld>
-    <p:spTree>
-      <p:nvGrpSpPr>
-        <p:cNvPr id="1" name=""/>
-        <p:cNvGrpSpPr/>
-        <p:nvPr/>
-      </p:nvGrpSpPr>
-      <p:grpSpPr>
-        <a:xfrm>
-          <a:off x="0" y="0"/>
-          <a:ext cx="0" cy="0"/>
-          <a:chOff x="0" y="0"/>
-          <a:chExt cx="0" cy="0"/>
-        </a:xfrm>
-      </p:grpSpPr>
-      <p:sp>
-        <p:nvSpPr>
-          <p:cNvPr id="2" name="Title 1"/>
-          <p:cNvSpPr>
-            <a:spLocks noGrp="1"/>
-          </p:cNvSpPr>
-          <p:nvPr>
-            <p:ph type="title"/>
-          </p:nvPr>
-        </p:nvSpPr>
-        <p:spPr/>
-        <p:txBody>
-          <a:bodyPr/>
-          <a:lstStyle/>
-          <a:p>
-            <a:r>
-              <a:rPr lang="en-US" dirty="0" smtClean="0"/>
-              <a:t>Prelude to Proposal</a:t>
-            </a:r>
-            <a:endParaRPr lang="en-US" dirty="0"/>
-          </a:p>
-        </p:txBody>
-      </p:sp>
-      <p:sp>
-        <p:nvSpPr>
-          <p:cNvPr id="3" name="Content Placeholder 2"/>
-          <p:cNvSpPr>
-            <a:spLocks noGrp="1"/>
-          </p:cNvSpPr>
-          <p:nvPr>
-            <p:ph idx="1"/>
-          </p:nvPr>
-        </p:nvSpPr>
-        <p:spPr/>
-        <p:txBody>
-          <a:bodyPr/>
-          <a:lstStyle/>
-          <a:p>
-            <a:r>
-              <a:rPr lang="en-US" dirty="0" smtClean="0"/>
-              <a:t>Automated governance for </a:t>
-            </a:r>
-            <a:r>
-              <a:rPr lang="en-US" dirty="0" err="1" smtClean="0"/>
-              <a:t>PaaS</a:t>
-            </a:r>
-            <a:r>
-              <a:rPr lang="en-US" dirty="0" smtClean="0"/>
-              <a:t> clouds</a:t>
-            </a:r>
-          </a:p>
-          <a:p>
-            <a:pPr lvl="1"/>
-            <a:r>
-              <a:rPr lang="en-US" dirty="0" smtClean="0"/>
-              <a:t>Specifying/Learning acceptable operational parameters</a:t>
-            </a:r>
-          </a:p>
-          <a:p>
-            <a:pPr lvl="1"/>
-            <a:r>
-              <a:rPr lang="en-US" dirty="0" smtClean="0"/>
-              <a:t>Enforcing acceptable operational parameters</a:t>
-            </a:r>
-          </a:p>
-          <a:p>
-            <a:pPr lvl="1"/>
-            <a:r>
-              <a:rPr lang="en-US" dirty="0" smtClean="0"/>
-              <a:t>Monitoring and detecting deviations from acceptable behavior</a:t>
-            </a:r>
-          </a:p>
-          <a:p>
-            <a:pPr lvl="1"/>
-            <a:r>
-              <a:rPr lang="en-US" dirty="0" smtClean="0"/>
-              <a:t>Taking corrective/preventive action if necessary</a:t>
-            </a:r>
-            <a:endParaRPr lang="en-US" dirty="0"/>
-          </a:p>
-        </p:txBody>
-      </p:sp>
-    </p:spTree>
-    <p:extLst>
-      <p:ext uri="{BB962C8B-B14F-4D97-AF65-F5344CB8AC3E}">
-        <p14:creationId xmlns:p14="http://schemas.microsoft.com/office/powerpoint/2010/main" val="3485380567"/>
       </p:ext>
     </p:extLst>
   </p:cSld>
@@ -5698,7 +5772,7 @@
         </p:blipFill>
         <p:spPr>
           <a:xfrm>
-            <a:off x="-151935" y="2739465"/>
+            <a:off x="-127033" y="2739465"/>
             <a:ext cx="1998701" cy="1399248"/>
           </a:xfrm>
           <a:prstGeom prst="rect">
@@ -5878,7 +5952,7 @@
         </p:blipFill>
         <p:spPr>
           <a:xfrm>
-            <a:off x="1736985" y="2802244"/>
+            <a:off x="1774338" y="2802244"/>
             <a:ext cx="1103398" cy="797665"/>
           </a:xfrm>
           <a:prstGeom prst="rect">

</xml_diff>

<commit_message>
Updated presentation with cerebro details
</commit_message>
<xml_diff>
--- a/Eager/elk-experiment/appserver/system_design.pptx
+++ b/Eager/elk-experiment/appserver/system_design.pptx
@@ -32,6 +32,16 @@
     <p:sldId id="283" r:id="rId26"/>
     <p:sldId id="284" r:id="rId27"/>
     <p:sldId id="285" r:id="rId28"/>
+    <p:sldId id="286" r:id="rId29"/>
+    <p:sldId id="288" r:id="rId30"/>
+    <p:sldId id="287" r:id="rId31"/>
+    <p:sldId id="289" r:id="rId32"/>
+    <p:sldId id="290" r:id="rId33"/>
+    <p:sldId id="291" r:id="rId34"/>
+    <p:sldId id="292" r:id="rId35"/>
+    <p:sldId id="293" r:id="rId36"/>
+    <p:sldId id="294" r:id="rId37"/>
+    <p:sldId id="295" r:id="rId38"/>
   </p:sldIdLst>
   <p:sldSz cx="9144000" cy="6858000" type="screen4x3"/>
   <p:notesSz cx="6858000" cy="9144000"/>
@@ -314,7 +324,7 @@
           <a:p>
             <a:fld id="{94C3570C-2D75-5147-A673-6C02746C58AB}" type="datetimeFigureOut">
               <a:rPr lang="en-US" smtClean="0"/>
-              <a:t>3/21/16</a:t>
+              <a:t>3/23/16</a:t>
             </a:fld>
             <a:endParaRPr lang="en-US"/>
           </a:p>
@@ -484,7 +494,7 @@
           <a:p>
             <a:fld id="{94C3570C-2D75-5147-A673-6C02746C58AB}" type="datetimeFigureOut">
               <a:rPr lang="en-US" smtClean="0"/>
-              <a:t>3/21/16</a:t>
+              <a:t>3/23/16</a:t>
             </a:fld>
             <a:endParaRPr lang="en-US"/>
           </a:p>
@@ -664,7 +674,7 @@
           <a:p>
             <a:fld id="{94C3570C-2D75-5147-A673-6C02746C58AB}" type="datetimeFigureOut">
               <a:rPr lang="en-US" smtClean="0"/>
-              <a:t>3/21/16</a:t>
+              <a:t>3/23/16</a:t>
             </a:fld>
             <a:endParaRPr lang="en-US"/>
           </a:p>
@@ -834,7 +844,7 @@
           <a:p>
             <a:fld id="{94C3570C-2D75-5147-A673-6C02746C58AB}" type="datetimeFigureOut">
               <a:rPr lang="en-US" smtClean="0"/>
-              <a:t>3/21/16</a:t>
+              <a:t>3/23/16</a:t>
             </a:fld>
             <a:endParaRPr lang="en-US"/>
           </a:p>
@@ -1080,7 +1090,7 @@
           <a:p>
             <a:fld id="{94C3570C-2D75-5147-A673-6C02746C58AB}" type="datetimeFigureOut">
               <a:rPr lang="en-US" smtClean="0"/>
-              <a:t>3/21/16</a:t>
+              <a:t>3/23/16</a:t>
             </a:fld>
             <a:endParaRPr lang="en-US"/>
           </a:p>
@@ -1368,7 +1378,7 @@
           <a:p>
             <a:fld id="{94C3570C-2D75-5147-A673-6C02746C58AB}" type="datetimeFigureOut">
               <a:rPr lang="en-US" smtClean="0"/>
-              <a:t>3/21/16</a:t>
+              <a:t>3/23/16</a:t>
             </a:fld>
             <a:endParaRPr lang="en-US"/>
           </a:p>
@@ -1790,7 +1800,7 @@
           <a:p>
             <a:fld id="{94C3570C-2D75-5147-A673-6C02746C58AB}" type="datetimeFigureOut">
               <a:rPr lang="en-US" smtClean="0"/>
-              <a:t>3/21/16</a:t>
+              <a:t>3/23/16</a:t>
             </a:fld>
             <a:endParaRPr lang="en-US"/>
           </a:p>
@@ -1908,7 +1918,7 @@
           <a:p>
             <a:fld id="{94C3570C-2D75-5147-A673-6C02746C58AB}" type="datetimeFigureOut">
               <a:rPr lang="en-US" smtClean="0"/>
-              <a:t>3/21/16</a:t>
+              <a:t>3/23/16</a:t>
             </a:fld>
             <a:endParaRPr lang="en-US"/>
           </a:p>
@@ -2003,7 +2013,7 @@
           <a:p>
             <a:fld id="{94C3570C-2D75-5147-A673-6C02746C58AB}" type="datetimeFigureOut">
               <a:rPr lang="en-US" smtClean="0"/>
-              <a:t>3/21/16</a:t>
+              <a:t>3/23/16</a:t>
             </a:fld>
             <a:endParaRPr lang="en-US"/>
           </a:p>
@@ -2280,7 +2290,7 @@
           <a:p>
             <a:fld id="{94C3570C-2D75-5147-A673-6C02746C58AB}" type="datetimeFigureOut">
               <a:rPr lang="en-US" smtClean="0"/>
-              <a:t>3/21/16</a:t>
+              <a:t>3/23/16</a:t>
             </a:fld>
             <a:endParaRPr lang="en-US"/>
           </a:p>
@@ -2533,7 +2543,7 @@
           <a:p>
             <a:fld id="{94C3570C-2D75-5147-A673-6C02746C58AB}" type="datetimeFigureOut">
               <a:rPr lang="en-US" smtClean="0"/>
-              <a:t>3/21/16</a:t>
+              <a:t>3/23/16</a:t>
             </a:fld>
             <a:endParaRPr lang="en-US"/>
           </a:p>
@@ -2746,7 +2756,7 @@
           <a:p>
             <a:fld id="{94C3570C-2D75-5147-A673-6C02746C58AB}" type="datetimeFigureOut">
               <a:rPr lang="en-US" smtClean="0"/>
-              <a:t>3/21/16</a:t>
+              <a:t>3/23/16</a:t>
             </a:fld>
             <a:endParaRPr lang="en-US"/>
           </a:p>
@@ -6214,6 +6224,225 @@
 </p:sld>
 </file>
 
+<file path=ppt/slides/slide28.xml><?xml version="1.0" encoding="utf-8"?>
+<p:sld xmlns:a="http://schemas.openxmlformats.org/drawingml/2006/main" xmlns:r="http://schemas.openxmlformats.org/officeDocument/2006/relationships" xmlns:p="http://schemas.openxmlformats.org/presentationml/2006/main">
+  <p:cSld>
+    <p:spTree>
+      <p:nvGrpSpPr>
+        <p:cNvPr id="1" name=""/>
+        <p:cNvGrpSpPr/>
+        <p:nvPr/>
+      </p:nvGrpSpPr>
+      <p:grpSpPr>
+        <a:xfrm>
+          <a:off x="0" y="0"/>
+          <a:ext cx="0" cy="0"/>
+          <a:chOff x="0" y="0"/>
+          <a:chExt cx="0" cy="0"/>
+        </a:xfrm>
+      </p:grpSpPr>
+      <p:sp>
+        <p:nvSpPr>
+          <p:cNvPr id="2" name="Title 1"/>
+          <p:cNvSpPr>
+            <a:spLocks noGrp="1"/>
+          </p:cNvSpPr>
+          <p:nvPr>
+            <p:ph type="title"/>
+          </p:nvPr>
+        </p:nvSpPr>
+        <p:spPr/>
+        <p:txBody>
+          <a:bodyPr>
+            <a:normAutofit fontScale="90000"/>
+          </a:bodyPr>
+          <a:lstStyle/>
+          <a:p>
+            <a:r>
+              <a:rPr lang="en-US" dirty="0" smtClean="0"/>
+              <a:t>Reasoning About Application Performance</a:t>
+            </a:r>
+            <a:endParaRPr lang="en-US" dirty="0"/>
+          </a:p>
+        </p:txBody>
+      </p:sp>
+      <p:sp>
+        <p:nvSpPr>
+          <p:cNvPr id="3" name="Content Placeholder 2"/>
+          <p:cNvSpPr>
+            <a:spLocks noGrp="1"/>
+          </p:cNvSpPr>
+          <p:nvPr>
+            <p:ph idx="1"/>
+          </p:nvPr>
+        </p:nvSpPr>
+        <p:spPr/>
+        <p:txBody>
+          <a:bodyPr>
+            <a:normAutofit lnSpcReduction="10000"/>
+          </a:bodyPr>
+          <a:lstStyle/>
+          <a:p>
+            <a:r>
+              <a:rPr lang="en-US" dirty="0" smtClean="0"/>
+              <a:t>Determine upper bounds on application response times that are:</a:t>
+            </a:r>
+          </a:p>
+          <a:p>
+            <a:pPr lvl="1"/>
+            <a:r>
+              <a:rPr lang="en-US" dirty="0" smtClean="0"/>
+              <a:t>Correct (with specific statistical guarantees)</a:t>
+            </a:r>
+          </a:p>
+          <a:p>
+            <a:pPr lvl="1"/>
+            <a:r>
+              <a:rPr lang="en-US" dirty="0" smtClean="0"/>
+              <a:t>Tight</a:t>
+            </a:r>
+          </a:p>
+          <a:p>
+            <a:pPr lvl="1"/>
+            <a:r>
+              <a:rPr lang="en-US" dirty="0" smtClean="0"/>
+              <a:t>Durable</a:t>
+            </a:r>
+          </a:p>
+          <a:p>
+            <a:r>
+              <a:rPr lang="en-US" dirty="0" smtClean="0"/>
+              <a:t>No extensive testing on the applications</a:t>
+            </a:r>
+          </a:p>
+          <a:p>
+            <a:r>
+              <a:rPr lang="en-US" dirty="0" smtClean="0"/>
+              <a:t>Formulate performance SLAs</a:t>
+            </a:r>
+          </a:p>
+          <a:p>
+            <a:r>
+              <a:rPr lang="en-US" dirty="0" smtClean="0"/>
+              <a:t>Enforce performance policies (design-time), and detect deviations (run-time)</a:t>
+            </a:r>
+          </a:p>
+        </p:txBody>
+      </p:sp>
+    </p:spTree>
+    <p:extLst>
+      <p:ext uri="{BB962C8B-B14F-4D97-AF65-F5344CB8AC3E}">
+        <p14:creationId xmlns:p14="http://schemas.microsoft.com/office/powerpoint/2010/main" val="1161752445"/>
+      </p:ext>
+    </p:extLst>
+  </p:cSld>
+  <p:clrMapOvr>
+    <a:masterClrMapping/>
+  </p:clrMapOvr>
+</p:sld>
+</file>
+
+<file path=ppt/slides/slide29.xml><?xml version="1.0" encoding="utf-8"?>
+<p:sld xmlns:a="http://schemas.openxmlformats.org/drawingml/2006/main" xmlns:r="http://schemas.openxmlformats.org/officeDocument/2006/relationships" xmlns:p="http://schemas.openxmlformats.org/presentationml/2006/main">
+  <p:cSld>
+    <p:spTree>
+      <p:nvGrpSpPr>
+        <p:cNvPr id="1" name=""/>
+        <p:cNvGrpSpPr/>
+        <p:nvPr/>
+      </p:nvGrpSpPr>
+      <p:grpSpPr>
+        <a:xfrm>
+          <a:off x="0" y="0"/>
+          <a:ext cx="0" cy="0"/>
+          <a:chOff x="0" y="0"/>
+          <a:chExt cx="0" cy="0"/>
+        </a:xfrm>
+      </p:grpSpPr>
+      <p:sp>
+        <p:nvSpPr>
+          <p:cNvPr id="2" name="Title 1"/>
+          <p:cNvSpPr>
+            <a:spLocks noGrp="1"/>
+          </p:cNvSpPr>
+          <p:nvPr>
+            <p:ph type="title"/>
+          </p:nvPr>
+        </p:nvSpPr>
+        <p:spPr/>
+        <p:txBody>
+          <a:bodyPr/>
+          <a:lstStyle/>
+          <a:p>
+            <a:r>
+              <a:rPr lang="en-US" dirty="0" err="1" smtClean="0"/>
+              <a:t>Cerebro</a:t>
+            </a:r>
+            <a:endParaRPr lang="en-US" dirty="0"/>
+          </a:p>
+        </p:txBody>
+      </p:sp>
+      <p:sp>
+        <p:nvSpPr>
+          <p:cNvPr id="3" name="Content Placeholder 2"/>
+          <p:cNvSpPr>
+            <a:spLocks noGrp="1"/>
+          </p:cNvSpPr>
+          <p:nvPr>
+            <p:ph idx="1"/>
+          </p:nvPr>
+        </p:nvSpPr>
+        <p:spPr/>
+        <p:txBody>
+          <a:bodyPr/>
+          <a:lstStyle/>
+          <a:p>
+            <a:r>
+              <a:rPr lang="en-US" dirty="0" smtClean="0"/>
+              <a:t>Predicts the response time of web APIs developed for </a:t>
+            </a:r>
+            <a:r>
+              <a:rPr lang="en-US" dirty="0" err="1" smtClean="0"/>
+              <a:t>PaaS</a:t>
+            </a:r>
+            <a:endParaRPr lang="en-US" dirty="0"/>
+          </a:p>
+          <a:p>
+            <a:r>
+              <a:rPr lang="en-US" dirty="0" smtClean="0"/>
+              <a:t>Fully automatic</a:t>
+            </a:r>
+          </a:p>
+          <a:p>
+            <a:r>
+              <a:rPr lang="en-US" dirty="0" smtClean="0"/>
+              <a:t>Uses a combination of static analysis and continuous system monitoring</a:t>
+            </a:r>
+          </a:p>
+          <a:p>
+            <a:r>
+              <a:rPr lang="en-US" dirty="0" smtClean="0"/>
+              <a:t>Provides a statistical framework for forming and invalidating performance SLAs</a:t>
+            </a:r>
+          </a:p>
+          <a:p>
+            <a:endParaRPr lang="en-US" dirty="0"/>
+          </a:p>
+        </p:txBody>
+      </p:sp>
+    </p:spTree>
+    <p:extLst>
+      <p:ext uri="{BB962C8B-B14F-4D97-AF65-F5344CB8AC3E}">
+        <p14:creationId xmlns:p14="http://schemas.microsoft.com/office/powerpoint/2010/main" val="1934169705"/>
+      </p:ext>
+    </p:extLst>
+  </p:cSld>
+  <p:clrMapOvr>
+    <a:masterClrMapping/>
+  </p:clrMapOvr>
+</p:sld>
+</file>
+
 <file path=ppt/slides/slide3.xml><?xml version="1.0" encoding="utf-8"?>
 <p:sld xmlns:a="http://schemas.openxmlformats.org/drawingml/2006/main" xmlns:r="http://schemas.openxmlformats.org/officeDocument/2006/relationships" xmlns:p="http://schemas.openxmlformats.org/presentationml/2006/main">
   <p:cSld>
@@ -6294,6 +6523,1767 @@
     <p:extLst>
       <p:ext uri="{BB962C8B-B14F-4D97-AF65-F5344CB8AC3E}">
         <p14:creationId xmlns:p14="http://schemas.microsoft.com/office/powerpoint/2010/main" val="1796134840"/>
+      </p:ext>
+    </p:extLst>
+  </p:cSld>
+  <p:clrMapOvr>
+    <a:masterClrMapping/>
+  </p:clrMapOvr>
+  <p:timing>
+    <p:tnLst>
+      <p:par>
+        <p:cTn xmlns:p14="http://schemas.microsoft.com/office/powerpoint/2010/main" id="1" dur="indefinite" restart="never" nodeType="tmRoot"/>
+      </p:par>
+    </p:tnLst>
+  </p:timing>
+</p:sld>
+</file>
+
+<file path=ppt/slides/slide30.xml><?xml version="1.0" encoding="utf-8"?>
+<p:sld xmlns:a="http://schemas.openxmlformats.org/drawingml/2006/main" xmlns:r="http://schemas.openxmlformats.org/officeDocument/2006/relationships" xmlns:p="http://schemas.openxmlformats.org/presentationml/2006/main">
+  <p:cSld>
+    <p:spTree>
+      <p:nvGrpSpPr>
+        <p:cNvPr id="1" name=""/>
+        <p:cNvGrpSpPr/>
+        <p:nvPr/>
+      </p:nvGrpSpPr>
+      <p:grpSpPr>
+        <a:xfrm>
+          <a:off x="0" y="0"/>
+          <a:ext cx="0" cy="0"/>
+          <a:chOff x="0" y="0"/>
+          <a:chExt cx="0" cy="0"/>
+        </a:xfrm>
+      </p:grpSpPr>
+      <p:sp>
+        <p:nvSpPr>
+          <p:cNvPr id="2" name="Title 1"/>
+          <p:cNvSpPr>
+            <a:spLocks noGrp="1"/>
+          </p:cNvSpPr>
+          <p:nvPr>
+            <p:ph type="title"/>
+          </p:nvPr>
+        </p:nvSpPr>
+        <p:spPr/>
+        <p:txBody>
+          <a:bodyPr/>
+          <a:lstStyle/>
+          <a:p>
+            <a:r>
+              <a:rPr lang="en-US" dirty="0" err="1" smtClean="0"/>
+              <a:t>Cerebro</a:t>
+            </a:r>
+            <a:r>
+              <a:rPr lang="en-US" dirty="0" smtClean="0"/>
+              <a:t> Architecture</a:t>
+            </a:r>
+            <a:endParaRPr lang="en-US" dirty="0"/>
+          </a:p>
+        </p:txBody>
+      </p:sp>
+      <p:pic>
+        <p:nvPicPr>
+          <p:cNvPr id="4" name="Content Placeholder 6" descr="cerebro_arch.png"/>
+          <p:cNvPicPr>
+            <a:picLocks noGrp="1" noChangeAspect="1"/>
+          </p:cNvPicPr>
+          <p:nvPr>
+            <p:ph idx="1"/>
+          </p:nvPr>
+        </p:nvPicPr>
+        <p:blipFill>
+          <a:blip r:embed="rId2">
+            <a:extLst>
+              <a:ext uri="{28A0092B-C50C-407E-A947-70E740481C1C}">
+                <a14:useLocalDpi xmlns:a14="http://schemas.microsoft.com/office/drawing/2010/main" val="0"/>
+              </a:ext>
+            </a:extLst>
+          </a:blip>
+          <a:srcRect l="-15284" r="-15284"/>
+          <a:stretch>
+            <a:fillRect/>
+          </a:stretch>
+        </p:blipFill>
+        <p:spPr/>
+      </p:pic>
+    </p:spTree>
+    <p:extLst>
+      <p:ext uri="{BB962C8B-B14F-4D97-AF65-F5344CB8AC3E}">
+        <p14:creationId xmlns:p14="http://schemas.microsoft.com/office/powerpoint/2010/main" val="1471479383"/>
+      </p:ext>
+    </p:extLst>
+  </p:cSld>
+  <p:clrMapOvr>
+    <a:masterClrMapping/>
+  </p:clrMapOvr>
+</p:sld>
+</file>
+
+<file path=ppt/slides/slide31.xml><?xml version="1.0" encoding="utf-8"?>
+<p:sld xmlns:a="http://schemas.openxmlformats.org/drawingml/2006/main" xmlns:r="http://schemas.openxmlformats.org/officeDocument/2006/relationships" xmlns:p="http://schemas.openxmlformats.org/presentationml/2006/main">
+  <p:cSld>
+    <p:spTree>
+      <p:nvGrpSpPr>
+        <p:cNvPr id="1" name=""/>
+        <p:cNvGrpSpPr/>
+        <p:nvPr/>
+      </p:nvGrpSpPr>
+      <p:grpSpPr>
+        <a:xfrm>
+          <a:off x="0" y="0"/>
+          <a:ext cx="0" cy="0"/>
+          <a:chOff x="0" y="0"/>
+          <a:chExt cx="0" cy="0"/>
+        </a:xfrm>
+      </p:grpSpPr>
+      <p:sp>
+        <p:nvSpPr>
+          <p:cNvPr id="2" name="Title 1"/>
+          <p:cNvSpPr>
+            <a:spLocks noGrp="1"/>
+          </p:cNvSpPr>
+          <p:nvPr>
+            <p:ph type="title"/>
+          </p:nvPr>
+        </p:nvSpPr>
+        <p:spPr/>
+        <p:txBody>
+          <a:bodyPr>
+            <a:normAutofit fontScale="90000"/>
+          </a:bodyPr>
+          <a:lstStyle/>
+          <a:p>
+            <a:r>
+              <a:rPr lang="en-US" dirty="0" smtClean="0"/>
+              <a:t>QBETS: Queue Bounds Estimation from Time Series</a:t>
+            </a:r>
+            <a:endParaRPr lang="en-US" dirty="0"/>
+          </a:p>
+        </p:txBody>
+      </p:sp>
+      <p:sp>
+        <p:nvSpPr>
+          <p:cNvPr id="3" name="Content Placeholder 2"/>
+          <p:cNvSpPr>
+            <a:spLocks noGrp="1"/>
+          </p:cNvSpPr>
+          <p:nvPr>
+            <p:ph idx="1"/>
+          </p:nvPr>
+        </p:nvSpPr>
+        <p:spPr/>
+        <p:txBody>
+          <a:bodyPr>
+            <a:normAutofit/>
+          </a:bodyPr>
+          <a:lstStyle/>
+          <a:p>
+            <a:r>
+              <a:rPr lang="en-US" dirty="0" smtClean="0"/>
+              <a:t>Analyzes the first </a:t>
+            </a:r>
+            <a:r>
+              <a:rPr lang="en-US" i="1" dirty="0" smtClean="0"/>
+              <a:t>n</a:t>
+            </a:r>
+            <a:r>
+              <a:rPr lang="en-US" dirty="0" smtClean="0"/>
+              <a:t> entries in a time series</a:t>
+            </a:r>
+          </a:p>
+          <a:p>
+            <a:r>
+              <a:rPr lang="en-US" dirty="0" smtClean="0"/>
+              <a:t>Predicts an upper bound for the </a:t>
+            </a:r>
+            <a:r>
+              <a:rPr lang="en-US" i="1" dirty="0" smtClean="0"/>
+              <a:t>(n+1)</a:t>
+            </a:r>
+            <a:r>
+              <a:rPr lang="en-US" baseline="30000" dirty="0" err="1" smtClean="0"/>
+              <a:t>th</a:t>
+            </a:r>
+            <a:r>
+              <a:rPr lang="en-US" dirty="0" smtClean="0"/>
+              <a:t> entry</a:t>
+            </a:r>
+          </a:p>
+          <a:p>
+            <a:pPr lvl="1"/>
+            <a:r>
+              <a:rPr lang="en-US" i="1" dirty="0" smtClean="0"/>
+              <a:t>QBETS([x</a:t>
+            </a:r>
+            <a:r>
+              <a:rPr lang="en-US" i="1" baseline="-25000" dirty="0" smtClean="0"/>
+              <a:t>1</a:t>
+            </a:r>
+            <a:r>
+              <a:rPr lang="en-US" i="1" dirty="0" smtClean="0"/>
+              <a:t>,x</a:t>
+            </a:r>
+            <a:r>
+              <a:rPr lang="en-US" i="1" baseline="-25000" dirty="0" smtClean="0"/>
+              <a:t>2</a:t>
+            </a:r>
+            <a:r>
+              <a:rPr lang="en-US" i="1" dirty="0" smtClean="0"/>
+              <a:t>,…</a:t>
+            </a:r>
+            <a:r>
+              <a:rPr lang="en-US" i="1" dirty="0" err="1" smtClean="0"/>
+              <a:t>x</a:t>
+            </a:r>
+            <a:r>
+              <a:rPr lang="en-US" i="1" baseline="-25000" dirty="0" err="1" smtClean="0"/>
+              <a:t>n</a:t>
+            </a:r>
+            <a:r>
+              <a:rPr lang="en-US" i="1" dirty="0" smtClean="0"/>
+              <a:t>], p) = Q</a:t>
+            </a:r>
+            <a:r>
+              <a:rPr lang="en-US" dirty="0" smtClean="0"/>
+              <a:t> where </a:t>
+            </a:r>
+            <a:r>
+              <a:rPr lang="en-US" i="1" dirty="0" smtClean="0"/>
+              <a:t>p </a:t>
+            </a:r>
+            <a:r>
+              <a:rPr lang="en-US" i="1" dirty="0" smtClean="0">
+                <a:sym typeface="Symbol"/>
+              </a:rPr>
+              <a:t> </a:t>
+            </a:r>
+            <a:r>
+              <a:rPr lang="en-US" i="1" dirty="0" smtClean="0"/>
+              <a:t>(0,1)</a:t>
+            </a:r>
+          </a:p>
+          <a:p>
+            <a:pPr lvl="1"/>
+            <a:r>
+              <a:rPr lang="en-US" i="1" dirty="0" smtClean="0"/>
+              <a:t>P(x</a:t>
+            </a:r>
+            <a:r>
+              <a:rPr lang="en-US" i="1" baseline="-25000" dirty="0" smtClean="0"/>
+              <a:t>n+1</a:t>
+            </a:r>
+            <a:r>
+              <a:rPr lang="en-US" i="1" dirty="0" smtClean="0"/>
+              <a:t> ≤ Q) ≥ p</a:t>
+            </a:r>
+          </a:p>
+          <a:p>
+            <a:r>
+              <a:rPr lang="en-US" dirty="0" smtClean="0"/>
+              <a:t>Cerebro uses QBETS to predict response time SLAs of the form:</a:t>
+            </a:r>
+          </a:p>
+          <a:p>
+            <a:pPr lvl="1"/>
+            <a:r>
+              <a:rPr lang="en-US" dirty="0" smtClean="0"/>
+              <a:t>Operation </a:t>
+            </a:r>
+            <a:r>
+              <a:rPr lang="en-US" i="1" dirty="0" smtClean="0"/>
+              <a:t>O</a:t>
+            </a:r>
+            <a:r>
+              <a:rPr lang="en-US" dirty="0" smtClean="0"/>
+              <a:t> responds </a:t>
+            </a:r>
+            <a:r>
+              <a:rPr lang="en-US" i="1" dirty="0" smtClean="0"/>
+              <a:t>under</a:t>
+            </a:r>
+            <a:r>
+              <a:rPr lang="en-US" dirty="0" smtClean="0"/>
+              <a:t> </a:t>
+            </a:r>
+            <a:r>
+              <a:rPr lang="en-US" i="1" dirty="0" smtClean="0"/>
+              <a:t>T</a:t>
+            </a:r>
+            <a:r>
+              <a:rPr lang="en-US" dirty="0" smtClean="0"/>
+              <a:t> milliseconds (100</a:t>
+            </a:r>
+            <a:r>
+              <a:rPr lang="en-US" i="1" dirty="0" smtClean="0"/>
+              <a:t>p)%</a:t>
+            </a:r>
+            <a:r>
+              <a:rPr lang="en-US" dirty="0" smtClean="0"/>
+              <a:t> of the time</a:t>
+            </a:r>
+            <a:endParaRPr lang="en-US" dirty="0"/>
+          </a:p>
+        </p:txBody>
+      </p:sp>
+      <p:sp>
+        <p:nvSpPr>
+          <p:cNvPr id="4" name="Slide Number Placeholder 3"/>
+          <p:cNvSpPr>
+            <a:spLocks noGrp="1"/>
+          </p:cNvSpPr>
+          <p:nvPr>
+            <p:ph type="sldNum" sz="quarter" idx="12"/>
+          </p:nvPr>
+        </p:nvSpPr>
+        <p:spPr/>
+        <p:txBody>
+          <a:bodyPr/>
+          <a:lstStyle/>
+          <a:p>
+            <a:fld id="{3336F440-0623-F948-B0BF-C3A0BAE2BBD0}" type="slidenum">
+              <a:rPr lang="en-US" smtClean="0"/>
+              <a:pPr/>
+              <a:t>31</a:t>
+            </a:fld>
+            <a:endParaRPr lang="en-US"/>
+          </a:p>
+        </p:txBody>
+      </p:sp>
+    </p:spTree>
+    <p:extLst>
+      <p:ext uri="{BB962C8B-B14F-4D97-AF65-F5344CB8AC3E}">
+        <p14:creationId xmlns:p14="http://schemas.microsoft.com/office/powerpoint/2010/main" val="605574221"/>
+      </p:ext>
+    </p:extLst>
+  </p:cSld>
+  <p:clrMapOvr>
+    <a:masterClrMapping/>
+  </p:clrMapOvr>
+  <p:timing>
+    <p:tnLst>
+      <p:par>
+        <p:cTn xmlns:p14="http://schemas.microsoft.com/office/powerpoint/2010/main" id="1" dur="indefinite" restart="never" nodeType="tmRoot"/>
+      </p:par>
+    </p:tnLst>
+  </p:timing>
+</p:sld>
+</file>
+
+<file path=ppt/slides/slide32.xml><?xml version="1.0" encoding="utf-8"?>
+<p:sld xmlns:a="http://schemas.openxmlformats.org/drawingml/2006/main" xmlns:r="http://schemas.openxmlformats.org/officeDocument/2006/relationships" xmlns:p="http://schemas.openxmlformats.org/presentationml/2006/main">
+  <p:cSld>
+    <p:spTree>
+      <p:nvGrpSpPr>
+        <p:cNvPr id="1" name=""/>
+        <p:cNvGrpSpPr/>
+        <p:nvPr/>
+      </p:nvGrpSpPr>
+      <p:grpSpPr>
+        <a:xfrm>
+          <a:off x="0" y="0"/>
+          <a:ext cx="0" cy="0"/>
+          <a:chOff x="0" y="0"/>
+          <a:chExt cx="0" cy="0"/>
+        </a:xfrm>
+      </p:grpSpPr>
+      <p:sp>
+        <p:nvSpPr>
+          <p:cNvPr id="2" name="Title 1"/>
+          <p:cNvSpPr>
+            <a:spLocks noGrp="1"/>
+          </p:cNvSpPr>
+          <p:nvPr>
+            <p:ph type="title"/>
+          </p:nvPr>
+        </p:nvSpPr>
+        <p:spPr/>
+        <p:txBody>
+          <a:bodyPr/>
+          <a:lstStyle/>
+          <a:p>
+            <a:r>
+              <a:rPr lang="en-US" dirty="0" smtClean="0"/>
+              <a:t>Evaluation: Prediction Correctness</a:t>
+            </a:r>
+            <a:endParaRPr lang="en-US" dirty="0"/>
+          </a:p>
+        </p:txBody>
+      </p:sp>
+      <p:pic>
+        <p:nvPicPr>
+          <p:cNvPr id="4" name="Content Placeholder 3" descr="accuracy_summary.png"/>
+          <p:cNvPicPr>
+            <a:picLocks noGrp="1" noChangeAspect="1"/>
+          </p:cNvPicPr>
+          <p:nvPr>
+            <p:ph idx="1"/>
+          </p:nvPr>
+        </p:nvPicPr>
+        <p:blipFill>
+          <a:blip r:embed="rId2">
+            <a:extLst>
+              <a:ext uri="{28A0092B-C50C-407E-A947-70E740481C1C}">
+                <a14:useLocalDpi xmlns:a14="http://schemas.microsoft.com/office/drawing/2010/main" val="0"/>
+              </a:ext>
+            </a:extLst>
+          </a:blip>
+          <a:srcRect l="-10610" r="-10610"/>
+          <a:stretch>
+            <a:fillRect/>
+          </a:stretch>
+        </p:blipFill>
+        <p:spPr>
+          <a:xfrm>
+            <a:off x="-337614" y="1308424"/>
+            <a:ext cx="9773046" cy="5374799"/>
+          </a:xfrm>
+        </p:spPr>
+      </p:pic>
+      <p:sp>
+        <p:nvSpPr>
+          <p:cNvPr id="3" name="Slide Number Placeholder 2"/>
+          <p:cNvSpPr>
+            <a:spLocks noGrp="1"/>
+          </p:cNvSpPr>
+          <p:nvPr>
+            <p:ph type="sldNum" sz="quarter" idx="12"/>
+          </p:nvPr>
+        </p:nvSpPr>
+        <p:spPr/>
+        <p:txBody>
+          <a:bodyPr/>
+          <a:lstStyle/>
+          <a:p>
+            <a:fld id="{3336F440-0623-F948-B0BF-C3A0BAE2BBD0}" type="slidenum">
+              <a:rPr lang="en-US" smtClean="0"/>
+              <a:pPr/>
+              <a:t>32</a:t>
+            </a:fld>
+            <a:endParaRPr lang="en-US"/>
+          </a:p>
+        </p:txBody>
+      </p:sp>
+      <p:cxnSp>
+        <p:nvCxnSpPr>
+          <p:cNvPr id="6" name="Straight Connector 5"/>
+          <p:cNvCxnSpPr/>
+          <p:nvPr/>
+        </p:nvCxnSpPr>
+        <p:spPr>
+          <a:xfrm>
+            <a:off x="1295747" y="3360853"/>
+            <a:ext cx="7197172" cy="0"/>
+          </a:xfrm>
+          <a:prstGeom prst="line">
+            <a:avLst/>
+          </a:prstGeom>
+          <a:ln>
+            <a:solidFill>
+              <a:srgbClr val="008000"/>
+            </a:solidFill>
+          </a:ln>
+        </p:spPr>
+        <p:style>
+          <a:lnRef idx="2">
+            <a:schemeClr val="accent1"/>
+          </a:lnRef>
+          <a:fillRef idx="0">
+            <a:schemeClr val="accent1"/>
+          </a:fillRef>
+          <a:effectRef idx="1">
+            <a:schemeClr val="accent1"/>
+          </a:effectRef>
+          <a:fontRef idx="minor">
+            <a:schemeClr val="tx1"/>
+          </a:fontRef>
+        </p:style>
+      </p:cxnSp>
+      <p:sp>
+        <p:nvSpPr>
+          <p:cNvPr id="7" name="Rectangle 6"/>
+          <p:cNvSpPr/>
+          <p:nvPr/>
+        </p:nvSpPr>
+        <p:spPr>
+          <a:xfrm>
+            <a:off x="923701" y="3181265"/>
+            <a:ext cx="362902" cy="359175"/>
+          </a:xfrm>
+          <a:prstGeom prst="rect">
+            <a:avLst/>
+          </a:prstGeom>
+          <a:noFill/>
+          <a:ln w="38100" cmpd="sng">
+            <a:solidFill>
+              <a:srgbClr val="008000"/>
+            </a:solidFill>
+          </a:ln>
+        </p:spPr>
+        <p:style>
+          <a:lnRef idx="1">
+            <a:schemeClr val="accent1"/>
+          </a:lnRef>
+          <a:fillRef idx="3">
+            <a:schemeClr val="accent1"/>
+          </a:fillRef>
+          <a:effectRef idx="2">
+            <a:schemeClr val="accent1"/>
+          </a:effectRef>
+          <a:fontRef idx="minor">
+            <a:schemeClr val="lt1"/>
+          </a:fontRef>
+        </p:style>
+        <p:txBody>
+          <a:bodyPr rtlCol="0" anchor="ctr"/>
+          <a:lstStyle/>
+          <a:p>
+            <a:pPr algn="ctr"/>
+            <a:endParaRPr lang="en-US">
+              <a:ln w="19050" cmpd="sng">
+                <a:solidFill>
+                  <a:srgbClr val="000000"/>
+                </a:solidFill>
+              </a:ln>
+            </a:endParaRPr>
+          </a:p>
+        </p:txBody>
+      </p:sp>
+    </p:spTree>
+    <p:extLst>
+      <p:ext uri="{BB962C8B-B14F-4D97-AF65-F5344CB8AC3E}">
+        <p14:creationId xmlns:p14="http://schemas.microsoft.com/office/powerpoint/2010/main" val="4225125614"/>
+      </p:ext>
+    </p:extLst>
+  </p:cSld>
+  <p:clrMapOvr>
+    <a:masterClrMapping/>
+  </p:clrMapOvr>
+  <p:timing>
+    <p:tnLst>
+      <p:par>
+        <p:cTn xmlns:p14="http://schemas.microsoft.com/office/powerpoint/2010/main" id="1" dur="indefinite" restart="never" nodeType="tmRoot"/>
+      </p:par>
+    </p:tnLst>
+  </p:timing>
+</p:sld>
+</file>
+
+<file path=ppt/slides/slide33.xml><?xml version="1.0" encoding="utf-8"?>
+<p:sld xmlns:a="http://schemas.openxmlformats.org/drawingml/2006/main" xmlns:r="http://schemas.openxmlformats.org/officeDocument/2006/relationships" xmlns:p="http://schemas.openxmlformats.org/presentationml/2006/main">
+  <p:cSld>
+    <p:spTree>
+      <p:nvGrpSpPr>
+        <p:cNvPr id="1" name=""/>
+        <p:cNvGrpSpPr/>
+        <p:nvPr/>
+      </p:nvGrpSpPr>
+      <p:grpSpPr>
+        <a:xfrm>
+          <a:off x="0" y="0"/>
+          <a:ext cx="0" cy="0"/>
+          <a:chOff x="0" y="0"/>
+          <a:chExt cx="0" cy="0"/>
+        </a:xfrm>
+      </p:grpSpPr>
+      <p:sp>
+        <p:nvSpPr>
+          <p:cNvPr id="2" name="Title 1"/>
+          <p:cNvSpPr>
+            <a:spLocks noGrp="1"/>
+          </p:cNvSpPr>
+          <p:nvPr>
+            <p:ph type="title"/>
+          </p:nvPr>
+        </p:nvSpPr>
+        <p:spPr/>
+        <p:txBody>
+          <a:bodyPr/>
+          <a:lstStyle/>
+          <a:p>
+            <a:r>
+              <a:rPr lang="en-US" dirty="0" smtClean="0"/>
+              <a:t>Evaluation: Prediction Tightness </a:t>
+            </a:r>
+            <a:endParaRPr lang="en-US" dirty="0"/>
+          </a:p>
+        </p:txBody>
+      </p:sp>
+      <p:pic>
+        <p:nvPicPr>
+          <p:cNvPr id="4" name="Content Placeholder 3" descr="diff_summary.png"/>
+          <p:cNvPicPr>
+            <a:picLocks noGrp="1" noChangeAspect="1"/>
+          </p:cNvPicPr>
+          <p:nvPr>
+            <p:ph idx="1"/>
+          </p:nvPr>
+        </p:nvPicPr>
+        <p:blipFill>
+          <a:blip r:embed="rId2">
+            <a:extLst>
+              <a:ext uri="{28A0092B-C50C-407E-A947-70E740481C1C}">
+                <a14:useLocalDpi xmlns:a14="http://schemas.microsoft.com/office/drawing/2010/main" val="0"/>
+              </a:ext>
+            </a:extLst>
+          </a:blip>
+          <a:srcRect l="-10678" r="-10678"/>
+          <a:stretch>
+            <a:fillRect/>
+          </a:stretch>
+        </p:blipFill>
+        <p:spPr>
+          <a:xfrm>
+            <a:off x="-406425" y="1283494"/>
+            <a:ext cx="9771727" cy="5374073"/>
+          </a:xfrm>
+        </p:spPr>
+      </p:pic>
+      <p:sp>
+        <p:nvSpPr>
+          <p:cNvPr id="3" name="Slide Number Placeholder 2"/>
+          <p:cNvSpPr>
+            <a:spLocks noGrp="1"/>
+          </p:cNvSpPr>
+          <p:nvPr>
+            <p:ph type="sldNum" sz="quarter" idx="12"/>
+          </p:nvPr>
+        </p:nvSpPr>
+        <p:spPr/>
+        <p:txBody>
+          <a:bodyPr/>
+          <a:lstStyle/>
+          <a:p>
+            <a:fld id="{3336F440-0623-F948-B0BF-C3A0BAE2BBD0}" type="slidenum">
+              <a:rPr lang="en-US" smtClean="0"/>
+              <a:pPr/>
+              <a:t>33</a:t>
+            </a:fld>
+            <a:endParaRPr lang="en-US"/>
+          </a:p>
+        </p:txBody>
+      </p:sp>
+    </p:spTree>
+    <p:extLst>
+      <p:ext uri="{BB962C8B-B14F-4D97-AF65-F5344CB8AC3E}">
+        <p14:creationId xmlns:p14="http://schemas.microsoft.com/office/powerpoint/2010/main" val="419381492"/>
+      </p:ext>
+    </p:extLst>
+  </p:cSld>
+  <p:clrMapOvr>
+    <a:masterClrMapping/>
+  </p:clrMapOvr>
+  <p:timing>
+    <p:tnLst>
+      <p:par>
+        <p:cTn xmlns:p14="http://schemas.microsoft.com/office/powerpoint/2010/main" id="1" dur="indefinite" restart="never" nodeType="tmRoot"/>
+      </p:par>
+    </p:tnLst>
+  </p:timing>
+</p:sld>
+</file>
+
+<file path=ppt/slides/slide34.xml><?xml version="1.0" encoding="utf-8"?>
+<p:sld xmlns:a="http://schemas.openxmlformats.org/drawingml/2006/main" xmlns:r="http://schemas.openxmlformats.org/officeDocument/2006/relationships" xmlns:p="http://schemas.openxmlformats.org/presentationml/2006/main">
+  <p:cSld>
+    <p:spTree>
+      <p:nvGrpSpPr>
+        <p:cNvPr id="1" name=""/>
+        <p:cNvGrpSpPr/>
+        <p:nvPr/>
+      </p:nvGrpSpPr>
+      <p:grpSpPr>
+        <a:xfrm>
+          <a:off x="0" y="0"/>
+          <a:ext cx="0" cy="0"/>
+          <a:chOff x="0" y="0"/>
+          <a:chExt cx="0" cy="0"/>
+        </a:xfrm>
+      </p:grpSpPr>
+      <p:sp>
+        <p:nvSpPr>
+          <p:cNvPr id="2" name="Title 1"/>
+          <p:cNvSpPr>
+            <a:spLocks noGrp="1"/>
+          </p:cNvSpPr>
+          <p:nvPr>
+            <p:ph type="title"/>
+          </p:nvPr>
+        </p:nvSpPr>
+        <p:spPr/>
+        <p:txBody>
+          <a:bodyPr/>
+          <a:lstStyle/>
+          <a:p>
+            <a:r>
+              <a:rPr lang="en-US" dirty="0" smtClean="0"/>
+              <a:t>SLA Durability: An </a:t>
+            </a:r>
+            <a:r>
+              <a:rPr lang="en-US" dirty="0" smtClean="0"/>
+              <a:t>Example</a:t>
+            </a:r>
+            <a:endParaRPr lang="en-US" dirty="0"/>
+          </a:p>
+        </p:txBody>
+      </p:sp>
+      <p:sp>
+        <p:nvSpPr>
+          <p:cNvPr id="3" name="Content Placeholder 2"/>
+          <p:cNvSpPr>
+            <a:spLocks noGrp="1"/>
+          </p:cNvSpPr>
+          <p:nvPr>
+            <p:ph idx="1"/>
+          </p:nvPr>
+        </p:nvSpPr>
+        <p:spPr/>
+        <p:txBody>
+          <a:bodyPr>
+            <a:normAutofit lnSpcReduction="10000"/>
+          </a:bodyPr>
+          <a:lstStyle/>
+          <a:p>
+            <a:r>
+              <a:rPr lang="en-US" dirty="0" smtClean="0"/>
+              <a:t>Suppose Cerebro predicts that some API responds under 100ms, 95% of the time.</a:t>
+            </a:r>
+          </a:p>
+          <a:p>
+            <a:pPr lvl="1"/>
+            <a:r>
+              <a:rPr lang="en-US" dirty="0" smtClean="0"/>
+              <a:t>Probability of API response time exceeding 100ms is (1 – 0.01 * 95) = 0.05</a:t>
+            </a:r>
+          </a:p>
+          <a:p>
+            <a:pPr lvl="1"/>
+            <a:r>
+              <a:rPr lang="en-US" dirty="0" smtClean="0"/>
+              <a:t>Probability of observing 3 consecutive such readings is 0.05</a:t>
+            </a:r>
+            <a:r>
+              <a:rPr lang="en-US" baseline="30000" dirty="0" smtClean="0"/>
+              <a:t>3 </a:t>
+            </a:r>
+            <a:r>
+              <a:rPr lang="en-US" dirty="0" smtClean="0"/>
+              <a:t>= 0.000125</a:t>
+            </a:r>
+          </a:p>
+          <a:p>
+            <a:r>
+              <a:rPr lang="en-US" dirty="0" smtClean="0"/>
+              <a:t>This value 3 is conservative with regard to autocorrelation</a:t>
+            </a:r>
+          </a:p>
+          <a:p>
+            <a:pPr lvl="1"/>
+            <a:r>
+              <a:rPr lang="en-US" dirty="0" smtClean="0"/>
+              <a:t>E.g. To get the same small value 0.000125 with 0.5 autocorrelation, we need to observe 5 events</a:t>
+            </a:r>
+          </a:p>
+        </p:txBody>
+      </p:sp>
+      <p:sp>
+        <p:nvSpPr>
+          <p:cNvPr id="4" name="Slide Number Placeholder 3"/>
+          <p:cNvSpPr>
+            <a:spLocks noGrp="1"/>
+          </p:cNvSpPr>
+          <p:nvPr>
+            <p:ph type="sldNum" sz="quarter" idx="12"/>
+          </p:nvPr>
+        </p:nvSpPr>
+        <p:spPr/>
+        <p:txBody>
+          <a:bodyPr/>
+          <a:lstStyle/>
+          <a:p>
+            <a:fld id="{4940F666-E5FA-274D-B0C1-53A0010BDC84}" type="slidenum">
+              <a:rPr lang="en-US" smtClean="0"/>
+              <a:t>34</a:t>
+            </a:fld>
+            <a:endParaRPr lang="en-US"/>
+          </a:p>
+        </p:txBody>
+      </p:sp>
+    </p:spTree>
+    <p:extLst>
+      <p:ext uri="{BB962C8B-B14F-4D97-AF65-F5344CB8AC3E}">
+        <p14:creationId xmlns:p14="http://schemas.microsoft.com/office/powerpoint/2010/main" val="2582674383"/>
+      </p:ext>
+    </p:extLst>
+  </p:cSld>
+  <p:clrMapOvr>
+    <a:masterClrMapping/>
+  </p:clrMapOvr>
+  <p:timing>
+    <p:tnLst>
+      <p:par>
+        <p:cTn xmlns:p14="http://schemas.microsoft.com/office/powerpoint/2010/main" id="1" dur="indefinite" restart="never" nodeType="tmRoot"/>
+      </p:par>
+    </p:tnLst>
+  </p:timing>
+</p:sld>
+</file>
+
+<file path=ppt/slides/slide35.xml><?xml version="1.0" encoding="utf-8"?>
+<p:sld xmlns:a="http://schemas.openxmlformats.org/drawingml/2006/main" xmlns:r="http://schemas.openxmlformats.org/officeDocument/2006/relationships" xmlns:p="http://schemas.openxmlformats.org/presentationml/2006/main">
+  <p:cSld>
+    <p:spTree>
+      <p:nvGrpSpPr>
+        <p:cNvPr id="1" name=""/>
+        <p:cNvGrpSpPr/>
+        <p:nvPr/>
+      </p:nvGrpSpPr>
+      <p:grpSpPr>
+        <a:xfrm>
+          <a:off x="0" y="0"/>
+          <a:ext cx="0" cy="0"/>
+          <a:chOff x="0" y="0"/>
+          <a:chExt cx="0" cy="0"/>
+        </a:xfrm>
+      </p:grpSpPr>
+      <p:sp>
+        <p:nvSpPr>
+          <p:cNvPr id="2" name="Title 1"/>
+          <p:cNvSpPr>
+            <a:spLocks noGrp="1"/>
+          </p:cNvSpPr>
+          <p:nvPr>
+            <p:ph type="title"/>
+          </p:nvPr>
+        </p:nvSpPr>
+        <p:spPr/>
+        <p:txBody>
+          <a:bodyPr/>
+          <a:lstStyle/>
+          <a:p>
+            <a:r>
+              <a:rPr lang="en-US" dirty="0" smtClean="0"/>
+              <a:t>Detecting SLA Invalidation</a:t>
+            </a:r>
+            <a:endParaRPr lang="en-US" dirty="0"/>
+          </a:p>
+        </p:txBody>
+      </p:sp>
+      <p:sp>
+        <p:nvSpPr>
+          <p:cNvPr id="3" name="Content Placeholder 2"/>
+          <p:cNvSpPr>
+            <a:spLocks noGrp="1"/>
+          </p:cNvSpPr>
+          <p:nvPr>
+            <p:ph idx="1"/>
+          </p:nvPr>
+        </p:nvSpPr>
+        <p:spPr/>
+        <p:txBody>
+          <a:bodyPr>
+            <a:normAutofit lnSpcReduction="10000"/>
+          </a:bodyPr>
+          <a:lstStyle/>
+          <a:p>
+            <a:r>
+              <a:rPr lang="en-US" dirty="0" smtClean="0"/>
+              <a:t>Each time Cerebro makes a prediction, it computes the current autocorrelation in the time series</a:t>
+            </a:r>
+          </a:p>
+          <a:p>
+            <a:r>
+              <a:rPr lang="en-US" dirty="0" smtClean="0"/>
+              <a:t>Autocorrelation can be used to lookup a table, and determine </a:t>
+            </a:r>
+            <a:r>
+              <a:rPr lang="en-US" i="1" dirty="0" err="1" smtClean="0"/>
+              <a:t>C</a:t>
+            </a:r>
+            <a:r>
+              <a:rPr lang="en-US" i="1" baseline="-25000" dirty="0" err="1" smtClean="0"/>
+              <a:t>w</a:t>
+            </a:r>
+            <a:r>
+              <a:rPr lang="en-US" dirty="0"/>
+              <a:t>;</a:t>
+            </a:r>
+            <a:r>
+              <a:rPr lang="en-US" dirty="0" smtClean="0"/>
+              <a:t> the number of consecutive readings greater than </a:t>
+            </a:r>
+            <a:r>
+              <a:rPr lang="en-US" i="1" dirty="0" smtClean="0"/>
+              <a:t>Q</a:t>
+            </a:r>
+            <a:r>
+              <a:rPr lang="en-US" dirty="0" smtClean="0"/>
+              <a:t>, that constitute a rare event</a:t>
+            </a:r>
+          </a:p>
+          <a:p>
+            <a:r>
+              <a:rPr lang="en-US" dirty="0" smtClean="0"/>
+              <a:t>We consider the SLA to have become invalid if this rare event occurs</a:t>
+            </a:r>
+          </a:p>
+          <a:p>
+            <a:endParaRPr lang="en-US" dirty="0"/>
+          </a:p>
+        </p:txBody>
+      </p:sp>
+      <p:sp>
+        <p:nvSpPr>
+          <p:cNvPr id="4" name="Slide Number Placeholder 3"/>
+          <p:cNvSpPr>
+            <a:spLocks noGrp="1"/>
+          </p:cNvSpPr>
+          <p:nvPr>
+            <p:ph type="sldNum" sz="quarter" idx="12"/>
+          </p:nvPr>
+        </p:nvSpPr>
+        <p:spPr/>
+        <p:txBody>
+          <a:bodyPr/>
+          <a:lstStyle/>
+          <a:p>
+            <a:fld id="{4940F666-E5FA-274D-B0C1-53A0010BDC84}" type="slidenum">
+              <a:rPr lang="en-US" smtClean="0"/>
+              <a:t>35</a:t>
+            </a:fld>
+            <a:endParaRPr lang="en-US"/>
+          </a:p>
+        </p:txBody>
+      </p:sp>
+    </p:spTree>
+    <p:extLst>
+      <p:ext uri="{BB962C8B-B14F-4D97-AF65-F5344CB8AC3E}">
+        <p14:creationId xmlns:p14="http://schemas.microsoft.com/office/powerpoint/2010/main" val="2880975851"/>
+      </p:ext>
+    </p:extLst>
+  </p:cSld>
+  <p:clrMapOvr>
+    <a:masterClrMapping/>
+  </p:clrMapOvr>
+  <p:timing>
+    <p:tnLst>
+      <p:par>
+        <p:cTn xmlns:p14="http://schemas.microsoft.com/office/powerpoint/2010/main" id="1" dur="indefinite" restart="never" nodeType="tmRoot"/>
+      </p:par>
+    </p:tnLst>
+  </p:timing>
+</p:sld>
+</file>
+
+<file path=ppt/slides/slide36.xml><?xml version="1.0" encoding="utf-8"?>
+<p:sld xmlns:a="http://schemas.openxmlformats.org/drawingml/2006/main" xmlns:r="http://schemas.openxmlformats.org/officeDocument/2006/relationships" xmlns:p="http://schemas.openxmlformats.org/presentationml/2006/main">
+  <p:cSld>
+    <p:spTree>
+      <p:nvGrpSpPr>
+        <p:cNvPr id="1" name=""/>
+        <p:cNvGrpSpPr/>
+        <p:nvPr/>
+      </p:nvGrpSpPr>
+      <p:grpSpPr>
+        <a:xfrm>
+          <a:off x="0" y="0"/>
+          <a:ext cx="0" cy="0"/>
+          <a:chOff x="0" y="0"/>
+          <a:chExt cx="0" cy="0"/>
+        </a:xfrm>
+      </p:grpSpPr>
+      <p:sp>
+        <p:nvSpPr>
+          <p:cNvPr id="2" name="Title 1"/>
+          <p:cNvSpPr>
+            <a:spLocks noGrp="1"/>
+          </p:cNvSpPr>
+          <p:nvPr>
+            <p:ph type="title"/>
+          </p:nvPr>
+        </p:nvSpPr>
+        <p:spPr/>
+        <p:txBody>
+          <a:bodyPr/>
+          <a:lstStyle/>
+          <a:p>
+            <a:r>
+              <a:rPr lang="en-US" dirty="0" smtClean="0"/>
+              <a:t>SLA Validity Periods (In Hours)</a:t>
+            </a:r>
+            <a:endParaRPr lang="en-US" dirty="0"/>
+          </a:p>
+        </p:txBody>
+      </p:sp>
+      <p:graphicFrame>
+        <p:nvGraphicFramePr>
+          <p:cNvPr id="4" name="Content Placeholder 3"/>
+          <p:cNvGraphicFramePr>
+            <a:graphicFrameLocks noGrp="1"/>
+          </p:cNvGraphicFramePr>
+          <p:nvPr>
+            <p:ph idx="1"/>
+            <p:extLst>
+              <p:ext uri="{D42A27DB-BD31-4B8C-83A1-F6EECF244321}">
+                <p14:modId xmlns:p14="http://schemas.microsoft.com/office/powerpoint/2010/main" val="3688840244"/>
+              </p:ext>
+            </p:extLst>
+          </p:nvPr>
+        </p:nvGraphicFramePr>
+        <p:xfrm>
+          <a:off x="457200" y="1600200"/>
+          <a:ext cx="8229600" cy="2595880"/>
+        </p:xfrm>
+        <a:graphic>
+          <a:graphicData uri="http://schemas.openxmlformats.org/drawingml/2006/table">
+            <a:tbl>
+              <a:tblPr firstRow="1" bandRow="1">
+                <a:tableStyleId>{5C22544A-7EE6-4342-B048-85BDC9FD1C3A}</a:tableStyleId>
+              </a:tblPr>
+              <a:tblGrid>
+                <a:gridCol w="2624973"/>
+                <a:gridCol w="1918090"/>
+                <a:gridCol w="1878406"/>
+                <a:gridCol w="1808131"/>
+              </a:tblGrid>
+              <a:tr h="370840">
+                <a:tc>
+                  <a:txBody>
+                    <a:bodyPr/>
+                    <a:lstStyle/>
+                    <a:p>
+                      <a:pPr algn="ctr"/>
+                      <a:r>
+                        <a:rPr lang="en-US" dirty="0" smtClean="0"/>
+                        <a:t>API</a:t>
+                      </a:r>
+                      <a:endParaRPr lang="en-US" dirty="0"/>
+                    </a:p>
+                  </a:txBody>
+                  <a:tcPr/>
+                </a:tc>
+                <a:tc>
+                  <a:txBody>
+                    <a:bodyPr/>
+                    <a:lstStyle/>
+                    <a:p>
+                      <a:pPr algn="ctr"/>
+                      <a:r>
+                        <a:rPr lang="en-US" dirty="0" smtClean="0"/>
+                        <a:t>5</a:t>
+                      </a:r>
+                      <a:r>
+                        <a:rPr lang="en-US" baseline="30000" dirty="0" smtClean="0"/>
+                        <a:t>th</a:t>
+                      </a:r>
+                      <a:r>
+                        <a:rPr lang="en-US" dirty="0" smtClean="0"/>
+                        <a:t> Percentile</a:t>
+                      </a:r>
+                      <a:endParaRPr lang="en-US" dirty="0"/>
+                    </a:p>
+                  </a:txBody>
+                  <a:tcPr/>
+                </a:tc>
+                <a:tc>
+                  <a:txBody>
+                    <a:bodyPr/>
+                    <a:lstStyle/>
+                    <a:p>
+                      <a:pPr algn="ctr"/>
+                      <a:r>
+                        <a:rPr lang="en-US" dirty="0" smtClean="0"/>
+                        <a:t>Mean</a:t>
+                      </a:r>
+                      <a:endParaRPr lang="en-US" dirty="0"/>
+                    </a:p>
+                  </a:txBody>
+                  <a:tcPr/>
+                </a:tc>
+                <a:tc>
+                  <a:txBody>
+                    <a:bodyPr/>
+                    <a:lstStyle/>
+                    <a:p>
+                      <a:pPr algn="ctr"/>
+                      <a:r>
+                        <a:rPr lang="en-US" dirty="0" smtClean="0"/>
+                        <a:t>95</a:t>
+                      </a:r>
+                      <a:r>
+                        <a:rPr lang="en-US" baseline="30000" dirty="0" smtClean="0"/>
+                        <a:t>th</a:t>
+                      </a:r>
+                      <a:r>
+                        <a:rPr lang="en-US" dirty="0" smtClean="0"/>
+                        <a:t> Percentile</a:t>
+                      </a:r>
+                      <a:endParaRPr lang="en-US" dirty="0"/>
+                    </a:p>
+                  </a:txBody>
+                  <a:tcPr/>
+                </a:tc>
+              </a:tr>
+              <a:tr h="370840">
+                <a:tc>
+                  <a:txBody>
+                    <a:bodyPr/>
+                    <a:lstStyle/>
+                    <a:p>
+                      <a:pPr algn="l" fontAlgn="b"/>
+                      <a:r>
+                        <a:rPr lang="en-US" sz="1800" b="0" i="0" u="none" strike="noStrike" dirty="0" err="1">
+                          <a:solidFill>
+                            <a:srgbClr val="000000"/>
+                          </a:solidFill>
+                          <a:effectLst/>
+                          <a:latin typeface="Calibri"/>
+                        </a:rPr>
+                        <a:t>StudentInfo#getStudent</a:t>
+                      </a:r>
+                      <a:endParaRPr lang="en-US" sz="1800" b="0" i="0" u="none" strike="noStrike" dirty="0">
+                        <a:solidFill>
+                          <a:srgbClr val="000000"/>
+                        </a:solidFill>
+                        <a:effectLst/>
+                        <a:latin typeface="Calibri"/>
+                      </a:endParaRPr>
+                    </a:p>
+                  </a:txBody>
+                  <a:tcPr marL="12700" marR="12700" marT="12700" marB="0" anchor="b"/>
+                </a:tc>
+                <a:tc>
+                  <a:txBody>
+                    <a:bodyPr/>
+                    <a:lstStyle/>
+                    <a:p>
+                      <a:pPr algn="r" fontAlgn="b"/>
+                      <a:r>
+                        <a:rPr lang="en-US" sz="1800" b="0" i="0" u="none" strike="noStrike" dirty="0">
+                          <a:solidFill>
+                            <a:srgbClr val="000000"/>
+                          </a:solidFill>
+                          <a:effectLst/>
+                          <a:latin typeface="Calibri"/>
+                        </a:rPr>
+                        <a:t>12.97</a:t>
+                      </a:r>
+                    </a:p>
+                  </a:txBody>
+                  <a:tcPr marL="12700" marR="12700" marT="12700" marB="0" anchor="b"/>
+                </a:tc>
+                <a:tc>
+                  <a:txBody>
+                    <a:bodyPr/>
+                    <a:lstStyle/>
+                    <a:p>
+                      <a:pPr algn="r" fontAlgn="b"/>
+                      <a:r>
+                        <a:rPr lang="en-US" sz="1800" b="0" i="0" u="none" strike="noStrike" dirty="0">
+                          <a:solidFill>
+                            <a:srgbClr val="000000"/>
+                          </a:solidFill>
+                          <a:effectLst/>
+                          <a:latin typeface="Calibri"/>
+                        </a:rPr>
+                        <a:t>631.24</a:t>
+                      </a:r>
+                    </a:p>
+                  </a:txBody>
+                  <a:tcPr marL="12700" marR="12700" marT="12700" marB="0" anchor="b"/>
+                </a:tc>
+                <a:tc>
+                  <a:txBody>
+                    <a:bodyPr/>
+                    <a:lstStyle/>
+                    <a:p>
+                      <a:pPr algn="r" fontAlgn="b"/>
+                      <a:r>
+                        <a:rPr lang="en-US" sz="1800" b="0" i="0" u="none" strike="noStrike" dirty="0">
+                          <a:solidFill>
+                            <a:srgbClr val="000000"/>
+                          </a:solidFill>
+                          <a:effectLst/>
+                          <a:latin typeface="Calibri"/>
+                        </a:rPr>
+                        <a:t>1911.19</a:t>
+                      </a:r>
+                    </a:p>
+                  </a:txBody>
+                  <a:tcPr marL="12700" marR="12700" marT="12700" marB="0" anchor="b"/>
+                </a:tc>
+              </a:tr>
+              <a:tr h="370840">
+                <a:tc>
+                  <a:txBody>
+                    <a:bodyPr/>
+                    <a:lstStyle/>
+                    <a:p>
+                      <a:pPr algn="l" fontAlgn="b"/>
+                      <a:r>
+                        <a:rPr lang="en-US" sz="1800" b="0" i="0" u="none" strike="noStrike" dirty="0" err="1">
+                          <a:solidFill>
+                            <a:srgbClr val="000000"/>
+                          </a:solidFill>
+                          <a:effectLst/>
+                          <a:latin typeface="Calibri"/>
+                        </a:rPr>
+                        <a:t>StudentInfo#deleteStudent</a:t>
+                      </a:r>
+                      <a:endParaRPr lang="en-US" sz="1800" b="0" i="0" u="none" strike="noStrike" dirty="0">
+                        <a:solidFill>
+                          <a:srgbClr val="000000"/>
+                        </a:solidFill>
+                        <a:effectLst/>
+                        <a:latin typeface="Calibri"/>
+                      </a:endParaRPr>
+                    </a:p>
+                  </a:txBody>
+                  <a:tcPr marL="12700" marR="12700" marT="12700" marB="0" anchor="b"/>
+                </a:tc>
+                <a:tc>
+                  <a:txBody>
+                    <a:bodyPr/>
+                    <a:lstStyle/>
+                    <a:p>
+                      <a:pPr algn="r" fontAlgn="b"/>
+                      <a:r>
+                        <a:rPr lang="en-US" sz="1800" b="0" i="0" u="none" strike="noStrike" dirty="0">
+                          <a:solidFill>
+                            <a:srgbClr val="000000"/>
+                          </a:solidFill>
+                          <a:effectLst/>
+                          <a:latin typeface="Calibri"/>
+                        </a:rPr>
+                        <a:t>7.65</a:t>
+                      </a:r>
+                    </a:p>
+                  </a:txBody>
+                  <a:tcPr marL="12700" marR="12700" marT="12700" marB="0" anchor="b"/>
+                </a:tc>
+                <a:tc>
+                  <a:txBody>
+                    <a:bodyPr/>
+                    <a:lstStyle/>
+                    <a:p>
+                      <a:pPr algn="r" fontAlgn="b"/>
+                      <a:r>
+                        <a:rPr lang="en-US" sz="1800" b="0" i="0" u="none" strike="noStrike">
+                          <a:solidFill>
+                            <a:srgbClr val="000000"/>
+                          </a:solidFill>
+                          <a:effectLst/>
+                          <a:latin typeface="Calibri"/>
+                        </a:rPr>
+                        <a:t>472.07</a:t>
+                      </a:r>
+                    </a:p>
+                  </a:txBody>
+                  <a:tcPr marL="12700" marR="12700" marT="12700" marB="0" anchor="b"/>
+                </a:tc>
+                <a:tc>
+                  <a:txBody>
+                    <a:bodyPr/>
+                    <a:lstStyle/>
+                    <a:p>
+                      <a:pPr algn="r" fontAlgn="b"/>
+                      <a:r>
+                        <a:rPr lang="en-US" sz="1800" b="0" i="0" u="none" strike="noStrike">
+                          <a:solidFill>
+                            <a:srgbClr val="000000"/>
+                          </a:solidFill>
+                          <a:effectLst/>
+                          <a:latin typeface="Calibri"/>
+                        </a:rPr>
+                        <a:t>2031.59</a:t>
+                      </a:r>
+                    </a:p>
+                  </a:txBody>
+                  <a:tcPr marL="12700" marR="12700" marT="12700" marB="0" anchor="b"/>
+                </a:tc>
+              </a:tr>
+              <a:tr h="370840">
+                <a:tc>
+                  <a:txBody>
+                    <a:bodyPr/>
+                    <a:lstStyle/>
+                    <a:p>
+                      <a:pPr algn="l" fontAlgn="b"/>
+                      <a:r>
+                        <a:rPr lang="en-US" sz="1800" b="0" i="0" u="none" strike="noStrike" dirty="0" err="1">
+                          <a:solidFill>
+                            <a:srgbClr val="000000"/>
+                          </a:solidFill>
+                          <a:effectLst/>
+                          <a:latin typeface="Calibri"/>
+                        </a:rPr>
+                        <a:t>ServerHealth#info</a:t>
+                      </a:r>
+                      <a:endParaRPr lang="en-US" sz="1800" b="0" i="0" u="none" strike="noStrike" dirty="0">
+                        <a:solidFill>
+                          <a:srgbClr val="000000"/>
+                        </a:solidFill>
+                        <a:effectLst/>
+                        <a:latin typeface="Calibri"/>
+                      </a:endParaRPr>
+                    </a:p>
+                  </a:txBody>
+                  <a:tcPr marL="12700" marR="12700" marT="12700" marB="0" anchor="b"/>
+                </a:tc>
+                <a:tc>
+                  <a:txBody>
+                    <a:bodyPr/>
+                    <a:lstStyle/>
+                    <a:p>
+                      <a:pPr algn="r" fontAlgn="b"/>
+                      <a:r>
+                        <a:rPr lang="en-US" sz="1800" b="0" i="0" u="none" strike="noStrike" dirty="0">
+                          <a:solidFill>
+                            <a:srgbClr val="000000"/>
+                          </a:solidFill>
+                          <a:effectLst/>
+                          <a:latin typeface="Calibri"/>
+                        </a:rPr>
+                        <a:t>12.96</a:t>
+                      </a:r>
+                    </a:p>
+                  </a:txBody>
+                  <a:tcPr marL="12700" marR="12700" marT="12700" marB="0" anchor="b"/>
+                </a:tc>
+                <a:tc>
+                  <a:txBody>
+                    <a:bodyPr/>
+                    <a:lstStyle/>
+                    <a:p>
+                      <a:pPr algn="r" fontAlgn="b"/>
+                      <a:r>
+                        <a:rPr lang="en-US" sz="1800" b="0" i="0" u="none" strike="noStrike" dirty="0">
+                          <a:solidFill>
+                            <a:srgbClr val="000000"/>
+                          </a:solidFill>
+                          <a:effectLst/>
+                          <a:latin typeface="Calibri"/>
+                        </a:rPr>
+                        <a:t>630.01</a:t>
+                      </a:r>
+                    </a:p>
+                  </a:txBody>
+                  <a:tcPr marL="12700" marR="12700" marT="12700" marB="0" anchor="b"/>
+                </a:tc>
+                <a:tc>
+                  <a:txBody>
+                    <a:bodyPr/>
+                    <a:lstStyle/>
+                    <a:p>
+                      <a:pPr algn="r" fontAlgn="b"/>
+                      <a:r>
+                        <a:rPr lang="en-US" sz="1800" b="0" i="0" u="none" strike="noStrike">
+                          <a:solidFill>
+                            <a:srgbClr val="000000"/>
+                          </a:solidFill>
+                          <a:effectLst/>
+                          <a:latin typeface="Calibri"/>
+                        </a:rPr>
+                        <a:t>1911.19</a:t>
+                      </a:r>
+                    </a:p>
+                  </a:txBody>
+                  <a:tcPr marL="12700" marR="12700" marT="12700" marB="0" anchor="b"/>
+                </a:tc>
+              </a:tr>
+              <a:tr h="370840">
+                <a:tc>
+                  <a:txBody>
+                    <a:bodyPr/>
+                    <a:lstStyle/>
+                    <a:p>
+                      <a:pPr algn="l" fontAlgn="b"/>
+                      <a:r>
+                        <a:rPr lang="en-US" sz="1800" b="0" i="0" u="none" strike="noStrike">
+                          <a:solidFill>
+                            <a:srgbClr val="000000"/>
+                          </a:solidFill>
+                          <a:effectLst/>
+                          <a:latin typeface="Calibri"/>
+                        </a:rPr>
+                        <a:t>Rooms#getRoomByName</a:t>
+                      </a:r>
+                    </a:p>
+                  </a:txBody>
+                  <a:tcPr marL="12700" marR="12700" marT="12700" marB="0" anchor="b"/>
+                </a:tc>
+                <a:tc>
+                  <a:txBody>
+                    <a:bodyPr/>
+                    <a:lstStyle/>
+                    <a:p>
+                      <a:pPr algn="r" fontAlgn="b"/>
+                      <a:r>
+                        <a:rPr lang="en-US" sz="1800" b="0" i="0" u="none" strike="noStrike">
+                          <a:solidFill>
+                            <a:srgbClr val="000000"/>
+                          </a:solidFill>
+                          <a:effectLst/>
+                          <a:latin typeface="Calibri"/>
+                        </a:rPr>
+                        <a:t>8.48</a:t>
+                      </a:r>
+                    </a:p>
+                  </a:txBody>
+                  <a:tcPr marL="12700" marR="12700" marT="12700" marB="0" anchor="b"/>
+                </a:tc>
+                <a:tc>
+                  <a:txBody>
+                    <a:bodyPr/>
+                    <a:lstStyle/>
+                    <a:p>
+                      <a:pPr algn="r" fontAlgn="b"/>
+                      <a:r>
+                        <a:rPr lang="en-US" sz="1800" b="0" i="0" u="none" strike="noStrike" dirty="0">
+                          <a:solidFill>
+                            <a:srgbClr val="000000"/>
+                          </a:solidFill>
+                          <a:effectLst/>
+                          <a:latin typeface="Calibri"/>
+                        </a:rPr>
+                        <a:t>345.13</a:t>
+                      </a:r>
+                    </a:p>
+                  </a:txBody>
+                  <a:tcPr marL="12700" marR="12700" marT="12700" marB="0" anchor="b"/>
+                </a:tc>
+                <a:tc>
+                  <a:txBody>
+                    <a:bodyPr/>
+                    <a:lstStyle/>
+                    <a:p>
+                      <a:pPr algn="r" fontAlgn="b"/>
+                      <a:r>
+                        <a:rPr lang="en-US" sz="1800" b="0" i="0" u="none" strike="noStrike" dirty="0">
+                          <a:solidFill>
+                            <a:srgbClr val="000000"/>
+                          </a:solidFill>
+                          <a:effectLst/>
+                          <a:latin typeface="Calibri"/>
+                        </a:rPr>
+                        <a:t>1096.53</a:t>
+                      </a:r>
+                    </a:p>
+                  </a:txBody>
+                  <a:tcPr marL="12700" marR="12700" marT="12700" marB="0" anchor="b"/>
+                </a:tc>
+              </a:tr>
+              <a:tr h="370840">
+                <a:tc>
+                  <a:txBody>
+                    <a:bodyPr/>
+                    <a:lstStyle/>
+                    <a:p>
+                      <a:pPr algn="l" fontAlgn="b"/>
+                      <a:r>
+                        <a:rPr lang="en-US" sz="1800" b="0" i="0" u="none" strike="noStrike">
+                          <a:solidFill>
+                            <a:srgbClr val="000000"/>
+                          </a:solidFill>
+                          <a:effectLst/>
+                          <a:latin typeface="Calibri"/>
+                        </a:rPr>
+                        <a:t>Rooms#getRoomsInCity</a:t>
+                      </a:r>
+                    </a:p>
+                  </a:txBody>
+                  <a:tcPr marL="12700" marR="12700" marT="12700" marB="0" anchor="b"/>
+                </a:tc>
+                <a:tc>
+                  <a:txBody>
+                    <a:bodyPr/>
+                    <a:lstStyle/>
+                    <a:p>
+                      <a:pPr algn="r" fontAlgn="b"/>
+                      <a:r>
+                        <a:rPr lang="en-US" sz="1800" b="0" i="0" u="none" strike="noStrike">
+                          <a:solidFill>
+                            <a:srgbClr val="000000"/>
+                          </a:solidFill>
+                          <a:effectLst/>
+                          <a:latin typeface="Calibri"/>
+                        </a:rPr>
+                        <a:t>20.56</a:t>
+                      </a:r>
+                    </a:p>
+                  </a:txBody>
+                  <a:tcPr marL="12700" marR="12700" marT="12700" marB="0" anchor="b"/>
+                </a:tc>
+                <a:tc>
+                  <a:txBody>
+                    <a:bodyPr/>
+                    <a:lstStyle/>
+                    <a:p>
+                      <a:pPr algn="r" fontAlgn="b"/>
+                      <a:r>
+                        <a:rPr lang="en-US" sz="1800" b="0" i="0" u="none" strike="noStrike">
+                          <a:solidFill>
+                            <a:srgbClr val="000000"/>
+                          </a:solidFill>
+                          <a:effectLst/>
+                          <a:latin typeface="Calibri"/>
+                        </a:rPr>
+                        <a:t>296.44</a:t>
+                      </a:r>
+                    </a:p>
+                  </a:txBody>
+                  <a:tcPr marL="12700" marR="12700" marT="12700" marB="0" anchor="b"/>
+                </a:tc>
+                <a:tc>
+                  <a:txBody>
+                    <a:bodyPr/>
+                    <a:lstStyle/>
+                    <a:p>
+                      <a:pPr algn="r" fontAlgn="b"/>
+                      <a:r>
+                        <a:rPr lang="en-US" sz="1800" b="0" i="0" u="none" strike="noStrike" dirty="0">
+                          <a:solidFill>
+                            <a:srgbClr val="000000"/>
+                          </a:solidFill>
+                          <a:effectLst/>
+                          <a:latin typeface="Calibri"/>
+                        </a:rPr>
+                        <a:t>1143.45</a:t>
+                      </a:r>
+                    </a:p>
+                  </a:txBody>
+                  <a:tcPr marL="12700" marR="12700" marT="12700" marB="0" anchor="b"/>
+                </a:tc>
+              </a:tr>
+              <a:tr h="370840">
+                <a:tc>
+                  <a:txBody>
+                    <a:bodyPr/>
+                    <a:lstStyle/>
+                    <a:p>
+                      <a:pPr algn="l" fontAlgn="b"/>
+                      <a:r>
+                        <a:rPr lang="en-US" sz="1800" b="0" i="0" u="none" strike="noStrike" dirty="0" err="1">
+                          <a:solidFill>
+                            <a:srgbClr val="000000"/>
+                          </a:solidFill>
+                          <a:effectLst/>
+                          <a:latin typeface="Calibri"/>
+                        </a:rPr>
+                        <a:t>Stocks#buy</a:t>
+                      </a:r>
+                      <a:endParaRPr lang="en-US" sz="1800" b="0" i="0" u="none" strike="noStrike" dirty="0">
+                        <a:solidFill>
+                          <a:srgbClr val="000000"/>
+                        </a:solidFill>
+                        <a:effectLst/>
+                        <a:latin typeface="Calibri"/>
+                      </a:endParaRPr>
+                    </a:p>
+                  </a:txBody>
+                  <a:tcPr marL="12700" marR="12700" marT="12700" marB="0" anchor="b"/>
+                </a:tc>
+                <a:tc>
+                  <a:txBody>
+                    <a:bodyPr/>
+                    <a:lstStyle/>
+                    <a:p>
+                      <a:pPr algn="r" fontAlgn="b"/>
+                      <a:r>
+                        <a:rPr lang="en-US" sz="1800" b="0" i="0" u="none" strike="noStrike" dirty="0">
+                          <a:solidFill>
+                            <a:srgbClr val="000000"/>
+                          </a:solidFill>
+                          <a:effectLst/>
+                          <a:latin typeface="Calibri"/>
+                        </a:rPr>
+                        <a:t>8.46</a:t>
+                      </a:r>
+                    </a:p>
+                  </a:txBody>
+                  <a:tcPr marL="12700" marR="12700" marT="12700" marB="0" anchor="b"/>
+                </a:tc>
+                <a:tc>
+                  <a:txBody>
+                    <a:bodyPr/>
+                    <a:lstStyle/>
+                    <a:p>
+                      <a:pPr algn="r" fontAlgn="b"/>
+                      <a:r>
+                        <a:rPr lang="en-US" sz="1800" b="0" i="0" u="none" strike="noStrike" dirty="0">
+                          <a:solidFill>
+                            <a:srgbClr val="000000"/>
+                          </a:solidFill>
+                          <a:effectLst/>
+                          <a:latin typeface="Calibri"/>
+                        </a:rPr>
+                        <a:t>411.75</a:t>
+                      </a:r>
+                    </a:p>
+                  </a:txBody>
+                  <a:tcPr marL="12700" marR="12700" marT="12700" marB="0" anchor="b"/>
+                </a:tc>
+                <a:tc>
+                  <a:txBody>
+                    <a:bodyPr/>
+                    <a:lstStyle/>
+                    <a:p>
+                      <a:pPr algn="r" fontAlgn="b"/>
+                      <a:r>
+                        <a:rPr lang="en-US" sz="1800" b="0" i="0" u="none" strike="noStrike" dirty="0">
+                          <a:solidFill>
+                            <a:srgbClr val="000000"/>
+                          </a:solidFill>
+                          <a:effectLst/>
+                          <a:latin typeface="Calibri"/>
+                        </a:rPr>
+                        <a:t>815.5</a:t>
+                      </a:r>
+                    </a:p>
+                  </a:txBody>
+                  <a:tcPr marL="12700" marR="12700" marT="12700" marB="0" anchor="b"/>
+                </a:tc>
+              </a:tr>
+            </a:tbl>
+          </a:graphicData>
+        </a:graphic>
+      </p:graphicFrame>
+      <p:sp>
+        <p:nvSpPr>
+          <p:cNvPr id="3" name="Slide Number Placeholder 2"/>
+          <p:cNvSpPr>
+            <a:spLocks noGrp="1"/>
+          </p:cNvSpPr>
+          <p:nvPr>
+            <p:ph type="sldNum" sz="quarter" idx="12"/>
+          </p:nvPr>
+        </p:nvSpPr>
+        <p:spPr/>
+        <p:txBody>
+          <a:bodyPr/>
+          <a:lstStyle/>
+          <a:p>
+            <a:fld id="{4940F666-E5FA-274D-B0C1-53A0010BDC84}" type="slidenum">
+              <a:rPr lang="en-US" smtClean="0"/>
+              <a:t>36</a:t>
+            </a:fld>
+            <a:endParaRPr lang="en-US"/>
+          </a:p>
+        </p:txBody>
+      </p:sp>
+    </p:spTree>
+    <p:extLst>
+      <p:ext uri="{BB962C8B-B14F-4D97-AF65-F5344CB8AC3E}">
+        <p14:creationId xmlns:p14="http://schemas.microsoft.com/office/powerpoint/2010/main" val="531190829"/>
+      </p:ext>
+    </p:extLst>
+  </p:cSld>
+  <p:clrMapOvr>
+    <a:masterClrMapping/>
+  </p:clrMapOvr>
+  <p:timing>
+    <p:tnLst>
+      <p:par>
+        <p:cTn xmlns:p14="http://schemas.microsoft.com/office/powerpoint/2010/main" id="1" dur="indefinite" restart="never" nodeType="tmRoot"/>
+      </p:par>
+    </p:tnLst>
+  </p:timing>
+</p:sld>
+</file>
+
+<file path=ppt/slides/slide37.xml><?xml version="1.0" encoding="utf-8"?>
+<p:sld xmlns:a="http://schemas.openxmlformats.org/drawingml/2006/main" xmlns:r="http://schemas.openxmlformats.org/officeDocument/2006/relationships" xmlns:p="http://schemas.openxmlformats.org/presentationml/2006/main">
+  <p:cSld>
+    <p:spTree>
+      <p:nvGrpSpPr>
+        <p:cNvPr id="1" name=""/>
+        <p:cNvGrpSpPr/>
+        <p:nvPr/>
+      </p:nvGrpSpPr>
+      <p:grpSpPr>
+        <a:xfrm>
+          <a:off x="0" y="0"/>
+          <a:ext cx="0" cy="0"/>
+          <a:chOff x="0" y="0"/>
+          <a:chExt cx="0" cy="0"/>
+        </a:xfrm>
+      </p:grpSpPr>
+      <p:sp>
+        <p:nvSpPr>
+          <p:cNvPr id="2" name="Title 1"/>
+          <p:cNvSpPr>
+            <a:spLocks noGrp="1"/>
+          </p:cNvSpPr>
+          <p:nvPr>
+            <p:ph type="title"/>
+          </p:nvPr>
+        </p:nvSpPr>
+        <p:spPr/>
+        <p:txBody>
+          <a:bodyPr/>
+          <a:lstStyle/>
+          <a:p>
+            <a:r>
+              <a:rPr lang="en-US" dirty="0" smtClean="0"/>
+              <a:t>SLA Renewals Per User</a:t>
+            </a:r>
+            <a:endParaRPr lang="en-US" dirty="0"/>
+          </a:p>
+        </p:txBody>
+      </p:sp>
+      <p:pic>
+        <p:nvPicPr>
+          <p:cNvPr id="4" name="Content Placeholder 3" descr="renegotiation_cdf.png"/>
+          <p:cNvPicPr>
+            <a:picLocks noGrp="1" noChangeAspect="1"/>
+          </p:cNvPicPr>
+          <p:nvPr>
+            <p:ph idx="1"/>
+          </p:nvPr>
+        </p:nvPicPr>
+        <p:blipFill>
+          <a:blip r:embed="rId2">
+            <a:extLst>
+              <a:ext uri="{28A0092B-C50C-407E-A947-70E740481C1C}">
+                <a14:useLocalDpi xmlns:a14="http://schemas.microsoft.com/office/drawing/2010/main" val="0"/>
+              </a:ext>
+            </a:extLst>
+          </a:blip>
+          <a:srcRect l="-12238" r="-12238"/>
+          <a:stretch>
+            <a:fillRect/>
+          </a:stretch>
+        </p:blipFill>
+        <p:spPr/>
+      </p:pic>
+      <p:sp>
+        <p:nvSpPr>
+          <p:cNvPr id="3" name="Slide Number Placeholder 2"/>
+          <p:cNvSpPr>
+            <a:spLocks noGrp="1"/>
+          </p:cNvSpPr>
+          <p:nvPr>
+            <p:ph type="sldNum" sz="quarter" idx="12"/>
+          </p:nvPr>
+        </p:nvSpPr>
+        <p:spPr/>
+        <p:txBody>
+          <a:bodyPr/>
+          <a:lstStyle/>
+          <a:p>
+            <a:fld id="{4940F666-E5FA-274D-B0C1-53A0010BDC84}" type="slidenum">
+              <a:rPr lang="en-US" smtClean="0"/>
+              <a:t>37</a:t>
+            </a:fld>
+            <a:endParaRPr lang="en-US"/>
+          </a:p>
+        </p:txBody>
+      </p:sp>
+    </p:spTree>
+    <p:extLst>
+      <p:ext uri="{BB962C8B-B14F-4D97-AF65-F5344CB8AC3E}">
+        <p14:creationId xmlns:p14="http://schemas.microsoft.com/office/powerpoint/2010/main" val="1710790597"/>
       </p:ext>
     </p:extLst>
   </p:cSld>

</xml_diff>

<commit_message>
Added notes for slides
</commit_message>
<xml_diff>
--- a/Eager/elk-experiment/appserver/system_design.pptx
+++ b/Eager/elk-experiment/appserver/system_design.pptx
@@ -239,7 +239,7 @@
           <a:p>
             <a:fld id="{C6B377BD-EE2D-6A4D-8791-40EA342A78BF}" type="datetimeFigureOut">
               <a:rPr lang="en-US" smtClean="0"/>
-              <a:t>4/10/16</a:t>
+              <a:t>4/14/16</a:t>
             </a:fld>
             <a:endParaRPr lang="en-US"/>
           </a:p>
@@ -551,6 +551,120 @@
           <a:bodyPr/>
           <a:lstStyle/>
           <a:p>
+            <a:endParaRPr lang="en-US"/>
+          </a:p>
+          <a:p>
+            <a:r>
+              <a:rPr lang="en-US"/>
+              <a:t>----- Meeting Notes (4/14/16 14:44) -----</a:t>
+            </a:r>
+          </a:p>
+          <a:p>
+            <a:r>
+              <a:rPr lang="en-US"/>
+              <a:t>can we define and enforce efficient policies that govern administrative conformance, developer best practices, and performance objectives through automated analysis and diagnostics for cloud applications?</a:t>
+            </a:r>
+          </a:p>
+          <a:p>
+            <a:r>
+              <a:rPr lang="en-US"/>
+              <a:t>- governance</a:t>
+            </a:r>
+          </a:p>
+          <a:p>
+            <a:r>
+              <a:rPr lang="en-US"/>
+              <a:t>- automated</a:t>
+            </a:r>
+          </a:p>
+          <a:p>
+            <a:r>
+              <a:rPr lang="en-US"/>
+              <a:t>- efficient: non-invasive, simple, productivity enhancing</a:t>
+            </a:r>
+          </a:p>
+        </p:txBody>
+      </p:sp>
+      <p:sp>
+        <p:nvSpPr>
+          <p:cNvPr id="4" name="Slide Number Placeholder 3"/>
+          <p:cNvSpPr>
+            <a:spLocks noGrp="1"/>
+          </p:cNvSpPr>
+          <p:nvPr>
+            <p:ph type="sldNum" sz="quarter" idx="10"/>
+          </p:nvPr>
+        </p:nvSpPr>
+        <p:spPr/>
+        <p:txBody>
+          <a:bodyPr/>
+          <a:lstStyle/>
+          <a:p>
+            <a:fld id="{6E605815-6331-9444-B06E-921213318926}" type="slidenum">
+              <a:rPr lang="en-US" smtClean="0"/>
+              <a:t>14</a:t>
+            </a:fld>
+            <a:endParaRPr lang="en-US"/>
+          </a:p>
+        </p:txBody>
+      </p:sp>
+    </p:spTree>
+    <p:extLst>
+      <p:ext uri="{BB962C8B-B14F-4D97-AF65-F5344CB8AC3E}">
+        <p14:creationId xmlns:p14="http://schemas.microsoft.com/office/powerpoint/2010/main" val="801249288"/>
+      </p:ext>
+    </p:extLst>
+  </p:cSld>
+  <p:clrMapOvr>
+    <a:masterClrMapping/>
+  </p:clrMapOvr>
+</p:notes>
+</file>
+
+<file path=ppt/notesSlides/notesSlide2.xml><?xml version="1.0" encoding="utf-8"?>
+<p:notes xmlns:a="http://schemas.openxmlformats.org/drawingml/2006/main" xmlns:r="http://schemas.openxmlformats.org/officeDocument/2006/relationships" xmlns:p="http://schemas.openxmlformats.org/presentationml/2006/main">
+  <p:cSld>
+    <p:spTree>
+      <p:nvGrpSpPr>
+        <p:cNvPr id="1" name=""/>
+        <p:cNvGrpSpPr/>
+        <p:nvPr/>
+      </p:nvGrpSpPr>
+      <p:grpSpPr>
+        <a:xfrm>
+          <a:off x="0" y="0"/>
+          <a:ext cx="0" cy="0"/>
+          <a:chOff x="0" y="0"/>
+          <a:chExt cx="0" cy="0"/>
+        </a:xfrm>
+      </p:grpSpPr>
+      <p:sp>
+        <p:nvSpPr>
+          <p:cNvPr id="2" name="Slide Image Placeholder 1"/>
+          <p:cNvSpPr>
+            <a:spLocks noGrp="1" noRot="1" noChangeAspect="1"/>
+          </p:cNvSpPr>
+          <p:nvPr>
+            <p:ph type="sldImg"/>
+          </p:nvPr>
+        </p:nvSpPr>
+        <p:spPr/>
+      </p:sp>
+      <p:sp>
+        <p:nvSpPr>
+          <p:cNvPr id="3" name="Notes Placeholder 2"/>
+          <p:cNvSpPr>
+            <a:spLocks noGrp="1"/>
+          </p:cNvSpPr>
+          <p:nvPr>
+            <p:ph type="body" idx="1"/>
+          </p:nvPr>
+        </p:nvSpPr>
+        <p:spPr/>
+        <p:txBody>
+          <a:bodyPr/>
+          <a:lstStyle/>
+          <a:p>
             <a:r>
               <a:rPr lang="en-US" dirty="0" smtClean="0"/>
               <a:t>Outlier at t</a:t>
@@ -590,6 +704,129 @@
     <p:extLst>
       <p:ext uri="{BB962C8B-B14F-4D97-AF65-F5344CB8AC3E}">
         <p14:creationId xmlns:p14="http://schemas.microsoft.com/office/powerpoint/2010/main" val="3404154749"/>
+      </p:ext>
+    </p:extLst>
+  </p:cSld>
+  <p:clrMapOvr>
+    <a:masterClrMapping/>
+  </p:clrMapOvr>
+</p:notes>
+</file>
+
+<file path=ppt/notesSlides/notesSlide3.xml><?xml version="1.0" encoding="utf-8"?>
+<p:notes xmlns:a="http://schemas.openxmlformats.org/drawingml/2006/main" xmlns:r="http://schemas.openxmlformats.org/officeDocument/2006/relationships" xmlns:p="http://schemas.openxmlformats.org/presentationml/2006/main">
+  <p:cSld>
+    <p:spTree>
+      <p:nvGrpSpPr>
+        <p:cNvPr id="1" name=""/>
+        <p:cNvGrpSpPr/>
+        <p:nvPr/>
+      </p:nvGrpSpPr>
+      <p:grpSpPr>
+        <a:xfrm>
+          <a:off x="0" y="0"/>
+          <a:ext cx="0" cy="0"/>
+          <a:chOff x="0" y="0"/>
+          <a:chExt cx="0" cy="0"/>
+        </a:xfrm>
+      </p:grpSpPr>
+      <p:sp>
+        <p:nvSpPr>
+          <p:cNvPr id="2" name="Slide Image Placeholder 1"/>
+          <p:cNvSpPr>
+            <a:spLocks noGrp="1" noRot="1" noChangeAspect="1"/>
+          </p:cNvSpPr>
+          <p:nvPr>
+            <p:ph type="sldImg"/>
+          </p:nvPr>
+        </p:nvSpPr>
+        <p:spPr/>
+      </p:sp>
+      <p:sp>
+        <p:nvSpPr>
+          <p:cNvPr id="3" name="Notes Placeholder 2"/>
+          <p:cNvSpPr>
+            <a:spLocks noGrp="1"/>
+          </p:cNvSpPr>
+          <p:nvPr>
+            <p:ph type="body" idx="1"/>
+          </p:nvPr>
+        </p:nvSpPr>
+        <p:spPr/>
+        <p:txBody>
+          <a:bodyPr/>
+          <a:lstStyle/>
+          <a:p>
+            <a:endParaRPr lang="en-US"/>
+          </a:p>
+          <a:p>
+            <a:r>
+              <a:rPr lang="en-US"/>
+              <a:t>----- Meeting Notes (4/14/16 14:44) -----</a:t>
+            </a:r>
+          </a:p>
+          <a:p>
+            <a:r>
+              <a:rPr lang="en-US"/>
+              <a:t>3 chapter intros for EAGER, Cerebro, Roots</a:t>
+            </a:r>
+          </a:p>
+          <a:p>
+            <a:endParaRPr lang="en-US"/>
+          </a:p>
+          <a:p>
+            <a:r>
+              <a:rPr lang="en-US"/>
+              <a:t>My thesis will....</a:t>
+            </a:r>
+          </a:p>
+          <a:p>
+            <a:endParaRPr lang="en-US"/>
+          </a:p>
+          <a:p>
+            <a:r>
+              <a:rPr lang="en-US"/>
+              <a:t>Add timeline</a:t>
+            </a:r>
+          </a:p>
+          <a:p>
+            <a:endParaRPr lang="en-US"/>
+          </a:p>
+          <a:p>
+            <a:r>
+              <a:rPr lang="en-US"/>
+              <a:t>Related work</a:t>
+            </a:r>
+          </a:p>
+        </p:txBody>
+      </p:sp>
+      <p:sp>
+        <p:nvSpPr>
+          <p:cNvPr id="4" name="Slide Number Placeholder 3"/>
+          <p:cNvSpPr>
+            <a:spLocks noGrp="1"/>
+          </p:cNvSpPr>
+          <p:nvPr>
+            <p:ph type="sldNum" sz="quarter" idx="10"/>
+          </p:nvPr>
+        </p:nvSpPr>
+        <p:spPr/>
+        <p:txBody>
+          <a:bodyPr/>
+          <a:lstStyle/>
+          <a:p>
+            <a:fld id="{6E605815-6331-9444-B06E-921213318926}" type="slidenum">
+              <a:rPr lang="en-US" smtClean="0"/>
+              <a:t>47</a:t>
+            </a:fld>
+            <a:endParaRPr lang="en-US"/>
+          </a:p>
+        </p:txBody>
+      </p:sp>
+    </p:spTree>
+    <p:extLst>
+      <p:ext uri="{BB962C8B-B14F-4D97-AF65-F5344CB8AC3E}">
+        <p14:creationId xmlns:p14="http://schemas.microsoft.com/office/powerpoint/2010/main" val="3675898073"/>
       </p:ext>
     </p:extLst>
   </p:cSld>
@@ -780,7 +1017,7 @@
           <a:p>
             <a:fld id="{94C3570C-2D75-5147-A673-6C02746C58AB}" type="datetimeFigureOut">
               <a:rPr lang="en-US" smtClean="0"/>
-              <a:t>4/10/16</a:t>
+              <a:t>4/14/16</a:t>
             </a:fld>
             <a:endParaRPr lang="en-US"/>
           </a:p>
@@ -950,7 +1187,7 @@
           <a:p>
             <a:fld id="{94C3570C-2D75-5147-A673-6C02746C58AB}" type="datetimeFigureOut">
               <a:rPr lang="en-US" smtClean="0"/>
-              <a:t>4/10/16</a:t>
+              <a:t>4/14/16</a:t>
             </a:fld>
             <a:endParaRPr lang="en-US"/>
           </a:p>
@@ -1130,7 +1367,7 @@
           <a:p>
             <a:fld id="{94C3570C-2D75-5147-A673-6C02746C58AB}" type="datetimeFigureOut">
               <a:rPr lang="en-US" smtClean="0"/>
-              <a:t>4/10/16</a:t>
+              <a:t>4/14/16</a:t>
             </a:fld>
             <a:endParaRPr lang="en-US"/>
           </a:p>
@@ -1300,7 +1537,7 @@
           <a:p>
             <a:fld id="{94C3570C-2D75-5147-A673-6C02746C58AB}" type="datetimeFigureOut">
               <a:rPr lang="en-US" smtClean="0"/>
-              <a:t>4/10/16</a:t>
+              <a:t>4/14/16</a:t>
             </a:fld>
             <a:endParaRPr lang="en-US"/>
           </a:p>
@@ -1546,7 +1783,7 @@
           <a:p>
             <a:fld id="{94C3570C-2D75-5147-A673-6C02746C58AB}" type="datetimeFigureOut">
               <a:rPr lang="en-US" smtClean="0"/>
-              <a:t>4/10/16</a:t>
+              <a:t>4/14/16</a:t>
             </a:fld>
             <a:endParaRPr lang="en-US"/>
           </a:p>
@@ -1834,7 +2071,7 @@
           <a:p>
             <a:fld id="{94C3570C-2D75-5147-A673-6C02746C58AB}" type="datetimeFigureOut">
               <a:rPr lang="en-US" smtClean="0"/>
-              <a:t>4/10/16</a:t>
+              <a:t>4/14/16</a:t>
             </a:fld>
             <a:endParaRPr lang="en-US"/>
           </a:p>
@@ -2256,7 +2493,7 @@
           <a:p>
             <a:fld id="{94C3570C-2D75-5147-A673-6C02746C58AB}" type="datetimeFigureOut">
               <a:rPr lang="en-US" smtClean="0"/>
-              <a:t>4/10/16</a:t>
+              <a:t>4/14/16</a:t>
             </a:fld>
             <a:endParaRPr lang="en-US"/>
           </a:p>
@@ -2374,7 +2611,7 @@
           <a:p>
             <a:fld id="{94C3570C-2D75-5147-A673-6C02746C58AB}" type="datetimeFigureOut">
               <a:rPr lang="en-US" smtClean="0"/>
-              <a:t>4/10/16</a:t>
+              <a:t>4/14/16</a:t>
             </a:fld>
             <a:endParaRPr lang="en-US"/>
           </a:p>
@@ -2469,7 +2706,7 @@
           <a:p>
             <a:fld id="{94C3570C-2D75-5147-A673-6C02746C58AB}" type="datetimeFigureOut">
               <a:rPr lang="en-US" smtClean="0"/>
-              <a:t>4/10/16</a:t>
+              <a:t>4/14/16</a:t>
             </a:fld>
             <a:endParaRPr lang="en-US"/>
           </a:p>
@@ -2746,7 +2983,7 @@
           <a:p>
             <a:fld id="{94C3570C-2D75-5147-A673-6C02746C58AB}" type="datetimeFigureOut">
               <a:rPr lang="en-US" smtClean="0"/>
-              <a:t>4/10/16</a:t>
+              <a:t>4/14/16</a:t>
             </a:fld>
             <a:endParaRPr lang="en-US"/>
           </a:p>
@@ -2999,7 +3236,7 @@
           <a:p>
             <a:fld id="{94C3570C-2D75-5147-A673-6C02746C58AB}" type="datetimeFigureOut">
               <a:rPr lang="en-US" smtClean="0"/>
-              <a:t>4/10/16</a:t>
+              <a:t>4/14/16</a:t>
             </a:fld>
             <a:endParaRPr lang="en-US"/>
           </a:p>
@@ -3212,7 +3449,7 @@
           <a:p>
             <a:fld id="{94C3570C-2D75-5147-A673-6C02746C58AB}" type="datetimeFigureOut">
               <a:rPr lang="en-US" smtClean="0"/>
-              <a:t>4/10/16</a:t>
+              <a:t>4/14/16</a:t>
             </a:fld>
             <a:endParaRPr lang="en-US"/>
           </a:p>
@@ -4241,6 +4478,13 @@
   <p:clrMapOvr>
     <a:masterClrMapping/>
   </p:clrMapOvr>
+  <p:timing>
+    <p:tnLst>
+      <p:par>
+        <p:cTn xmlns:p14="http://schemas.microsoft.com/office/powerpoint/2010/main" id="1" dur="indefinite" restart="never" nodeType="tmRoot"/>
+      </p:par>
+    </p:tnLst>
+  </p:timing>
 </p:sld>
 </file>
 
@@ -4374,6 +4618,13 @@
   <p:clrMapOvr>
     <a:masterClrMapping/>
   </p:clrMapOvr>
+  <p:timing>
+    <p:tnLst>
+      <p:par>
+        <p:cTn xmlns:p14="http://schemas.microsoft.com/office/powerpoint/2010/main" id="1" dur="indefinite" restart="never" nodeType="tmRoot"/>
+      </p:par>
+    </p:tnLst>
+  </p:timing>
 </p:sld>
 </file>
 
@@ -4590,6 +4841,13 @@
   <p:clrMapOvr>
     <a:masterClrMapping/>
   </p:clrMapOvr>
+  <p:timing>
+    <p:tnLst>
+      <p:par>
+        <p:cTn xmlns:p14="http://schemas.microsoft.com/office/powerpoint/2010/main" id="1" dur="indefinite" restart="never" nodeType="tmRoot"/>
+      </p:par>
+    </p:tnLst>
+  </p:timing>
 </p:sld>
 </file>
 
@@ -4694,6 +4952,13 @@
   <p:clrMapOvr>
     <a:masterClrMapping/>
   </p:clrMapOvr>
+  <p:timing>
+    <p:tnLst>
+      <p:par>
+        <p:cTn xmlns:p14="http://schemas.microsoft.com/office/powerpoint/2010/main" id="1" dur="indefinite" restart="never" nodeType="tmRoot"/>
+      </p:par>
+    </p:tnLst>
+  </p:timing>
 </p:sld>
 </file>
 
@@ -4771,6 +5036,13 @@
   <p:clrMapOvr>
     <a:masterClrMapping/>
   </p:clrMapOvr>
+  <p:timing>
+    <p:tnLst>
+      <p:par>
+        <p:cTn xmlns:p14="http://schemas.microsoft.com/office/powerpoint/2010/main" id="1" dur="indefinite" restart="never" nodeType="tmRoot"/>
+      </p:par>
+    </p:tnLst>
+  </p:timing>
 </p:sld>
 </file>
 
@@ -4885,6 +5157,13 @@
   <p:clrMapOvr>
     <a:masterClrMapping/>
   </p:clrMapOvr>
+  <p:timing>
+    <p:tnLst>
+      <p:par>
+        <p:cTn xmlns:p14="http://schemas.microsoft.com/office/powerpoint/2010/main" id="1" dur="indefinite" restart="never" nodeType="tmRoot"/>
+      </p:par>
+    </p:tnLst>
+  </p:timing>
 </p:sld>
 </file>
 
@@ -4967,6 +5246,13 @@
   <p:clrMapOvr>
     <a:masterClrMapping/>
   </p:clrMapOvr>
+  <p:timing>
+    <p:tnLst>
+      <p:par>
+        <p:cTn xmlns:p14="http://schemas.microsoft.com/office/powerpoint/2010/main" id="1" dur="indefinite" restart="never" nodeType="tmRoot"/>
+      </p:par>
+    </p:tnLst>
+  </p:timing>
 </p:sld>
 </file>
 
@@ -5093,6 +5379,13 @@
   <p:clrMapOvr>
     <a:masterClrMapping/>
   </p:clrMapOvr>
+  <p:timing>
+    <p:tnLst>
+      <p:par>
+        <p:cTn xmlns:p14="http://schemas.microsoft.com/office/powerpoint/2010/main" id="1" dur="indefinite" restart="never" nodeType="tmRoot"/>
+      </p:par>
+    </p:tnLst>
+  </p:timing>
 </p:sld>
 </file>
 
@@ -5201,6 +5494,13 @@
   <p:clrMapOvr>
     <a:masterClrMapping/>
   </p:clrMapOvr>
+  <p:timing>
+    <p:tnLst>
+      <p:par>
+        <p:cTn xmlns:p14="http://schemas.microsoft.com/office/powerpoint/2010/main" id="1" dur="indefinite" restart="never" nodeType="tmRoot"/>
+      </p:par>
+    </p:tnLst>
+  </p:timing>
 </p:sld>
 </file>
 
@@ -5358,6 +5658,13 @@
   <p:clrMapOvr>
     <a:masterClrMapping/>
   </p:clrMapOvr>
+  <p:timing>
+    <p:tnLst>
+      <p:par>
+        <p:cTn xmlns:p14="http://schemas.microsoft.com/office/powerpoint/2010/main" id="1" dur="indefinite" restart="never" nodeType="tmRoot"/>
+      </p:par>
+    </p:tnLst>
+  </p:timing>
 </p:sld>
 </file>
 
@@ -5551,6 +5858,13 @@
   <p:clrMapOvr>
     <a:masterClrMapping/>
   </p:clrMapOvr>
+  <p:timing>
+    <p:tnLst>
+      <p:par>
+        <p:cTn xmlns:p14="http://schemas.microsoft.com/office/powerpoint/2010/main" id="1" dur="indefinite" restart="never" nodeType="tmRoot"/>
+      </p:par>
+    </p:tnLst>
+  </p:timing>
 </p:sld>
 </file>
 
@@ -5734,6 +6048,13 @@
   <p:clrMapOvr>
     <a:masterClrMapping/>
   </p:clrMapOvr>
+  <p:timing>
+    <p:tnLst>
+      <p:par>
+        <p:cTn xmlns:p14="http://schemas.microsoft.com/office/powerpoint/2010/main" id="1" dur="indefinite" restart="never" nodeType="tmRoot"/>
+      </p:par>
+    </p:tnLst>
+  </p:timing>
 </p:sld>
 </file>
 
@@ -6161,6 +6482,13 @@
   <p:clrMapOvr>
     <a:masterClrMapping/>
   </p:clrMapOvr>
+  <p:timing>
+    <p:tnLst>
+      <p:par>
+        <p:cTn xmlns:p14="http://schemas.microsoft.com/office/powerpoint/2010/main" id="1" dur="indefinite" restart="never" nodeType="tmRoot"/>
+      </p:par>
+    </p:tnLst>
+  </p:timing>
 </p:sld>
 </file>
 
@@ -6313,6 +6641,13 @@
   <p:clrMapOvr>
     <a:masterClrMapping/>
   </p:clrMapOvr>
+  <p:timing>
+    <p:tnLst>
+      <p:par>
+        <p:cTn xmlns:p14="http://schemas.microsoft.com/office/powerpoint/2010/main" id="1" dur="indefinite" restart="never" nodeType="tmRoot"/>
+      </p:par>
+    </p:tnLst>
+  </p:timing>
 </p:sld>
 </file>
 
@@ -6391,6 +6726,13 @@
   <p:clrMapOvr>
     <a:masterClrMapping/>
   </p:clrMapOvr>
+  <p:timing>
+    <p:tnLst>
+      <p:par>
+        <p:cTn xmlns:p14="http://schemas.microsoft.com/office/powerpoint/2010/main" id="1" dur="indefinite" restart="never" nodeType="tmRoot"/>
+      </p:par>
+    </p:tnLst>
+  </p:timing>
 </p:sld>
 </file>
 
@@ -6477,6 +6819,13 @@
   <p:clrMapOvr>
     <a:masterClrMapping/>
   </p:clrMapOvr>
+  <p:timing>
+    <p:tnLst>
+      <p:par>
+        <p:cTn xmlns:p14="http://schemas.microsoft.com/office/powerpoint/2010/main" id="1" dur="indefinite" restart="never" nodeType="tmRoot"/>
+      </p:par>
+    </p:tnLst>
+  </p:timing>
 </p:sld>
 </file>
 
@@ -6565,6 +6914,13 @@
   <p:clrMapOvr>
     <a:masterClrMapping/>
   </p:clrMapOvr>
+  <p:timing>
+    <p:tnLst>
+      <p:par>
+        <p:cTn xmlns:p14="http://schemas.microsoft.com/office/powerpoint/2010/main" id="1" dur="indefinite" restart="never" nodeType="tmRoot"/>
+      </p:par>
+    </p:tnLst>
+  </p:timing>
 </p:sld>
 </file>
 
@@ -6677,6 +7033,13 @@
   <p:clrMapOvr>
     <a:masterClrMapping/>
   </p:clrMapOvr>
+  <p:timing>
+    <p:tnLst>
+      <p:par>
+        <p:cTn xmlns:p14="http://schemas.microsoft.com/office/powerpoint/2010/main" id="1" dur="indefinite" restart="never" nodeType="tmRoot"/>
+      </p:par>
+    </p:tnLst>
+  </p:timing>
 </p:sld>
 </file>
 
@@ -6795,6 +7158,13 @@
   <p:clrMapOvr>
     <a:masterClrMapping/>
   </p:clrMapOvr>
+  <p:timing>
+    <p:tnLst>
+      <p:par>
+        <p:cTn xmlns:p14="http://schemas.microsoft.com/office/powerpoint/2010/main" id="1" dur="indefinite" restart="never" nodeType="tmRoot"/>
+      </p:par>
+    </p:tnLst>
+  </p:timing>
 </p:sld>
 </file>
 
@@ -6896,6 +7266,13 @@
   <p:clrMapOvr>
     <a:masterClrMapping/>
   </p:clrMapOvr>
+  <p:timing>
+    <p:tnLst>
+      <p:par>
+        <p:cTn xmlns:p14="http://schemas.microsoft.com/office/powerpoint/2010/main" id="1" dur="indefinite" restart="never" nodeType="tmRoot"/>
+      </p:par>
+    </p:tnLst>
+  </p:timing>
 </p:sld>
 </file>
 
@@ -7074,6 +7451,13 @@
   <p:clrMapOvr>
     <a:masterClrMapping/>
   </p:clrMapOvr>
+  <p:timing>
+    <p:tnLst>
+      <p:par>
+        <p:cTn xmlns:p14="http://schemas.microsoft.com/office/powerpoint/2010/main" id="1" dur="indefinite" restart="never" nodeType="tmRoot"/>
+      </p:par>
+    </p:tnLst>
+  </p:timing>
 </p:sld>
 </file>
 
@@ -8859,6 +9243,13 @@
   <p:clrMapOvr>
     <a:masterClrMapping/>
   </p:clrMapOvr>
+  <p:timing>
+    <p:tnLst>
+      <p:par>
+        <p:cTn xmlns:p14="http://schemas.microsoft.com/office/powerpoint/2010/main" id="1" dur="indefinite" restart="never" nodeType="tmRoot"/>
+      </p:par>
+    </p:tnLst>
+  </p:timing>
 </p:sld>
 </file>
 
@@ -8989,6 +9380,13 @@
   <p:clrMapOvr>
     <a:masterClrMapping/>
   </p:clrMapOvr>
+  <p:timing>
+    <p:tnLst>
+      <p:par>
+        <p:cTn xmlns:p14="http://schemas.microsoft.com/office/powerpoint/2010/main" id="1" dur="indefinite" restart="never" nodeType="tmRoot"/>
+      </p:par>
+    </p:tnLst>
+  </p:timing>
 </p:sld>
 </file>
 
@@ -9685,6 +10083,13 @@
   <p:clrMapOvr>
     <a:masterClrMapping/>
   </p:clrMapOvr>
+  <p:timing>
+    <p:tnLst>
+      <p:par>
+        <p:cTn xmlns:p14="http://schemas.microsoft.com/office/powerpoint/2010/main" id="1" dur="indefinite" restart="never" nodeType="tmRoot"/>
+      </p:par>
+    </p:tnLst>
+  </p:timing>
 </p:sld>
 </file>
 
@@ -9795,6 +10200,13 @@
   <p:clrMapOvr>
     <a:masterClrMapping/>
   </p:clrMapOvr>
+  <p:timing>
+    <p:tnLst>
+      <p:par>
+        <p:cTn xmlns:p14="http://schemas.microsoft.com/office/powerpoint/2010/main" id="1" dur="indefinite" restart="never" nodeType="tmRoot"/>
+      </p:par>
+    </p:tnLst>
+  </p:timing>
 </p:sld>
 </file>
 
@@ -9896,6 +10308,13 @@
   <p:clrMapOvr>
     <a:masterClrMapping/>
   </p:clrMapOvr>
+  <p:timing>
+    <p:tnLst>
+      <p:par>
+        <p:cTn xmlns:p14="http://schemas.microsoft.com/office/powerpoint/2010/main" id="1" dur="indefinite" restart="never" nodeType="tmRoot"/>
+      </p:par>
+    </p:tnLst>
+  </p:timing>
 </p:sld>
 </file>
 
@@ -10197,6 +10616,13 @@
   <p:clrMapOvr>
     <a:masterClrMapping/>
   </p:clrMapOvr>
+  <p:timing>
+    <p:tnLst>
+      <p:par>
+        <p:cTn xmlns:p14="http://schemas.microsoft.com/office/powerpoint/2010/main" id="1" dur="indefinite" restart="never" nodeType="tmRoot"/>
+      </p:par>
+    </p:tnLst>
+  </p:timing>
 </p:sld>
 </file>
 
@@ -10300,6 +10726,13 @@
   <p:clrMapOvr>
     <a:masterClrMapping/>
   </p:clrMapOvr>
+  <p:timing>
+    <p:tnLst>
+      <p:par>
+        <p:cTn xmlns:p14="http://schemas.microsoft.com/office/powerpoint/2010/main" id="1" dur="indefinite" restart="never" nodeType="tmRoot"/>
+      </p:par>
+    </p:tnLst>
+  </p:timing>
 </p:sld>
 </file>
 
@@ -10617,6 +11050,13 @@
   <p:clrMapOvr>
     <a:masterClrMapping/>
   </p:clrMapOvr>
+  <p:timing>
+    <p:tnLst>
+      <p:par>
+        <p:cTn xmlns:p14="http://schemas.microsoft.com/office/powerpoint/2010/main" id="1" dur="indefinite" restart="never" nodeType="tmRoot"/>
+      </p:par>
+    </p:tnLst>
+  </p:timing>
 </p:sld>
 </file>
 
@@ -10729,6 +11169,13 @@
   <p:clrMapOvr>
     <a:masterClrMapping/>
   </p:clrMapOvr>
+  <p:timing>
+    <p:tnLst>
+      <p:par>
+        <p:cTn xmlns:p14="http://schemas.microsoft.com/office/powerpoint/2010/main" id="1" dur="indefinite" restart="never" nodeType="tmRoot"/>
+      </p:par>
+    </p:tnLst>
+  </p:timing>
 </p:sld>
 </file>
 
@@ -10801,6 +11248,13 @@
   <p:clrMapOvr>
     <a:masterClrMapping/>
   </p:clrMapOvr>
+  <p:timing>
+    <p:tnLst>
+      <p:par>
+        <p:cTn xmlns:p14="http://schemas.microsoft.com/office/powerpoint/2010/main" id="1" dur="indefinite" restart="never" nodeType="tmRoot"/>
+      </p:par>
+    </p:tnLst>
+  </p:timing>
 </p:sld>
 </file>
 
@@ -10873,6 +11327,13 @@
   <p:clrMapOvr>
     <a:masterClrMapping/>
   </p:clrMapOvr>
+  <p:timing>
+    <p:tnLst>
+      <p:par>
+        <p:cTn xmlns:p14="http://schemas.microsoft.com/office/powerpoint/2010/main" id="1" dur="indefinite" restart="never" nodeType="tmRoot"/>
+      </p:par>
+    </p:tnLst>
+  </p:timing>
 </p:sld>
 </file>
 
@@ -11079,6 +11540,13 @@
   <p:clrMapOvr>
     <a:masterClrMapping/>
   </p:clrMapOvr>
+  <p:timing>
+    <p:tnLst>
+      <p:par>
+        <p:cTn xmlns:p14="http://schemas.microsoft.com/office/powerpoint/2010/main" id="1" dur="indefinite" restart="never" nodeType="tmRoot"/>
+      </p:par>
+    </p:tnLst>
+  </p:timing>
 </p:sld>
 </file>
 
@@ -11590,6 +12058,13 @@
   <p:clrMapOvr>
     <a:masterClrMapping/>
   </p:clrMapOvr>
+  <p:timing>
+    <p:tnLst>
+      <p:par>
+        <p:cTn xmlns:p14="http://schemas.microsoft.com/office/powerpoint/2010/main" id="1" dur="indefinite" restart="never" nodeType="tmRoot"/>
+      </p:par>
+    </p:tnLst>
+  </p:timing>
 </p:sld>
 </file>
 
@@ -12813,6 +13288,13 @@
   <p:clrMapOvr>
     <a:masterClrMapping/>
   </p:clrMapOvr>
+  <p:timing>
+    <p:tnLst>
+      <p:par>
+        <p:cTn xmlns:p14="http://schemas.microsoft.com/office/powerpoint/2010/main" id="1" dur="indefinite" restart="never" nodeType="tmRoot"/>
+      </p:par>
+    </p:tnLst>
+  </p:timing>
 </p:sld>
 </file>
 
@@ -13097,6 +13579,13 @@
   <p:clrMapOvr>
     <a:masterClrMapping/>
   </p:clrMapOvr>
+  <p:timing>
+    <p:tnLst>
+      <p:par>
+        <p:cTn xmlns:p14="http://schemas.microsoft.com/office/powerpoint/2010/main" id="1" dur="indefinite" restart="never" nodeType="tmRoot"/>
+      </p:par>
+    </p:tnLst>
+  </p:timing>
 </p:sld>
 </file>
 

</xml_diff>

<commit_message>
Added presentation notes from practice run; Updated intro
</commit_message>
<xml_diff>
--- a/Eager/elk-experiment/appserver/system_design.pptx
+++ b/Eager/elk-experiment/appserver/system_design.pptx
@@ -308,7 +308,7 @@
           <a:p>
             <a:fld id="{37D14F8C-9F46-2E42-9999-888BFBC492E3}" type="datetimeFigureOut">
               <a:rPr lang="en-US" smtClean="0"/>
-              <a:t>4/26/16</a:t>
+              <a:t>4/28/16</a:t>
             </a:fld>
             <a:endParaRPr lang="en-US"/>
           </a:p>
@@ -474,7 +474,7 @@
           <a:p>
             <a:fld id="{C6B377BD-EE2D-6A4D-8791-40EA342A78BF}" type="datetimeFigureOut">
               <a:rPr lang="en-US" smtClean="0"/>
-              <a:t>4/26/16</a:t>
+              <a:t>4/28/16</a:t>
             </a:fld>
             <a:endParaRPr lang="en-US"/>
           </a:p>
@@ -787,66 +787,11 @@
           <a:bodyPr/>
           <a:lstStyle/>
           <a:p>
-            <a:pPr marL="0" marR="0" indent="0" algn="l" defTabSz="457200" rtl="0" eaLnBrk="1" fontAlgn="auto" latinLnBrk="0" hangingPunct="1">
-              <a:lnSpc>
-                <a:spcPct val="100000"/>
-              </a:lnSpc>
-              <a:spcBef>
-                <a:spcPts val="0"/>
-              </a:spcBef>
-              <a:spcAft>
-                <a:spcPts val="0"/>
-              </a:spcAft>
-              <a:buClrTx/>
-              <a:buSzTx/>
-              <a:buFontTx/>
-              <a:buNone/>
-              <a:tabLst/>
-              <a:defRPr/>
-            </a:pPr>
-            <a:r>
-              <a:rPr lang="en-US" dirty="0" smtClean="0"/>
-              <a:t>Can we enforce design-time governance on web applications developed for a given cloud platform so as to ensure proper versioning, dependency management and conformance to other developer best practices, and also enforce run-time governance on them so as to automatically determine the expected runtime performance of the applications, detect SLA violations and detect performance anomalies and perform root cause analysis, with minimal developer intervention and no invasive instrumentation on the applications?</a:t>
-            </a:r>
-          </a:p>
-          <a:p>
-            <a:endParaRPr lang="en-US" dirty="0" smtClean="0"/>
-          </a:p>
-          <a:p>
-            <a:endParaRPr lang="en-US" dirty="0" smtClean="0"/>
-          </a:p>
-          <a:p>
+            <a:r>
+              <a:rPr lang="en-US" dirty="0" smtClean="0"/>
+              <a:t>Explain the utility model</a:t>
+            </a:r>
             <a:endParaRPr lang="en-US" dirty="0"/>
-          </a:p>
-          <a:p>
-            <a:r>
-              <a:rPr lang="en-US" dirty="0"/>
-              <a:t>----- Meeting Notes (4/14/16 14:44) -----</a:t>
-            </a:r>
-          </a:p>
-          <a:p>
-            <a:r>
-              <a:rPr lang="en-US" dirty="0"/>
-              <a:t>can we define and enforce efficient policies that govern administrative conformance, developer best practices, and performance objectives through automated analysis and diagnostics for cloud applications?</a:t>
-            </a:r>
-          </a:p>
-          <a:p>
-            <a:r>
-              <a:rPr lang="en-US" dirty="0"/>
-              <a:t>- governance</a:t>
-            </a:r>
-          </a:p>
-          <a:p>
-            <a:r>
-              <a:rPr lang="en-US" dirty="0"/>
-              <a:t>- automated</a:t>
-            </a:r>
-          </a:p>
-          <a:p>
-            <a:r>
-              <a:rPr lang="en-US" dirty="0"/>
-              <a:t>- efficient: non-invasive, simple, productivity enhancing</a:t>
-            </a:r>
           </a:p>
         </p:txBody>
       </p:sp>
@@ -867,7 +812,7 @@
           <a:p>
             <a:fld id="{6E605815-6331-9444-B06E-921213318926}" type="slidenum">
               <a:rPr lang="en-US" smtClean="0"/>
-              <a:t>8</a:t>
+              <a:t>2</a:t>
             </a:fld>
             <a:endParaRPr lang="en-US"/>
           </a:p>
@@ -876,7 +821,1068 @@
     </p:spTree>
     <p:extLst>
       <p:ext uri="{BB962C8B-B14F-4D97-AF65-F5344CB8AC3E}">
-        <p14:creationId xmlns:p14="http://schemas.microsoft.com/office/powerpoint/2010/main" val="801249288"/>
+        <p14:creationId xmlns:p14="http://schemas.microsoft.com/office/powerpoint/2010/main" val="4292821385"/>
+      </p:ext>
+    </p:extLst>
+  </p:cSld>
+  <p:clrMapOvr>
+    <a:masterClrMapping/>
+  </p:clrMapOvr>
+</p:notes>
+</file>
+
+<file path=ppt/notesSlides/notesSlide10.xml><?xml version="1.0" encoding="utf-8"?>
+<p:notes xmlns:a="http://schemas.openxmlformats.org/drawingml/2006/main" xmlns:r="http://schemas.openxmlformats.org/officeDocument/2006/relationships" xmlns:p="http://schemas.openxmlformats.org/presentationml/2006/main">
+  <p:cSld>
+    <p:spTree>
+      <p:nvGrpSpPr>
+        <p:cNvPr id="1" name=""/>
+        <p:cNvGrpSpPr/>
+        <p:nvPr/>
+      </p:nvGrpSpPr>
+      <p:grpSpPr>
+        <a:xfrm>
+          <a:off x="0" y="0"/>
+          <a:ext cx="0" cy="0"/>
+          <a:chOff x="0" y="0"/>
+          <a:chExt cx="0" cy="0"/>
+        </a:xfrm>
+      </p:grpSpPr>
+      <p:sp>
+        <p:nvSpPr>
+          <p:cNvPr id="2" name="Slide Image Placeholder 1"/>
+          <p:cNvSpPr>
+            <a:spLocks noGrp="1" noRot="1" noChangeAspect="1"/>
+          </p:cNvSpPr>
+          <p:nvPr>
+            <p:ph type="sldImg"/>
+          </p:nvPr>
+        </p:nvSpPr>
+        <p:spPr/>
+      </p:sp>
+      <p:sp>
+        <p:nvSpPr>
+          <p:cNvPr id="3" name="Notes Placeholder 2"/>
+          <p:cNvSpPr>
+            <a:spLocks noGrp="1"/>
+          </p:cNvSpPr>
+          <p:nvPr>
+            <p:ph type="body" idx="1"/>
+          </p:nvPr>
+        </p:nvSpPr>
+        <p:spPr/>
+        <p:txBody>
+          <a:bodyPr/>
+          <a:lstStyle/>
+          <a:p>
+            <a:r>
+              <a:rPr lang="en-US" dirty="0" smtClean="0"/>
+              <a:t>Why bounds? To form SLAs</a:t>
+            </a:r>
+          </a:p>
+          <a:p>
+            <a:endParaRPr lang="en-US" dirty="0"/>
+          </a:p>
+        </p:txBody>
+      </p:sp>
+      <p:sp>
+        <p:nvSpPr>
+          <p:cNvPr id="4" name="Slide Number Placeholder 3"/>
+          <p:cNvSpPr>
+            <a:spLocks noGrp="1"/>
+          </p:cNvSpPr>
+          <p:nvPr>
+            <p:ph type="sldNum" sz="quarter" idx="10"/>
+          </p:nvPr>
+        </p:nvSpPr>
+        <p:spPr/>
+        <p:txBody>
+          <a:bodyPr/>
+          <a:lstStyle/>
+          <a:p>
+            <a:fld id="{6E605815-6331-9444-B06E-921213318926}" type="slidenum">
+              <a:rPr lang="en-US" smtClean="0"/>
+              <a:t>17</a:t>
+            </a:fld>
+            <a:endParaRPr lang="en-US"/>
+          </a:p>
+        </p:txBody>
+      </p:sp>
+    </p:spTree>
+    <p:extLst>
+      <p:ext uri="{BB962C8B-B14F-4D97-AF65-F5344CB8AC3E}">
+        <p14:creationId xmlns:p14="http://schemas.microsoft.com/office/powerpoint/2010/main" val="800395983"/>
+      </p:ext>
+    </p:extLst>
+  </p:cSld>
+  <p:clrMapOvr>
+    <a:masterClrMapping/>
+  </p:clrMapOvr>
+</p:notes>
+</file>
+
+<file path=ppt/notesSlides/notesSlide11.xml><?xml version="1.0" encoding="utf-8"?>
+<p:notes xmlns:a="http://schemas.openxmlformats.org/drawingml/2006/main" xmlns:r="http://schemas.openxmlformats.org/officeDocument/2006/relationships" xmlns:p="http://schemas.openxmlformats.org/presentationml/2006/main">
+  <p:cSld>
+    <p:spTree>
+      <p:nvGrpSpPr>
+        <p:cNvPr id="1" name=""/>
+        <p:cNvGrpSpPr/>
+        <p:nvPr/>
+      </p:nvGrpSpPr>
+      <p:grpSpPr>
+        <a:xfrm>
+          <a:off x="0" y="0"/>
+          <a:ext cx="0" cy="0"/>
+          <a:chOff x="0" y="0"/>
+          <a:chExt cx="0" cy="0"/>
+        </a:xfrm>
+      </p:grpSpPr>
+      <p:sp>
+        <p:nvSpPr>
+          <p:cNvPr id="2" name="Slide Image Placeholder 1"/>
+          <p:cNvSpPr>
+            <a:spLocks noGrp="1" noRot="1" noChangeAspect="1"/>
+          </p:cNvSpPr>
+          <p:nvPr>
+            <p:ph type="sldImg"/>
+          </p:nvPr>
+        </p:nvSpPr>
+        <p:spPr/>
+      </p:sp>
+      <p:sp>
+        <p:nvSpPr>
+          <p:cNvPr id="3" name="Notes Placeholder 2"/>
+          <p:cNvSpPr>
+            <a:spLocks noGrp="1"/>
+          </p:cNvSpPr>
+          <p:nvPr>
+            <p:ph type="body" idx="1"/>
+          </p:nvPr>
+        </p:nvSpPr>
+        <p:spPr/>
+        <p:txBody>
+          <a:bodyPr/>
+          <a:lstStyle/>
+          <a:p>
+            <a:r>
+              <a:rPr lang="en-US" dirty="0" smtClean="0"/>
+              <a:t>Where’s the static analyzer running?</a:t>
+            </a:r>
+          </a:p>
+          <a:p>
+            <a:r>
+              <a:rPr lang="en-US" dirty="0" smtClean="0"/>
+              <a:t>Explain the intuition – apps spend most of their time</a:t>
+            </a:r>
+            <a:r>
+              <a:rPr lang="en-US" baseline="0" dirty="0" smtClean="0"/>
+              <a:t> on </a:t>
+            </a:r>
+            <a:r>
+              <a:rPr lang="en-US" baseline="0" dirty="0" err="1" smtClean="0"/>
+              <a:t>PaaS</a:t>
+            </a:r>
+            <a:r>
+              <a:rPr lang="en-US" baseline="0" dirty="0" smtClean="0"/>
+              <a:t> SDK</a:t>
+            </a:r>
+          </a:p>
+          <a:p>
+            <a:endParaRPr lang="en-US" dirty="0"/>
+          </a:p>
+        </p:txBody>
+      </p:sp>
+      <p:sp>
+        <p:nvSpPr>
+          <p:cNvPr id="4" name="Slide Number Placeholder 3"/>
+          <p:cNvSpPr>
+            <a:spLocks noGrp="1"/>
+          </p:cNvSpPr>
+          <p:nvPr>
+            <p:ph type="sldNum" sz="quarter" idx="10"/>
+          </p:nvPr>
+        </p:nvSpPr>
+        <p:spPr/>
+        <p:txBody>
+          <a:bodyPr/>
+          <a:lstStyle/>
+          <a:p>
+            <a:fld id="{6E605815-6331-9444-B06E-921213318926}" type="slidenum">
+              <a:rPr lang="en-US" smtClean="0"/>
+              <a:t>19</a:t>
+            </a:fld>
+            <a:endParaRPr lang="en-US"/>
+          </a:p>
+        </p:txBody>
+      </p:sp>
+    </p:spTree>
+    <p:extLst>
+      <p:ext uri="{BB962C8B-B14F-4D97-AF65-F5344CB8AC3E}">
+        <p14:creationId xmlns:p14="http://schemas.microsoft.com/office/powerpoint/2010/main" val="137340415"/>
+      </p:ext>
+    </p:extLst>
+  </p:cSld>
+  <p:clrMapOvr>
+    <a:masterClrMapping/>
+  </p:clrMapOvr>
+</p:notes>
+</file>
+
+<file path=ppt/notesSlides/notesSlide12.xml><?xml version="1.0" encoding="utf-8"?>
+<p:notes xmlns:a="http://schemas.openxmlformats.org/drawingml/2006/main" xmlns:r="http://schemas.openxmlformats.org/officeDocument/2006/relationships" xmlns:p="http://schemas.openxmlformats.org/presentationml/2006/main">
+  <p:cSld>
+    <p:spTree>
+      <p:nvGrpSpPr>
+        <p:cNvPr id="1" name=""/>
+        <p:cNvGrpSpPr/>
+        <p:nvPr/>
+      </p:nvGrpSpPr>
+      <p:grpSpPr>
+        <a:xfrm>
+          <a:off x="0" y="0"/>
+          <a:ext cx="0" cy="0"/>
+          <a:chOff x="0" y="0"/>
+          <a:chExt cx="0" cy="0"/>
+        </a:xfrm>
+      </p:grpSpPr>
+      <p:sp>
+        <p:nvSpPr>
+          <p:cNvPr id="2" name="Slide Image Placeholder 1"/>
+          <p:cNvSpPr>
+            <a:spLocks noGrp="1" noRot="1" noChangeAspect="1"/>
+          </p:cNvSpPr>
+          <p:nvPr>
+            <p:ph type="sldImg"/>
+          </p:nvPr>
+        </p:nvSpPr>
+        <p:spPr/>
+      </p:sp>
+      <p:sp>
+        <p:nvSpPr>
+          <p:cNvPr id="3" name="Notes Placeholder 2"/>
+          <p:cNvSpPr>
+            <a:spLocks noGrp="1"/>
+          </p:cNvSpPr>
+          <p:nvPr>
+            <p:ph type="body" idx="1"/>
+          </p:nvPr>
+        </p:nvSpPr>
+        <p:spPr/>
+        <p:txBody>
+          <a:bodyPr/>
+          <a:lstStyle/>
+          <a:p>
+            <a:r>
+              <a:rPr lang="en-US" dirty="0" smtClean="0"/>
+              <a:t>94.6 rounds to 95</a:t>
+            </a:r>
+            <a:endParaRPr lang="en-US" dirty="0"/>
+          </a:p>
+        </p:txBody>
+      </p:sp>
+      <p:sp>
+        <p:nvSpPr>
+          <p:cNvPr id="4" name="Slide Number Placeholder 3"/>
+          <p:cNvSpPr>
+            <a:spLocks noGrp="1"/>
+          </p:cNvSpPr>
+          <p:nvPr>
+            <p:ph type="sldNum" sz="quarter" idx="10"/>
+          </p:nvPr>
+        </p:nvSpPr>
+        <p:spPr/>
+        <p:txBody>
+          <a:bodyPr/>
+          <a:lstStyle/>
+          <a:p>
+            <a:fld id="{6E605815-6331-9444-B06E-921213318926}" type="slidenum">
+              <a:rPr lang="en-US" smtClean="0"/>
+              <a:t>21</a:t>
+            </a:fld>
+            <a:endParaRPr lang="en-US"/>
+          </a:p>
+        </p:txBody>
+      </p:sp>
+    </p:spTree>
+    <p:extLst>
+      <p:ext uri="{BB962C8B-B14F-4D97-AF65-F5344CB8AC3E}">
+        <p14:creationId xmlns:p14="http://schemas.microsoft.com/office/powerpoint/2010/main" val="2117320294"/>
+      </p:ext>
+    </p:extLst>
+  </p:cSld>
+  <p:clrMapOvr>
+    <a:masterClrMapping/>
+  </p:clrMapOvr>
+</p:notes>
+</file>
+
+<file path=ppt/notesSlides/notesSlide13.xml><?xml version="1.0" encoding="utf-8"?>
+<p:notes xmlns:a="http://schemas.openxmlformats.org/drawingml/2006/main" xmlns:r="http://schemas.openxmlformats.org/officeDocument/2006/relationships" xmlns:p="http://schemas.openxmlformats.org/presentationml/2006/main">
+  <p:cSld>
+    <p:spTree>
+      <p:nvGrpSpPr>
+        <p:cNvPr id="1" name=""/>
+        <p:cNvGrpSpPr/>
+        <p:nvPr/>
+      </p:nvGrpSpPr>
+      <p:grpSpPr>
+        <a:xfrm>
+          <a:off x="0" y="0"/>
+          <a:ext cx="0" cy="0"/>
+          <a:chOff x="0" y="0"/>
+          <a:chExt cx="0" cy="0"/>
+        </a:xfrm>
+      </p:grpSpPr>
+      <p:sp>
+        <p:nvSpPr>
+          <p:cNvPr id="2" name="Slide Image Placeholder 1"/>
+          <p:cNvSpPr>
+            <a:spLocks noGrp="1" noRot="1" noChangeAspect="1"/>
+          </p:cNvSpPr>
+          <p:nvPr>
+            <p:ph type="sldImg"/>
+          </p:nvPr>
+        </p:nvSpPr>
+        <p:spPr/>
+      </p:sp>
+      <p:sp>
+        <p:nvSpPr>
+          <p:cNvPr id="3" name="Notes Placeholder 2"/>
+          <p:cNvSpPr>
+            <a:spLocks noGrp="1"/>
+          </p:cNvSpPr>
+          <p:nvPr>
+            <p:ph type="body" idx="1"/>
+          </p:nvPr>
+        </p:nvSpPr>
+        <p:spPr/>
+        <p:txBody>
+          <a:bodyPr/>
+          <a:lstStyle/>
+          <a:p>
+            <a:r>
+              <a:rPr lang="en-US" dirty="0" smtClean="0"/>
+              <a:t>Durability test ran for 3 months</a:t>
+            </a:r>
+          </a:p>
+          <a:p>
+            <a:r>
+              <a:rPr lang="en-US" dirty="0" smtClean="0"/>
+              <a:t>Remove</a:t>
+            </a:r>
+            <a:r>
+              <a:rPr lang="en-US" baseline="0" dirty="0" smtClean="0"/>
+              <a:t> the 2 week history point</a:t>
+            </a:r>
+            <a:endParaRPr lang="en-US" dirty="0" smtClean="0"/>
+          </a:p>
+        </p:txBody>
+      </p:sp>
+      <p:sp>
+        <p:nvSpPr>
+          <p:cNvPr id="4" name="Slide Number Placeholder 3"/>
+          <p:cNvSpPr>
+            <a:spLocks noGrp="1"/>
+          </p:cNvSpPr>
+          <p:nvPr>
+            <p:ph type="sldNum" sz="quarter" idx="10"/>
+          </p:nvPr>
+        </p:nvSpPr>
+        <p:spPr/>
+        <p:txBody>
+          <a:bodyPr/>
+          <a:lstStyle/>
+          <a:p>
+            <a:fld id="{6E605815-6331-9444-B06E-921213318926}" type="slidenum">
+              <a:rPr lang="en-US" smtClean="0"/>
+              <a:t>22</a:t>
+            </a:fld>
+            <a:endParaRPr lang="en-US"/>
+          </a:p>
+        </p:txBody>
+      </p:sp>
+    </p:spTree>
+    <p:extLst>
+      <p:ext uri="{BB962C8B-B14F-4D97-AF65-F5344CB8AC3E}">
+        <p14:creationId xmlns:p14="http://schemas.microsoft.com/office/powerpoint/2010/main" val="3877329376"/>
+      </p:ext>
+    </p:extLst>
+  </p:cSld>
+  <p:clrMapOvr>
+    <a:masterClrMapping/>
+  </p:clrMapOvr>
+</p:notes>
+</file>
+
+<file path=ppt/notesSlides/notesSlide14.xml><?xml version="1.0" encoding="utf-8"?>
+<p:notes xmlns:a="http://schemas.openxmlformats.org/drawingml/2006/main" xmlns:r="http://schemas.openxmlformats.org/officeDocument/2006/relationships" xmlns:p="http://schemas.openxmlformats.org/presentationml/2006/main">
+  <p:cSld>
+    <p:spTree>
+      <p:nvGrpSpPr>
+        <p:cNvPr id="1" name=""/>
+        <p:cNvGrpSpPr/>
+        <p:nvPr/>
+      </p:nvGrpSpPr>
+      <p:grpSpPr>
+        <a:xfrm>
+          <a:off x="0" y="0"/>
+          <a:ext cx="0" cy="0"/>
+          <a:chOff x="0" y="0"/>
+          <a:chExt cx="0" cy="0"/>
+        </a:xfrm>
+      </p:grpSpPr>
+      <p:sp>
+        <p:nvSpPr>
+          <p:cNvPr id="2" name="Slide Image Placeholder 1"/>
+          <p:cNvSpPr>
+            <a:spLocks noGrp="1" noRot="1" noChangeAspect="1"/>
+          </p:cNvSpPr>
+          <p:nvPr>
+            <p:ph type="sldImg"/>
+          </p:nvPr>
+        </p:nvSpPr>
+        <p:spPr/>
+      </p:sp>
+      <p:sp>
+        <p:nvSpPr>
+          <p:cNvPr id="3" name="Notes Placeholder 2"/>
+          <p:cNvSpPr>
+            <a:spLocks noGrp="1"/>
+          </p:cNvSpPr>
+          <p:nvPr>
+            <p:ph type="body" idx="1"/>
+          </p:nvPr>
+        </p:nvSpPr>
+        <p:spPr/>
+        <p:txBody>
+          <a:bodyPr/>
+          <a:lstStyle/>
+          <a:p>
+            <a:r>
+              <a:rPr lang="en-US" dirty="0" smtClean="0"/>
+              <a:t>Correlated instead</a:t>
+            </a:r>
+            <a:r>
+              <a:rPr lang="en-US" baseline="0" dirty="0" smtClean="0"/>
+              <a:t> of explained by</a:t>
+            </a:r>
+          </a:p>
+          <a:p>
+            <a:r>
+              <a:rPr lang="en-US" baseline="0" dirty="0" smtClean="0"/>
+              <a:t>Use an action sequence diagram</a:t>
+            </a:r>
+            <a:endParaRPr lang="en-US" dirty="0"/>
+          </a:p>
+        </p:txBody>
+      </p:sp>
+      <p:sp>
+        <p:nvSpPr>
+          <p:cNvPr id="4" name="Slide Number Placeholder 3"/>
+          <p:cNvSpPr>
+            <a:spLocks noGrp="1"/>
+          </p:cNvSpPr>
+          <p:nvPr>
+            <p:ph type="sldNum" sz="quarter" idx="10"/>
+          </p:nvPr>
+        </p:nvSpPr>
+        <p:spPr/>
+        <p:txBody>
+          <a:bodyPr/>
+          <a:lstStyle/>
+          <a:p>
+            <a:fld id="{6E605815-6331-9444-B06E-921213318926}" type="slidenum">
+              <a:rPr lang="en-US" smtClean="0"/>
+              <a:t>23</a:t>
+            </a:fld>
+            <a:endParaRPr lang="en-US"/>
+          </a:p>
+        </p:txBody>
+      </p:sp>
+    </p:spTree>
+    <p:extLst>
+      <p:ext uri="{BB962C8B-B14F-4D97-AF65-F5344CB8AC3E}">
+        <p14:creationId xmlns:p14="http://schemas.microsoft.com/office/powerpoint/2010/main" val="577673501"/>
+      </p:ext>
+    </p:extLst>
+  </p:cSld>
+  <p:clrMapOvr>
+    <a:masterClrMapping/>
+  </p:clrMapOvr>
+</p:notes>
+</file>
+
+<file path=ppt/notesSlides/notesSlide15.xml><?xml version="1.0" encoding="utf-8"?>
+<p:notes xmlns:a="http://schemas.openxmlformats.org/drawingml/2006/main" xmlns:r="http://schemas.openxmlformats.org/officeDocument/2006/relationships" xmlns:p="http://schemas.openxmlformats.org/presentationml/2006/main">
+  <p:cSld>
+    <p:spTree>
+      <p:nvGrpSpPr>
+        <p:cNvPr id="1" name=""/>
+        <p:cNvGrpSpPr/>
+        <p:nvPr/>
+      </p:nvGrpSpPr>
+      <p:grpSpPr>
+        <a:xfrm>
+          <a:off x="0" y="0"/>
+          <a:ext cx="0" cy="0"/>
+          <a:chOff x="0" y="0"/>
+          <a:chExt cx="0" cy="0"/>
+        </a:xfrm>
+      </p:grpSpPr>
+      <p:sp>
+        <p:nvSpPr>
+          <p:cNvPr id="2" name="Slide Image Placeholder 1"/>
+          <p:cNvSpPr>
+            <a:spLocks noGrp="1" noRot="1" noChangeAspect="1"/>
+          </p:cNvSpPr>
+          <p:nvPr>
+            <p:ph type="sldImg"/>
+          </p:nvPr>
+        </p:nvSpPr>
+        <p:spPr/>
+      </p:sp>
+      <p:sp>
+        <p:nvSpPr>
+          <p:cNvPr id="3" name="Notes Placeholder 2"/>
+          <p:cNvSpPr>
+            <a:spLocks noGrp="1"/>
+          </p:cNvSpPr>
+          <p:nvPr>
+            <p:ph type="body" idx="1"/>
+          </p:nvPr>
+        </p:nvSpPr>
+        <p:spPr/>
+        <p:txBody>
+          <a:bodyPr/>
+          <a:lstStyle/>
+          <a:p>
+            <a:r>
+              <a:rPr lang="en-US" dirty="0" smtClean="0"/>
+              <a:t>Use existing tools/methods</a:t>
+            </a:r>
+          </a:p>
+          <a:p>
+            <a:r>
+              <a:rPr lang="en-US" dirty="0" smtClean="0"/>
+              <a:t>Implement</a:t>
+            </a:r>
+            <a:r>
+              <a:rPr lang="en-US" baseline="0" dirty="0" smtClean="0"/>
+              <a:t> a framework that allows using different methods and test them</a:t>
+            </a:r>
+            <a:endParaRPr lang="en-US" dirty="0"/>
+          </a:p>
+        </p:txBody>
+      </p:sp>
+      <p:sp>
+        <p:nvSpPr>
+          <p:cNvPr id="4" name="Slide Number Placeholder 3"/>
+          <p:cNvSpPr>
+            <a:spLocks noGrp="1"/>
+          </p:cNvSpPr>
+          <p:nvPr>
+            <p:ph type="sldNum" sz="quarter" idx="10"/>
+          </p:nvPr>
+        </p:nvSpPr>
+        <p:spPr/>
+        <p:txBody>
+          <a:bodyPr/>
+          <a:lstStyle/>
+          <a:p>
+            <a:fld id="{6E605815-6331-9444-B06E-921213318926}" type="slidenum">
+              <a:rPr lang="en-US" smtClean="0"/>
+              <a:t>24</a:t>
+            </a:fld>
+            <a:endParaRPr lang="en-US"/>
+          </a:p>
+        </p:txBody>
+      </p:sp>
+    </p:spTree>
+    <p:extLst>
+      <p:ext uri="{BB962C8B-B14F-4D97-AF65-F5344CB8AC3E}">
+        <p14:creationId xmlns:p14="http://schemas.microsoft.com/office/powerpoint/2010/main" val="3458402424"/>
+      </p:ext>
+    </p:extLst>
+  </p:cSld>
+  <p:clrMapOvr>
+    <a:masterClrMapping/>
+  </p:clrMapOvr>
+</p:notes>
+</file>
+
+<file path=ppt/notesSlides/notesSlide16.xml><?xml version="1.0" encoding="utf-8"?>
+<p:notes xmlns:a="http://schemas.openxmlformats.org/drawingml/2006/main" xmlns:r="http://schemas.openxmlformats.org/officeDocument/2006/relationships" xmlns:p="http://schemas.openxmlformats.org/presentationml/2006/main">
+  <p:cSld>
+    <p:spTree>
+      <p:nvGrpSpPr>
+        <p:cNvPr id="1" name=""/>
+        <p:cNvGrpSpPr/>
+        <p:nvPr/>
+      </p:nvGrpSpPr>
+      <p:grpSpPr>
+        <a:xfrm>
+          <a:off x="0" y="0"/>
+          <a:ext cx="0" cy="0"/>
+          <a:chOff x="0" y="0"/>
+          <a:chExt cx="0" cy="0"/>
+        </a:xfrm>
+      </p:grpSpPr>
+      <p:sp>
+        <p:nvSpPr>
+          <p:cNvPr id="2" name="Slide Image Placeholder 1"/>
+          <p:cNvSpPr>
+            <a:spLocks noGrp="1" noRot="1" noChangeAspect="1"/>
+          </p:cNvSpPr>
+          <p:nvPr>
+            <p:ph type="sldImg"/>
+          </p:nvPr>
+        </p:nvSpPr>
+        <p:spPr/>
+      </p:sp>
+      <p:sp>
+        <p:nvSpPr>
+          <p:cNvPr id="3" name="Notes Placeholder 2"/>
+          <p:cNvSpPr>
+            <a:spLocks noGrp="1"/>
+          </p:cNvSpPr>
+          <p:nvPr>
+            <p:ph type="body" idx="1"/>
+          </p:nvPr>
+        </p:nvSpPr>
+        <p:spPr/>
+        <p:txBody>
+          <a:bodyPr/>
+          <a:lstStyle/>
+          <a:p>
+            <a:r>
+              <a:rPr lang="en-US" dirty="0" smtClean="0"/>
+              <a:t>Without application instrumentation</a:t>
+            </a:r>
+          </a:p>
+          <a:p>
+            <a:r>
+              <a:rPr lang="en-US" dirty="0" smtClean="0"/>
+              <a:t>Sequences instead of paths</a:t>
+            </a:r>
+          </a:p>
+          <a:p>
+            <a:r>
+              <a:rPr lang="en-US" dirty="0" smtClean="0"/>
+              <a:t>Call sequences</a:t>
+            </a:r>
+            <a:endParaRPr lang="en-US" dirty="0"/>
+          </a:p>
+        </p:txBody>
+      </p:sp>
+      <p:sp>
+        <p:nvSpPr>
+          <p:cNvPr id="4" name="Slide Number Placeholder 3"/>
+          <p:cNvSpPr>
+            <a:spLocks noGrp="1"/>
+          </p:cNvSpPr>
+          <p:nvPr>
+            <p:ph type="sldNum" sz="quarter" idx="10"/>
+          </p:nvPr>
+        </p:nvSpPr>
+        <p:spPr/>
+        <p:txBody>
+          <a:bodyPr/>
+          <a:lstStyle/>
+          <a:p>
+            <a:fld id="{6E605815-6331-9444-B06E-921213318926}" type="slidenum">
+              <a:rPr lang="en-US" smtClean="0"/>
+              <a:t>28</a:t>
+            </a:fld>
+            <a:endParaRPr lang="en-US"/>
+          </a:p>
+        </p:txBody>
+      </p:sp>
+    </p:spTree>
+    <p:extLst>
+      <p:ext uri="{BB962C8B-B14F-4D97-AF65-F5344CB8AC3E}">
+        <p14:creationId xmlns:p14="http://schemas.microsoft.com/office/powerpoint/2010/main" val="3355842071"/>
+      </p:ext>
+    </p:extLst>
+  </p:cSld>
+  <p:clrMapOvr>
+    <a:masterClrMapping/>
+  </p:clrMapOvr>
+</p:notes>
+</file>
+
+<file path=ppt/notesSlides/notesSlide17.xml><?xml version="1.0" encoding="utf-8"?>
+<p:notes xmlns:a="http://schemas.openxmlformats.org/drawingml/2006/main" xmlns:r="http://schemas.openxmlformats.org/officeDocument/2006/relationships" xmlns:p="http://schemas.openxmlformats.org/presentationml/2006/main">
+  <p:cSld>
+    <p:spTree>
+      <p:nvGrpSpPr>
+        <p:cNvPr id="1" name=""/>
+        <p:cNvGrpSpPr/>
+        <p:nvPr/>
+      </p:nvGrpSpPr>
+      <p:grpSpPr>
+        <a:xfrm>
+          <a:off x="0" y="0"/>
+          <a:ext cx="0" cy="0"/>
+          <a:chOff x="0" y="0"/>
+          <a:chExt cx="0" cy="0"/>
+        </a:xfrm>
+      </p:grpSpPr>
+      <p:sp>
+        <p:nvSpPr>
+          <p:cNvPr id="2" name="Slide Image Placeholder 1"/>
+          <p:cNvSpPr>
+            <a:spLocks noGrp="1" noRot="1" noChangeAspect="1"/>
+          </p:cNvSpPr>
+          <p:nvPr>
+            <p:ph type="sldImg"/>
+          </p:nvPr>
+        </p:nvSpPr>
+        <p:spPr/>
+      </p:sp>
+      <p:sp>
+        <p:nvSpPr>
+          <p:cNvPr id="3" name="Notes Placeholder 2"/>
+          <p:cNvSpPr>
+            <a:spLocks noGrp="1"/>
+          </p:cNvSpPr>
+          <p:nvPr>
+            <p:ph type="body" idx="1"/>
+          </p:nvPr>
+        </p:nvSpPr>
+        <p:spPr/>
+        <p:txBody>
+          <a:bodyPr/>
+          <a:lstStyle/>
+          <a:p>
+            <a:r>
+              <a:rPr lang="en-US" dirty="0" smtClean="0"/>
+              <a:t>Use a detailed</a:t>
+            </a:r>
+            <a:r>
+              <a:rPr lang="en-US" baseline="0" dirty="0" smtClean="0"/>
+              <a:t> code diagram</a:t>
+            </a:r>
+            <a:endParaRPr lang="en-US" dirty="0"/>
+          </a:p>
+        </p:txBody>
+      </p:sp>
+      <p:sp>
+        <p:nvSpPr>
+          <p:cNvPr id="4" name="Slide Number Placeholder 3"/>
+          <p:cNvSpPr>
+            <a:spLocks noGrp="1"/>
+          </p:cNvSpPr>
+          <p:nvPr>
+            <p:ph type="sldNum" sz="quarter" idx="10"/>
+          </p:nvPr>
+        </p:nvSpPr>
+        <p:spPr/>
+        <p:txBody>
+          <a:bodyPr/>
+          <a:lstStyle/>
+          <a:p>
+            <a:fld id="{6E605815-6331-9444-B06E-921213318926}" type="slidenum">
+              <a:rPr lang="en-US" smtClean="0"/>
+              <a:t>29</a:t>
+            </a:fld>
+            <a:endParaRPr lang="en-US"/>
+          </a:p>
+        </p:txBody>
+      </p:sp>
+    </p:spTree>
+    <p:extLst>
+      <p:ext uri="{BB962C8B-B14F-4D97-AF65-F5344CB8AC3E}">
+        <p14:creationId xmlns:p14="http://schemas.microsoft.com/office/powerpoint/2010/main" val="640735186"/>
+      </p:ext>
+    </p:extLst>
+  </p:cSld>
+  <p:clrMapOvr>
+    <a:masterClrMapping/>
+  </p:clrMapOvr>
+</p:notes>
+</file>
+
+<file path=ppt/notesSlides/notesSlide18.xml><?xml version="1.0" encoding="utf-8"?>
+<p:notes xmlns:a="http://schemas.openxmlformats.org/drawingml/2006/main" xmlns:r="http://schemas.openxmlformats.org/officeDocument/2006/relationships" xmlns:p="http://schemas.openxmlformats.org/presentationml/2006/main">
+  <p:cSld>
+    <p:spTree>
+      <p:nvGrpSpPr>
+        <p:cNvPr id="1" name=""/>
+        <p:cNvGrpSpPr/>
+        <p:nvPr/>
+      </p:nvGrpSpPr>
+      <p:grpSpPr>
+        <a:xfrm>
+          <a:off x="0" y="0"/>
+          <a:ext cx="0" cy="0"/>
+          <a:chOff x="0" y="0"/>
+          <a:chExt cx="0" cy="0"/>
+        </a:xfrm>
+      </p:grpSpPr>
+      <p:sp>
+        <p:nvSpPr>
+          <p:cNvPr id="2" name="Slide Image Placeholder 1"/>
+          <p:cNvSpPr>
+            <a:spLocks noGrp="1" noRot="1" noChangeAspect="1"/>
+          </p:cNvSpPr>
+          <p:nvPr>
+            <p:ph type="sldImg"/>
+          </p:nvPr>
+        </p:nvSpPr>
+        <p:spPr/>
+      </p:sp>
+      <p:sp>
+        <p:nvSpPr>
+          <p:cNvPr id="3" name="Notes Placeholder 2"/>
+          <p:cNvSpPr>
+            <a:spLocks noGrp="1"/>
+          </p:cNvSpPr>
+          <p:nvPr>
+            <p:ph type="body" idx="1"/>
+          </p:nvPr>
+        </p:nvSpPr>
+        <p:spPr/>
+        <p:txBody>
+          <a:bodyPr/>
+          <a:lstStyle/>
+          <a:p>
+            <a:r>
+              <a:rPr lang="en-US" dirty="0" smtClean="0"/>
+              <a:t>Explain</a:t>
+            </a:r>
+            <a:r>
+              <a:rPr lang="en-US" baseline="0" dirty="0" smtClean="0"/>
+              <a:t> my contributions</a:t>
+            </a:r>
+          </a:p>
+          <a:p>
+            <a:pPr marL="171450" indent="-171450">
+              <a:buFontTx/>
+              <a:buChar char="-"/>
+            </a:pPr>
+            <a:r>
+              <a:rPr lang="en-US" baseline="0" dirty="0" smtClean="0"/>
+              <a:t>Deployment time governance, scalable</a:t>
+            </a:r>
+          </a:p>
+          <a:p>
+            <a:pPr marL="171450" indent="-171450">
+              <a:buFontTx/>
+              <a:buChar char="-"/>
+            </a:pPr>
+            <a:r>
+              <a:rPr lang="en-US" baseline="0" dirty="0" smtClean="0"/>
+              <a:t>Correct, tight SLAs without any testing or instrumentation</a:t>
+            </a:r>
+          </a:p>
+          <a:p>
+            <a:pPr marL="171450" indent="-171450">
+              <a:buFontTx/>
+              <a:buChar char="-"/>
+            </a:pPr>
+            <a:endParaRPr lang="en-US" baseline="0" dirty="0" smtClean="0"/>
+          </a:p>
+          <a:p>
+            <a:pPr marL="171450" indent="-171450">
+              <a:buFontTx/>
+              <a:buChar char="-"/>
+            </a:pPr>
+            <a:endParaRPr lang="en-US" dirty="0" smtClean="0"/>
+          </a:p>
+          <a:p>
+            <a:pPr marL="171450" indent="-171450">
+              <a:buFontTx/>
+              <a:buChar char="-"/>
+            </a:pPr>
+            <a:r>
+              <a:rPr lang="en-US" dirty="0" smtClean="0"/>
+              <a:t>Methodology for formulating</a:t>
+            </a:r>
+            <a:r>
+              <a:rPr lang="is-IS" dirty="0" smtClean="0"/>
+              <a:t>…</a:t>
+            </a:r>
+          </a:p>
+          <a:p>
+            <a:pPr marL="171450" indent="-171450">
+              <a:buFontTx/>
+              <a:buChar char="-"/>
+            </a:pPr>
+            <a:r>
+              <a:rPr lang="is-IS" smtClean="0"/>
+              <a:t>Frmaework for scalable cloud app....</a:t>
+            </a:r>
+            <a:endParaRPr lang="en-US" dirty="0"/>
+          </a:p>
+          <a:p>
+            <a:r>
+              <a:rPr lang="en-US" dirty="0"/>
+              <a:t>----- Meeting Notes (4/14/16 14:44) -----</a:t>
+            </a:r>
+          </a:p>
+          <a:p>
+            <a:r>
+              <a:rPr lang="en-US" dirty="0"/>
+              <a:t>3 chapter intros for EAGER, </a:t>
+            </a:r>
+            <a:r>
+              <a:rPr lang="en-US" dirty="0" err="1"/>
+              <a:t>Cerebro</a:t>
+            </a:r>
+            <a:r>
+              <a:rPr lang="en-US" dirty="0"/>
+              <a:t>, Roots</a:t>
+            </a:r>
+          </a:p>
+          <a:p>
+            <a:endParaRPr lang="en-US" dirty="0"/>
+          </a:p>
+          <a:p>
+            <a:r>
+              <a:rPr lang="en-US" dirty="0"/>
+              <a:t>My thesis will....</a:t>
+            </a:r>
+          </a:p>
+          <a:p>
+            <a:endParaRPr lang="en-US" dirty="0"/>
+          </a:p>
+          <a:p>
+            <a:r>
+              <a:rPr lang="en-US" dirty="0"/>
+              <a:t>Add timeline</a:t>
+            </a:r>
+          </a:p>
+          <a:p>
+            <a:endParaRPr lang="en-US" dirty="0"/>
+          </a:p>
+          <a:p>
+            <a:r>
+              <a:rPr lang="en-US" dirty="0"/>
+              <a:t>Related work</a:t>
+            </a:r>
+          </a:p>
+        </p:txBody>
+      </p:sp>
+      <p:sp>
+        <p:nvSpPr>
+          <p:cNvPr id="4" name="Slide Number Placeholder 3"/>
+          <p:cNvSpPr>
+            <a:spLocks noGrp="1"/>
+          </p:cNvSpPr>
+          <p:nvPr>
+            <p:ph type="sldNum" sz="quarter" idx="10"/>
+          </p:nvPr>
+        </p:nvSpPr>
+        <p:spPr/>
+        <p:txBody>
+          <a:bodyPr/>
+          <a:lstStyle/>
+          <a:p>
+            <a:fld id="{6E605815-6331-9444-B06E-921213318926}" type="slidenum">
+              <a:rPr lang="en-US" smtClean="0"/>
+              <a:t>30</a:t>
+            </a:fld>
+            <a:endParaRPr lang="en-US"/>
+          </a:p>
+        </p:txBody>
+      </p:sp>
+    </p:spTree>
+    <p:extLst>
+      <p:ext uri="{BB962C8B-B14F-4D97-AF65-F5344CB8AC3E}">
+        <p14:creationId xmlns:p14="http://schemas.microsoft.com/office/powerpoint/2010/main" val="3675898073"/>
+      </p:ext>
+    </p:extLst>
+  </p:cSld>
+  <p:clrMapOvr>
+    <a:masterClrMapping/>
+  </p:clrMapOvr>
+</p:notes>
+</file>
+
+<file path=ppt/notesSlides/notesSlide19.xml><?xml version="1.0" encoding="utf-8"?>
+<p:notes xmlns:a="http://schemas.openxmlformats.org/drawingml/2006/main" xmlns:r="http://schemas.openxmlformats.org/officeDocument/2006/relationships" xmlns:p="http://schemas.openxmlformats.org/presentationml/2006/main">
+  <p:cSld>
+    <p:spTree>
+      <p:nvGrpSpPr>
+        <p:cNvPr id="1" name=""/>
+        <p:cNvGrpSpPr/>
+        <p:nvPr/>
+      </p:nvGrpSpPr>
+      <p:grpSpPr>
+        <a:xfrm>
+          <a:off x="0" y="0"/>
+          <a:ext cx="0" cy="0"/>
+          <a:chOff x="0" y="0"/>
+          <a:chExt cx="0" cy="0"/>
+        </a:xfrm>
+      </p:grpSpPr>
+      <p:sp>
+        <p:nvSpPr>
+          <p:cNvPr id="2" name="Slide Image Placeholder 1"/>
+          <p:cNvSpPr>
+            <a:spLocks noGrp="1" noRot="1" noChangeAspect="1"/>
+          </p:cNvSpPr>
+          <p:nvPr>
+            <p:ph type="sldImg"/>
+          </p:nvPr>
+        </p:nvSpPr>
+        <p:spPr/>
+      </p:sp>
+      <p:sp>
+        <p:nvSpPr>
+          <p:cNvPr id="3" name="Notes Placeholder 2"/>
+          <p:cNvSpPr>
+            <a:spLocks noGrp="1"/>
+          </p:cNvSpPr>
+          <p:nvPr>
+            <p:ph type="body" idx="1"/>
+          </p:nvPr>
+        </p:nvSpPr>
+        <p:spPr/>
+        <p:txBody>
+          <a:bodyPr/>
+          <a:lstStyle/>
+          <a:p>
+            <a:r>
+              <a:rPr lang="en-US" dirty="0" smtClean="0"/>
+              <a:t>Outlier at t</a:t>
+            </a:r>
+            <a:r>
+              <a:rPr lang="en-US" baseline="0" dirty="0" smtClean="0"/>
+              <a:t> = 101 detected as a Level Shift (LS).</a:t>
+            </a:r>
+            <a:endParaRPr lang="en-US" dirty="0"/>
+          </a:p>
+        </p:txBody>
+      </p:sp>
+      <p:sp>
+        <p:nvSpPr>
+          <p:cNvPr id="4" name="Slide Number Placeholder 3"/>
+          <p:cNvSpPr>
+            <a:spLocks noGrp="1"/>
+          </p:cNvSpPr>
+          <p:nvPr>
+            <p:ph type="sldNum" sz="quarter" idx="10"/>
+          </p:nvPr>
+        </p:nvSpPr>
+        <p:spPr/>
+        <p:txBody>
+          <a:bodyPr/>
+          <a:lstStyle/>
+          <a:p>
+            <a:fld id="{F7278AEC-EE64-7842-B08E-D93D33560D10}" type="slidenum">
+              <a:rPr lang="en-US" smtClean="0"/>
+              <a:t>49</a:t>
+            </a:fld>
+            <a:endParaRPr lang="en-US"/>
+          </a:p>
+        </p:txBody>
+      </p:sp>
+    </p:spTree>
+    <p:extLst>
+      <p:ext uri="{BB962C8B-B14F-4D97-AF65-F5344CB8AC3E}">
+        <p14:creationId xmlns:p14="http://schemas.microsoft.com/office/powerpoint/2010/main" val="3404154749"/>
       </p:ext>
     </p:extLst>
   </p:cSld>
@@ -930,46 +1936,23 @@
           <a:bodyPr/>
           <a:lstStyle/>
           <a:p>
-            <a:endParaRPr lang="en-US"/>
-          </a:p>
-          <a:p>
-            <a:r>
-              <a:rPr lang="en-US"/>
-              <a:t>----- Meeting Notes (4/14/16 14:44) -----</a:t>
-            </a:r>
-          </a:p>
-          <a:p>
-            <a:r>
-              <a:rPr lang="en-US"/>
-              <a:t>3 chapter intros for EAGER, Cerebro, Roots</a:t>
-            </a:r>
-          </a:p>
-          <a:p>
-            <a:endParaRPr lang="en-US"/>
-          </a:p>
-          <a:p>
-            <a:r>
-              <a:rPr lang="en-US"/>
-              <a:t>My thesis will....</a:t>
-            </a:r>
-          </a:p>
-          <a:p>
-            <a:endParaRPr lang="en-US"/>
-          </a:p>
-          <a:p>
-            <a:r>
-              <a:rPr lang="en-US"/>
-              <a:t>Add timeline</a:t>
-            </a:r>
-          </a:p>
-          <a:p>
-            <a:endParaRPr lang="en-US"/>
-          </a:p>
-          <a:p>
-            <a:r>
-              <a:rPr lang="en-US"/>
-              <a:t>Related work</a:t>
-            </a:r>
+            <a:r>
+              <a:rPr lang="en-US" dirty="0" smtClean="0"/>
+              <a:t>Define SLAs and SLOs</a:t>
+            </a:r>
+          </a:p>
+          <a:p>
+            <a:r>
+              <a:rPr lang="en-US" dirty="0" smtClean="0"/>
+              <a:t>Why we need to “reason” about performance? To form SLAs</a:t>
+            </a:r>
+          </a:p>
+          <a:p>
+            <a:r>
+              <a:rPr lang="en-US" dirty="0" smtClean="0"/>
+              <a:t>Remove picture</a:t>
+            </a:r>
+            <a:endParaRPr lang="en-US" dirty="0"/>
           </a:p>
         </p:txBody>
       </p:sp>
@@ -990,7 +1973,7 @@
           <a:p>
             <a:fld id="{6E605815-6331-9444-B06E-921213318926}" type="slidenum">
               <a:rPr lang="en-US" smtClean="0"/>
-              <a:t>30</a:t>
+              <a:t>5</a:t>
             </a:fld>
             <a:endParaRPr lang="en-US"/>
           </a:p>
@@ -999,7 +1982,7 @@
     </p:spTree>
     <p:extLst>
       <p:ext uri="{BB962C8B-B14F-4D97-AF65-F5344CB8AC3E}">
-        <p14:creationId xmlns:p14="http://schemas.microsoft.com/office/powerpoint/2010/main" val="3675898073"/>
+        <p14:creationId xmlns:p14="http://schemas.microsoft.com/office/powerpoint/2010/main" val="830382234"/>
       </p:ext>
     </p:extLst>
   </p:cSld>
@@ -1053,16 +2036,67 @@
           <a:bodyPr/>
           <a:lstStyle/>
           <a:p>
-            <a:r>
-              <a:rPr lang="en-US" dirty="0" smtClean="0"/>
-              <a:t>Outlier at t</a:t>
-            </a:r>
-            <a:r>
-              <a:rPr lang="en-US" baseline="0" dirty="0" smtClean="0"/>
-              <a:t> = 101 detected as a Level Shift (LS).</a:t>
-            </a:r>
+            <a:pPr marL="0" marR="0" indent="0" algn="l" defTabSz="457200" rtl="0" eaLnBrk="1" fontAlgn="auto" latinLnBrk="0" hangingPunct="1">
+              <a:lnSpc>
+                <a:spcPct val="100000"/>
+              </a:lnSpc>
+              <a:spcBef>
+                <a:spcPts val="0"/>
+              </a:spcBef>
+              <a:spcAft>
+                <a:spcPts val="0"/>
+              </a:spcAft>
+              <a:buClrTx/>
+              <a:buSzTx/>
+              <a:buFontTx/>
+              <a:buNone/>
+              <a:tabLst/>
+              <a:defRPr/>
+            </a:pPr>
+            <a:r>
+              <a:rPr lang="en-US" dirty="0" smtClean="0"/>
+              <a:t>Can we enforce design-time governance on web applications developed for a given cloud platform so as to ensure proper versioning, dependency management and conformance to other developer best practices, and also enforce run-time governance on them so as to automatically determine the expected runtime performance of the applications, detect SLA violations and detect performance anomalies and perform root cause analysis, with minimal developer intervention and no invasive instrumentation on the applications?</a:t>
+            </a:r>
+          </a:p>
+          <a:p>
+            <a:endParaRPr lang="en-US" dirty="0" smtClean="0"/>
+          </a:p>
+          <a:p>
+            <a:endParaRPr lang="en-US" dirty="0" smtClean="0"/>
+          </a:p>
+          <a:p>
             <a:endParaRPr lang="en-US" dirty="0"/>
           </a:p>
+          <a:p>
+            <a:r>
+              <a:rPr lang="en-US" dirty="0"/>
+              <a:t>----- Meeting Notes (4/14/16 14:44) -----</a:t>
+            </a:r>
+          </a:p>
+          <a:p>
+            <a:r>
+              <a:rPr lang="en-US" dirty="0"/>
+              <a:t>can we define and enforce efficient policies that govern administrative conformance, developer best practices, and performance objectives through automated analysis and diagnostics for cloud applications?</a:t>
+            </a:r>
+          </a:p>
+          <a:p>
+            <a:r>
+              <a:rPr lang="en-US" dirty="0"/>
+              <a:t>- governance</a:t>
+            </a:r>
+          </a:p>
+          <a:p>
+            <a:r>
+              <a:rPr lang="en-US" dirty="0"/>
+              <a:t>- automated</a:t>
+            </a:r>
+          </a:p>
+          <a:p>
+            <a:r>
+              <a:rPr lang="en-US" dirty="0"/>
+              <a:t>- efficient: non-invasive, simple, productivity enhancing</a:t>
+            </a:r>
+          </a:p>
         </p:txBody>
       </p:sp>
       <p:sp>
@@ -1080,9 +2114,9 @@
           <a:bodyPr/>
           <a:lstStyle/>
           <a:p>
-            <a:fld id="{F7278AEC-EE64-7842-B08E-D93D33560D10}" type="slidenum">
+            <a:fld id="{6E605815-6331-9444-B06E-921213318926}" type="slidenum">
               <a:rPr lang="en-US" smtClean="0"/>
-              <a:t>49</a:t>
+              <a:t>8</a:t>
             </a:fld>
             <a:endParaRPr lang="en-US"/>
           </a:p>
@@ -1091,7 +2125,632 @@
     </p:spTree>
     <p:extLst>
       <p:ext uri="{BB962C8B-B14F-4D97-AF65-F5344CB8AC3E}">
-        <p14:creationId xmlns:p14="http://schemas.microsoft.com/office/powerpoint/2010/main" val="3404154749"/>
+        <p14:creationId xmlns:p14="http://schemas.microsoft.com/office/powerpoint/2010/main" val="801249288"/>
+      </p:ext>
+    </p:extLst>
+  </p:cSld>
+  <p:clrMapOvr>
+    <a:masterClrMapping/>
+  </p:clrMapOvr>
+</p:notes>
+</file>
+
+<file path=ppt/notesSlides/notesSlide4.xml><?xml version="1.0" encoding="utf-8"?>
+<p:notes xmlns:a="http://schemas.openxmlformats.org/drawingml/2006/main" xmlns:r="http://schemas.openxmlformats.org/officeDocument/2006/relationships" xmlns:p="http://schemas.openxmlformats.org/presentationml/2006/main">
+  <p:cSld>
+    <p:spTree>
+      <p:nvGrpSpPr>
+        <p:cNvPr id="1" name=""/>
+        <p:cNvGrpSpPr/>
+        <p:nvPr/>
+      </p:nvGrpSpPr>
+      <p:grpSpPr>
+        <a:xfrm>
+          <a:off x="0" y="0"/>
+          <a:ext cx="0" cy="0"/>
+          <a:chOff x="0" y="0"/>
+          <a:chExt cx="0" cy="0"/>
+        </a:xfrm>
+      </p:grpSpPr>
+      <p:sp>
+        <p:nvSpPr>
+          <p:cNvPr id="2" name="Slide Image Placeholder 1"/>
+          <p:cNvSpPr>
+            <a:spLocks noGrp="1" noRot="1" noChangeAspect="1"/>
+          </p:cNvSpPr>
+          <p:nvPr>
+            <p:ph type="sldImg"/>
+          </p:nvPr>
+        </p:nvSpPr>
+        <p:spPr/>
+      </p:sp>
+      <p:sp>
+        <p:nvSpPr>
+          <p:cNvPr id="3" name="Notes Placeholder 2"/>
+          <p:cNvSpPr>
+            <a:spLocks noGrp="1"/>
+          </p:cNvSpPr>
+          <p:nvPr>
+            <p:ph type="body" idx="1"/>
+          </p:nvPr>
+        </p:nvSpPr>
+        <p:spPr/>
+        <p:txBody>
+          <a:bodyPr/>
+          <a:lstStyle/>
+          <a:p>
+            <a:r>
+              <a:rPr lang="en-US" dirty="0" smtClean="0"/>
+              <a:t>Low overhead,</a:t>
+            </a:r>
+            <a:r>
+              <a:rPr lang="en-US" baseline="0" dirty="0" smtClean="0"/>
+              <a:t> Without human intervention</a:t>
+            </a:r>
+          </a:p>
+          <a:p>
+            <a:r>
+              <a:rPr lang="en-US" baseline="0" dirty="0" smtClean="0"/>
+              <a:t>“parameters for the system”</a:t>
+            </a:r>
+          </a:p>
+          <a:p>
+            <a:r>
+              <a:rPr lang="en-US" baseline="0" dirty="0" smtClean="0"/>
+              <a:t>Define governance – Application of policies to control system behavior</a:t>
+            </a:r>
+            <a:endParaRPr lang="en-US" dirty="0"/>
+          </a:p>
+        </p:txBody>
+      </p:sp>
+      <p:sp>
+        <p:nvSpPr>
+          <p:cNvPr id="4" name="Slide Number Placeholder 3"/>
+          <p:cNvSpPr>
+            <a:spLocks noGrp="1"/>
+          </p:cNvSpPr>
+          <p:nvPr>
+            <p:ph type="sldNum" sz="quarter" idx="10"/>
+          </p:nvPr>
+        </p:nvSpPr>
+        <p:spPr/>
+        <p:txBody>
+          <a:bodyPr/>
+          <a:lstStyle/>
+          <a:p>
+            <a:fld id="{6E605815-6331-9444-B06E-921213318926}" type="slidenum">
+              <a:rPr lang="en-US" smtClean="0"/>
+              <a:t>9</a:t>
+            </a:fld>
+            <a:endParaRPr lang="en-US"/>
+          </a:p>
+        </p:txBody>
+      </p:sp>
+    </p:spTree>
+    <p:extLst>
+      <p:ext uri="{BB962C8B-B14F-4D97-AF65-F5344CB8AC3E}">
+        <p14:creationId xmlns:p14="http://schemas.microsoft.com/office/powerpoint/2010/main" val="3693781556"/>
+      </p:ext>
+    </p:extLst>
+  </p:cSld>
+  <p:clrMapOvr>
+    <a:masterClrMapping/>
+  </p:clrMapOvr>
+</p:notes>
+</file>
+
+<file path=ppt/notesSlides/notesSlide5.xml><?xml version="1.0" encoding="utf-8"?>
+<p:notes xmlns:a="http://schemas.openxmlformats.org/drawingml/2006/main" xmlns:r="http://schemas.openxmlformats.org/officeDocument/2006/relationships" xmlns:p="http://schemas.openxmlformats.org/presentationml/2006/main">
+  <p:cSld>
+    <p:spTree>
+      <p:nvGrpSpPr>
+        <p:cNvPr id="1" name=""/>
+        <p:cNvGrpSpPr/>
+        <p:nvPr/>
+      </p:nvGrpSpPr>
+      <p:grpSpPr>
+        <a:xfrm>
+          <a:off x="0" y="0"/>
+          <a:ext cx="0" cy="0"/>
+          <a:chOff x="0" y="0"/>
+          <a:chExt cx="0" cy="0"/>
+        </a:xfrm>
+      </p:grpSpPr>
+      <p:sp>
+        <p:nvSpPr>
+          <p:cNvPr id="2" name="Slide Image Placeholder 1"/>
+          <p:cNvSpPr>
+            <a:spLocks noGrp="1" noRot="1" noChangeAspect="1"/>
+          </p:cNvSpPr>
+          <p:nvPr>
+            <p:ph type="sldImg"/>
+          </p:nvPr>
+        </p:nvSpPr>
+        <p:spPr/>
+      </p:sp>
+      <p:sp>
+        <p:nvSpPr>
+          <p:cNvPr id="3" name="Notes Placeholder 2"/>
+          <p:cNvSpPr>
+            <a:spLocks noGrp="1"/>
+          </p:cNvSpPr>
+          <p:nvPr>
+            <p:ph type="body" idx="1"/>
+          </p:nvPr>
+        </p:nvSpPr>
+        <p:spPr/>
+        <p:txBody>
+          <a:bodyPr/>
+          <a:lstStyle/>
+          <a:p>
+            <a:r>
+              <a:rPr lang="en-US" dirty="0" smtClean="0"/>
+              <a:t>Remove (a) and (b)</a:t>
+            </a:r>
+          </a:p>
+          <a:p>
+            <a:r>
+              <a:rPr lang="en-US" dirty="0" err="1" smtClean="0"/>
+              <a:t>PaaS</a:t>
+            </a:r>
+            <a:r>
+              <a:rPr lang="en-US" dirty="0" smtClean="0"/>
+              <a:t> logos</a:t>
+            </a:r>
+          </a:p>
+          <a:p>
+            <a:r>
+              <a:rPr lang="en-US" dirty="0" smtClean="0"/>
+              <a:t>Explain we use </a:t>
+            </a:r>
+            <a:r>
+              <a:rPr lang="en-US" dirty="0" err="1" smtClean="0"/>
+              <a:t>PaaS</a:t>
+            </a:r>
+            <a:r>
+              <a:rPr lang="en-US" dirty="0" smtClean="0"/>
+              <a:t> in the research a lot – provides a good </a:t>
+            </a:r>
+            <a:r>
+              <a:rPr lang="en-US" dirty="0" err="1" smtClean="0"/>
+              <a:t>impl</a:t>
+            </a:r>
+            <a:r>
+              <a:rPr lang="en-US" dirty="0" smtClean="0"/>
+              <a:t> framework for non-intrusive</a:t>
+            </a:r>
+            <a:r>
+              <a:rPr lang="en-US" baseline="0" dirty="0" smtClean="0"/>
+              <a:t> governance, real applications for testing</a:t>
+            </a:r>
+          </a:p>
+          <a:p>
+            <a:r>
+              <a:rPr lang="en-US" baseline="0" dirty="0" smtClean="0"/>
+              <a:t>Explain </a:t>
+            </a:r>
+            <a:r>
+              <a:rPr lang="en-US" baseline="0" dirty="0" err="1" smtClean="0"/>
+              <a:t>PaaS</a:t>
+            </a:r>
+            <a:r>
+              <a:rPr lang="en-US" baseline="0" dirty="0" smtClean="0"/>
+              <a:t> app lifecycle (deployment time </a:t>
+            </a:r>
+            <a:r>
+              <a:rPr lang="en-US" baseline="0" dirty="0" err="1" smtClean="0"/>
+              <a:t>vs</a:t>
+            </a:r>
+            <a:r>
+              <a:rPr lang="en-US" baseline="0" dirty="0" smtClean="0"/>
+              <a:t> run time)</a:t>
+            </a:r>
+            <a:endParaRPr lang="en-US" dirty="0"/>
+          </a:p>
+        </p:txBody>
+      </p:sp>
+      <p:sp>
+        <p:nvSpPr>
+          <p:cNvPr id="4" name="Slide Number Placeholder 3"/>
+          <p:cNvSpPr>
+            <a:spLocks noGrp="1"/>
+          </p:cNvSpPr>
+          <p:nvPr>
+            <p:ph type="sldNum" sz="quarter" idx="10"/>
+          </p:nvPr>
+        </p:nvSpPr>
+        <p:spPr/>
+        <p:txBody>
+          <a:bodyPr/>
+          <a:lstStyle/>
+          <a:p>
+            <a:fld id="{6E605815-6331-9444-B06E-921213318926}" type="slidenum">
+              <a:rPr lang="en-US" smtClean="0"/>
+              <a:t>10</a:t>
+            </a:fld>
+            <a:endParaRPr lang="en-US"/>
+          </a:p>
+        </p:txBody>
+      </p:sp>
+    </p:spTree>
+    <p:extLst>
+      <p:ext uri="{BB962C8B-B14F-4D97-AF65-F5344CB8AC3E}">
+        <p14:creationId xmlns:p14="http://schemas.microsoft.com/office/powerpoint/2010/main" val="1234915967"/>
+      </p:ext>
+    </p:extLst>
+  </p:cSld>
+  <p:clrMapOvr>
+    <a:masterClrMapping/>
+  </p:clrMapOvr>
+</p:notes>
+</file>
+
+<file path=ppt/notesSlides/notesSlide6.xml><?xml version="1.0" encoding="utf-8"?>
+<p:notes xmlns:a="http://schemas.openxmlformats.org/drawingml/2006/main" xmlns:r="http://schemas.openxmlformats.org/officeDocument/2006/relationships" xmlns:p="http://schemas.openxmlformats.org/presentationml/2006/main">
+  <p:cSld>
+    <p:spTree>
+      <p:nvGrpSpPr>
+        <p:cNvPr id="1" name=""/>
+        <p:cNvGrpSpPr/>
+        <p:nvPr/>
+      </p:nvGrpSpPr>
+      <p:grpSpPr>
+        <a:xfrm>
+          <a:off x="0" y="0"/>
+          <a:ext cx="0" cy="0"/>
+          <a:chOff x="0" y="0"/>
+          <a:chExt cx="0" cy="0"/>
+        </a:xfrm>
+      </p:grpSpPr>
+      <p:sp>
+        <p:nvSpPr>
+          <p:cNvPr id="2" name="Slide Image Placeholder 1"/>
+          <p:cNvSpPr>
+            <a:spLocks noGrp="1" noRot="1" noChangeAspect="1"/>
+          </p:cNvSpPr>
+          <p:nvPr>
+            <p:ph type="sldImg"/>
+          </p:nvPr>
+        </p:nvSpPr>
+        <p:spPr/>
+      </p:sp>
+      <p:sp>
+        <p:nvSpPr>
+          <p:cNvPr id="3" name="Notes Placeholder 2"/>
+          <p:cNvSpPr>
+            <a:spLocks noGrp="1"/>
+          </p:cNvSpPr>
+          <p:nvPr>
+            <p:ph type="body" idx="1"/>
+          </p:nvPr>
+        </p:nvSpPr>
+        <p:spPr/>
+        <p:txBody>
+          <a:bodyPr/>
+          <a:lstStyle/>
+          <a:p>
+            <a:r>
+              <a:rPr lang="en-US" dirty="0" smtClean="0"/>
+              <a:t>Make it clear that these are goals</a:t>
+            </a:r>
+            <a:endParaRPr lang="en-US" dirty="0"/>
+          </a:p>
+        </p:txBody>
+      </p:sp>
+      <p:sp>
+        <p:nvSpPr>
+          <p:cNvPr id="4" name="Slide Number Placeholder 3"/>
+          <p:cNvSpPr>
+            <a:spLocks noGrp="1"/>
+          </p:cNvSpPr>
+          <p:nvPr>
+            <p:ph type="sldNum" sz="quarter" idx="10"/>
+          </p:nvPr>
+        </p:nvSpPr>
+        <p:spPr/>
+        <p:txBody>
+          <a:bodyPr/>
+          <a:lstStyle/>
+          <a:p>
+            <a:fld id="{6E605815-6331-9444-B06E-921213318926}" type="slidenum">
+              <a:rPr lang="en-US" smtClean="0"/>
+              <a:t>11</a:t>
+            </a:fld>
+            <a:endParaRPr lang="en-US"/>
+          </a:p>
+        </p:txBody>
+      </p:sp>
+    </p:spTree>
+    <p:extLst>
+      <p:ext uri="{BB962C8B-B14F-4D97-AF65-F5344CB8AC3E}">
+        <p14:creationId xmlns:p14="http://schemas.microsoft.com/office/powerpoint/2010/main" val="2527794609"/>
+      </p:ext>
+    </p:extLst>
+  </p:cSld>
+  <p:clrMapOvr>
+    <a:masterClrMapping/>
+  </p:clrMapOvr>
+</p:notes>
+</file>
+
+<file path=ppt/notesSlides/notesSlide7.xml><?xml version="1.0" encoding="utf-8"?>
+<p:notes xmlns:a="http://schemas.openxmlformats.org/drawingml/2006/main" xmlns:r="http://schemas.openxmlformats.org/officeDocument/2006/relationships" xmlns:p="http://schemas.openxmlformats.org/presentationml/2006/main">
+  <p:cSld>
+    <p:spTree>
+      <p:nvGrpSpPr>
+        <p:cNvPr id="1" name=""/>
+        <p:cNvGrpSpPr/>
+        <p:nvPr/>
+      </p:nvGrpSpPr>
+      <p:grpSpPr>
+        <a:xfrm>
+          <a:off x="0" y="0"/>
+          <a:ext cx="0" cy="0"/>
+          <a:chOff x="0" y="0"/>
+          <a:chExt cx="0" cy="0"/>
+        </a:xfrm>
+      </p:grpSpPr>
+      <p:sp>
+        <p:nvSpPr>
+          <p:cNvPr id="2" name="Slide Image Placeholder 1"/>
+          <p:cNvSpPr>
+            <a:spLocks noGrp="1" noRot="1" noChangeAspect="1"/>
+          </p:cNvSpPr>
+          <p:nvPr>
+            <p:ph type="sldImg"/>
+          </p:nvPr>
+        </p:nvSpPr>
+        <p:spPr/>
+      </p:sp>
+      <p:sp>
+        <p:nvSpPr>
+          <p:cNvPr id="3" name="Notes Placeholder 2"/>
+          <p:cNvSpPr>
+            <a:spLocks noGrp="1"/>
+          </p:cNvSpPr>
+          <p:nvPr>
+            <p:ph type="body" idx="1"/>
+          </p:nvPr>
+        </p:nvSpPr>
+        <p:spPr/>
+        <p:txBody>
+          <a:bodyPr/>
+          <a:lstStyle/>
+          <a:p>
+            <a:r>
+              <a:rPr lang="en-US" dirty="0" smtClean="0"/>
+              <a:t>Emphasize</a:t>
+            </a:r>
+            <a:r>
+              <a:rPr lang="en-US" baseline="0" dirty="0" smtClean="0"/>
+              <a:t> the importance of deployment time governance – fail fast, no runtime overhead</a:t>
+            </a:r>
+            <a:endParaRPr lang="en-US" dirty="0"/>
+          </a:p>
+        </p:txBody>
+      </p:sp>
+      <p:sp>
+        <p:nvSpPr>
+          <p:cNvPr id="4" name="Slide Number Placeholder 3"/>
+          <p:cNvSpPr>
+            <a:spLocks noGrp="1"/>
+          </p:cNvSpPr>
+          <p:nvPr>
+            <p:ph type="sldNum" sz="quarter" idx="10"/>
+          </p:nvPr>
+        </p:nvSpPr>
+        <p:spPr/>
+        <p:txBody>
+          <a:bodyPr/>
+          <a:lstStyle/>
+          <a:p>
+            <a:fld id="{6E605815-6331-9444-B06E-921213318926}" type="slidenum">
+              <a:rPr lang="en-US" smtClean="0"/>
+              <a:t>13</a:t>
+            </a:fld>
+            <a:endParaRPr lang="en-US"/>
+          </a:p>
+        </p:txBody>
+      </p:sp>
+    </p:spTree>
+    <p:extLst>
+      <p:ext uri="{BB962C8B-B14F-4D97-AF65-F5344CB8AC3E}">
+        <p14:creationId xmlns:p14="http://schemas.microsoft.com/office/powerpoint/2010/main" val="756080791"/>
+      </p:ext>
+    </p:extLst>
+  </p:cSld>
+  <p:clrMapOvr>
+    <a:masterClrMapping/>
+  </p:clrMapOvr>
+</p:notes>
+</file>
+
+<file path=ppt/notesSlides/notesSlide8.xml><?xml version="1.0" encoding="utf-8"?>
+<p:notes xmlns:a="http://schemas.openxmlformats.org/drawingml/2006/main" xmlns:r="http://schemas.openxmlformats.org/officeDocument/2006/relationships" xmlns:p="http://schemas.openxmlformats.org/presentationml/2006/main">
+  <p:cSld>
+    <p:spTree>
+      <p:nvGrpSpPr>
+        <p:cNvPr id="1" name=""/>
+        <p:cNvGrpSpPr/>
+        <p:nvPr/>
+      </p:nvGrpSpPr>
+      <p:grpSpPr>
+        <a:xfrm>
+          <a:off x="0" y="0"/>
+          <a:ext cx="0" cy="0"/>
+          <a:chOff x="0" y="0"/>
+          <a:chExt cx="0" cy="0"/>
+        </a:xfrm>
+      </p:grpSpPr>
+      <p:sp>
+        <p:nvSpPr>
+          <p:cNvPr id="2" name="Slide Image Placeholder 1"/>
+          <p:cNvSpPr>
+            <a:spLocks noGrp="1" noRot="1" noChangeAspect="1"/>
+          </p:cNvSpPr>
+          <p:nvPr>
+            <p:ph type="sldImg"/>
+          </p:nvPr>
+        </p:nvSpPr>
+        <p:spPr/>
+      </p:sp>
+      <p:sp>
+        <p:nvSpPr>
+          <p:cNvPr id="3" name="Notes Placeholder 2"/>
+          <p:cNvSpPr>
+            <a:spLocks noGrp="1"/>
+          </p:cNvSpPr>
+          <p:nvPr>
+            <p:ph type="body" idx="1"/>
+          </p:nvPr>
+        </p:nvSpPr>
+        <p:spPr/>
+        <p:txBody>
+          <a:bodyPr/>
+          <a:lstStyle/>
+          <a:p>
+            <a:r>
+              <a:rPr lang="en-US" dirty="0" smtClean="0"/>
+              <a:t>Describe the goal of the experiment</a:t>
+            </a:r>
+          </a:p>
+          <a:p>
+            <a:r>
+              <a:rPr lang="en-US" dirty="0" smtClean="0"/>
+              <a:t>Explain how the database was populated,</a:t>
+            </a:r>
+            <a:r>
+              <a:rPr lang="en-US" baseline="0" dirty="0" smtClean="0"/>
+              <a:t> Describe axis</a:t>
+            </a:r>
+            <a:endParaRPr lang="en-US" dirty="0"/>
+          </a:p>
+        </p:txBody>
+      </p:sp>
+      <p:sp>
+        <p:nvSpPr>
+          <p:cNvPr id="4" name="Slide Number Placeholder 3"/>
+          <p:cNvSpPr>
+            <a:spLocks noGrp="1"/>
+          </p:cNvSpPr>
+          <p:nvPr>
+            <p:ph type="sldNum" sz="quarter" idx="10"/>
+          </p:nvPr>
+        </p:nvSpPr>
+        <p:spPr/>
+        <p:txBody>
+          <a:bodyPr/>
+          <a:lstStyle/>
+          <a:p>
+            <a:fld id="{6E605815-6331-9444-B06E-921213318926}" type="slidenum">
+              <a:rPr lang="en-US" smtClean="0"/>
+              <a:t>15</a:t>
+            </a:fld>
+            <a:endParaRPr lang="en-US"/>
+          </a:p>
+        </p:txBody>
+      </p:sp>
+    </p:spTree>
+    <p:extLst>
+      <p:ext uri="{BB962C8B-B14F-4D97-AF65-F5344CB8AC3E}">
+        <p14:creationId xmlns:p14="http://schemas.microsoft.com/office/powerpoint/2010/main" val="869872194"/>
+      </p:ext>
+    </p:extLst>
+  </p:cSld>
+  <p:clrMapOvr>
+    <a:masterClrMapping/>
+  </p:clrMapOvr>
+</p:notes>
+</file>
+
+<file path=ppt/notesSlides/notesSlide9.xml><?xml version="1.0" encoding="utf-8"?>
+<p:notes xmlns:a="http://schemas.openxmlformats.org/drawingml/2006/main" xmlns:r="http://schemas.openxmlformats.org/officeDocument/2006/relationships" xmlns:p="http://schemas.openxmlformats.org/presentationml/2006/main">
+  <p:cSld>
+    <p:spTree>
+      <p:nvGrpSpPr>
+        <p:cNvPr id="1" name=""/>
+        <p:cNvGrpSpPr/>
+        <p:nvPr/>
+      </p:nvGrpSpPr>
+      <p:grpSpPr>
+        <a:xfrm>
+          <a:off x="0" y="0"/>
+          <a:ext cx="0" cy="0"/>
+          <a:chOff x="0" y="0"/>
+          <a:chExt cx="0" cy="0"/>
+        </a:xfrm>
+      </p:grpSpPr>
+      <p:sp>
+        <p:nvSpPr>
+          <p:cNvPr id="2" name="Slide Image Placeholder 1"/>
+          <p:cNvSpPr>
+            <a:spLocks noGrp="1" noRot="1" noChangeAspect="1"/>
+          </p:cNvSpPr>
+          <p:nvPr>
+            <p:ph type="sldImg"/>
+          </p:nvPr>
+        </p:nvSpPr>
+        <p:spPr/>
+      </p:sp>
+      <p:sp>
+        <p:nvSpPr>
+          <p:cNvPr id="3" name="Notes Placeholder 2"/>
+          <p:cNvSpPr>
+            <a:spLocks noGrp="1"/>
+          </p:cNvSpPr>
+          <p:nvPr>
+            <p:ph type="body" idx="1"/>
+          </p:nvPr>
+        </p:nvSpPr>
+        <p:spPr/>
+        <p:txBody>
+          <a:bodyPr/>
+          <a:lstStyle/>
+          <a:p>
+            <a:r>
+              <a:rPr lang="en-US" dirty="0" smtClean="0"/>
+              <a:t>Other experimental findings</a:t>
+            </a:r>
+            <a:r>
+              <a:rPr lang="is-IS" dirty="0" smtClean="0"/>
+              <a:t>…</a:t>
+            </a:r>
+          </a:p>
+          <a:p>
+            <a:endParaRPr lang="en-US" dirty="0" smtClean="0"/>
+          </a:p>
+          <a:p>
+            <a:endParaRPr lang="en-US" dirty="0"/>
+          </a:p>
+        </p:txBody>
+      </p:sp>
+      <p:sp>
+        <p:nvSpPr>
+          <p:cNvPr id="4" name="Slide Number Placeholder 3"/>
+          <p:cNvSpPr>
+            <a:spLocks noGrp="1"/>
+          </p:cNvSpPr>
+          <p:nvPr>
+            <p:ph type="sldNum" sz="quarter" idx="10"/>
+          </p:nvPr>
+        </p:nvSpPr>
+        <p:spPr/>
+        <p:txBody>
+          <a:bodyPr/>
+          <a:lstStyle/>
+          <a:p>
+            <a:fld id="{6E605815-6331-9444-B06E-921213318926}" type="slidenum">
+              <a:rPr lang="en-US" smtClean="0"/>
+              <a:t>16</a:t>
+            </a:fld>
+            <a:endParaRPr lang="en-US"/>
+          </a:p>
+        </p:txBody>
+      </p:sp>
+    </p:spTree>
+    <p:extLst>
+      <p:ext uri="{BB962C8B-B14F-4D97-AF65-F5344CB8AC3E}">
+        <p14:creationId xmlns:p14="http://schemas.microsoft.com/office/powerpoint/2010/main" val="3410591639"/>
       </p:ext>
     </p:extLst>
   </p:cSld>
@@ -1282,7 +2941,7 @@
           <a:p>
             <a:fld id="{8EE520D6-1199-3C41-9A6A-AA3E2C6DD588}" type="datetime1">
               <a:rPr lang="en-US" smtClean="0"/>
-              <a:t>4/26/16</a:t>
+              <a:t>4/28/16</a:t>
             </a:fld>
             <a:endParaRPr lang="en-US"/>
           </a:p>
@@ -1452,7 +3111,7 @@
           <a:p>
             <a:fld id="{6DE2AD85-55B3-6D40-8E45-4897033CE78D}" type="datetime1">
               <a:rPr lang="en-US" smtClean="0"/>
-              <a:t>4/26/16</a:t>
+              <a:t>4/28/16</a:t>
             </a:fld>
             <a:endParaRPr lang="en-US"/>
           </a:p>
@@ -1632,7 +3291,7 @@
           <a:p>
             <a:fld id="{9B6E2D90-BDC5-EC4E-97C9-9EBA924F9C2A}" type="datetime1">
               <a:rPr lang="en-US" smtClean="0"/>
-              <a:t>4/26/16</a:t>
+              <a:t>4/28/16</a:t>
             </a:fld>
             <a:endParaRPr lang="en-US"/>
           </a:p>
@@ -1802,7 +3461,7 @@
           <a:p>
             <a:fld id="{3C02FE2B-B967-F44C-97BF-619FFF540275}" type="datetime1">
               <a:rPr lang="en-US" smtClean="0"/>
-              <a:t>4/26/16</a:t>
+              <a:t>4/28/16</a:t>
             </a:fld>
             <a:endParaRPr lang="en-US"/>
           </a:p>
@@ -2048,7 +3707,7 @@
           <a:p>
             <a:fld id="{2E0BEB10-3E92-1544-85E8-C96C20A337CE}" type="datetime1">
               <a:rPr lang="en-US" smtClean="0"/>
-              <a:t>4/26/16</a:t>
+              <a:t>4/28/16</a:t>
             </a:fld>
             <a:endParaRPr lang="en-US"/>
           </a:p>
@@ -2336,7 +3995,7 @@
           <a:p>
             <a:fld id="{475FB051-8E54-8E49-8432-E38A630FF054}" type="datetime1">
               <a:rPr lang="en-US" smtClean="0"/>
-              <a:t>4/26/16</a:t>
+              <a:t>4/28/16</a:t>
             </a:fld>
             <a:endParaRPr lang="en-US"/>
           </a:p>
@@ -2758,7 +4417,7 @@
           <a:p>
             <a:fld id="{8BA679C2-08DD-074B-9C48-B348A1DFA775}" type="datetime1">
               <a:rPr lang="en-US" smtClean="0"/>
-              <a:t>4/26/16</a:t>
+              <a:t>4/28/16</a:t>
             </a:fld>
             <a:endParaRPr lang="en-US"/>
           </a:p>
@@ -2876,7 +4535,7 @@
           <a:p>
             <a:fld id="{FD8F829F-F712-8745-AC98-41D32B363003}" type="datetime1">
               <a:rPr lang="en-US" smtClean="0"/>
-              <a:t>4/26/16</a:t>
+              <a:t>4/28/16</a:t>
             </a:fld>
             <a:endParaRPr lang="en-US"/>
           </a:p>
@@ -2971,7 +4630,7 @@
           <a:p>
             <a:fld id="{B7766C51-9295-BA4E-9CC5-B913E9ED7975}" type="datetime1">
               <a:rPr lang="en-US" smtClean="0"/>
-              <a:t>4/26/16</a:t>
+              <a:t>4/28/16</a:t>
             </a:fld>
             <a:endParaRPr lang="en-US"/>
           </a:p>
@@ -3248,7 +4907,7 @@
           <a:p>
             <a:fld id="{DCC74353-384D-7548-8376-5A6CDDA54B35}" type="datetime1">
               <a:rPr lang="en-US" smtClean="0"/>
-              <a:t>4/26/16</a:t>
+              <a:t>4/28/16</a:t>
             </a:fld>
             <a:endParaRPr lang="en-US"/>
           </a:p>
@@ -3501,7 +5160,7 @@
           <a:p>
             <a:fld id="{912E0EE9-0FD5-A04C-8EF0-F3BFD9ED0CEF}" type="datetime1">
               <a:rPr lang="en-US" smtClean="0"/>
-              <a:t>4/26/16</a:t>
+              <a:t>4/28/16</a:t>
             </a:fld>
             <a:endParaRPr lang="en-US"/>
           </a:p>
@@ -3714,7 +5373,7 @@
           <a:p>
             <a:fld id="{E05DCBF9-A63F-9B48-BC2B-98F6B05BC7B3}" type="datetime1">
               <a:rPr lang="en-US" smtClean="0"/>
-              <a:t>4/26/16</a:t>
+              <a:t>4/28/16</a:t>
             </a:fld>
             <a:endParaRPr lang="en-US"/>
           </a:p>
@@ -4360,7 +6019,7 @@
           <p:nvPr/>
         </p:nvPicPr>
         <p:blipFill>
-          <a:blip r:embed="rId2">
+          <a:blip r:embed="rId3">
             <a:extLst>
               <a:ext uri="{28A0092B-C50C-407E-A947-70E740481C1C}">
                 <a14:useLocalDpi xmlns:a14="http://schemas.microsoft.com/office/drawing/2010/main" val="0"/>
@@ -4508,11 +6167,7 @@
           <a:p>
             <a:r>
               <a:rPr lang="en-US" dirty="0" smtClean="0"/>
-              <a:t>Simple mechanism to specify conventions/policies to be </a:t>
-            </a:r>
-            <a:r>
-              <a:rPr lang="en-US" dirty="0" smtClean="0"/>
-              <a:t>enforced</a:t>
+              <a:t>Simple mechanism to specify conventions/policies to be enforced</a:t>
             </a:r>
           </a:p>
           <a:p>
@@ -4945,7 +6600,7 @@
           </p:nvPr>
         </p:nvPicPr>
         <p:blipFill>
-          <a:blip r:embed="rId2">
+          <a:blip r:embed="rId3">
             <a:extLst>
               <a:ext uri="{28A0092B-C50C-407E-A947-70E740481C1C}">
                 <a14:useLocalDpi xmlns:a14="http://schemas.microsoft.com/office/drawing/2010/main" val="0"/>
@@ -5276,7 +6931,7 @@
           </p:nvPr>
         </p:nvPicPr>
         <p:blipFill>
-          <a:blip r:embed="rId2">
+          <a:blip r:embed="rId3">
             <a:extLst>
               <a:ext uri="{28A0092B-C50C-407E-A947-70E740481C1C}">
                 <a14:useLocalDpi xmlns:a14="http://schemas.microsoft.com/office/drawing/2010/main" val="0"/>
@@ -5410,11 +7065,7 @@
             <a:pPr lvl="1"/>
             <a:r>
               <a:rPr lang="en-US" dirty="0" smtClean="0"/>
-              <a:t>Less than 100ms for 1000 </a:t>
-            </a:r>
-            <a:r>
-              <a:rPr lang="en-US" dirty="0" smtClean="0"/>
-              <a:t>policies</a:t>
+              <a:t>Less than 100ms for 1000 policies</a:t>
             </a:r>
           </a:p>
           <a:p>
@@ -5422,7 +7073,6 @@
               <a:rPr lang="en-US" dirty="0" smtClean="0"/>
               <a:t>No significant change in overhead due to the number of dependencies</a:t>
             </a:r>
-            <a:endParaRPr lang="en-US" dirty="0" smtClean="0"/>
           </a:p>
         </p:txBody>
       </p:sp>
@@ -5889,7 +7539,7 @@
           </p:nvPr>
         </p:nvPicPr>
         <p:blipFill>
-          <a:blip r:embed="rId2">
+          <a:blip r:embed="rId3">
             <a:extLst>
               <a:ext uri="{28A0092B-C50C-407E-A947-70E740481C1C}">
                 <a14:useLocalDpi xmlns:a14="http://schemas.microsoft.com/office/drawing/2010/main" val="0"/>
@@ -6390,7 +8040,7 @@
           <p:nvPr/>
         </p:nvPicPr>
         <p:blipFill>
-          <a:blip r:embed="rId2">
+          <a:blip r:embed="rId3">
             <a:extLst>
               <a:ext uri="{28A0092B-C50C-407E-A947-70E740481C1C}">
                 <a14:useLocalDpi xmlns:a14="http://schemas.microsoft.com/office/drawing/2010/main" val="0"/>
@@ -6420,7 +8070,7 @@
           <p:nvPr/>
         </p:nvPicPr>
         <p:blipFill>
-          <a:blip r:embed="rId3">
+          <a:blip r:embed="rId4">
             <a:extLst>
               <a:ext uri="{28A0092B-C50C-407E-A947-70E740481C1C}">
                 <a14:useLocalDpi xmlns:a14="http://schemas.microsoft.com/office/drawing/2010/main" val="0"/>
@@ -6450,7 +8100,7 @@
           <p:nvPr/>
         </p:nvPicPr>
         <p:blipFill>
-          <a:blip r:embed="rId4">
+          <a:blip r:embed="rId5">
             <a:extLst>
               <a:ext uri="{28A0092B-C50C-407E-A947-70E740481C1C}">
                 <a14:useLocalDpi xmlns:a14="http://schemas.microsoft.com/office/drawing/2010/main" val="0"/>
@@ -6878,7 +8528,7 @@
           </p:nvPr>
         </p:nvPicPr>
         <p:blipFill>
-          <a:blip r:embed="rId2">
+          <a:blip r:embed="rId3">
             <a:extLst>
               <a:ext uri="{28A0092B-C50C-407E-A947-70E740481C1C}">
                 <a14:useLocalDpi xmlns:a14="http://schemas.microsoft.com/office/drawing/2010/main" val="0"/>
@@ -16094,7 +17744,7 @@
           <p:nvPr/>
         </p:nvPicPr>
         <p:blipFill>
-          <a:blip r:embed="rId2">
+          <a:blip r:embed="rId3">
             <a:extLst>
               <a:ext uri="{28A0092B-C50C-407E-A947-70E740481C1C}">
                 <a14:useLocalDpi xmlns:a14="http://schemas.microsoft.com/office/drawing/2010/main" val="0"/>

</xml_diff>